<commit_message>
new presentation, complete report
</commit_message>
<xml_diff>
--- a/Prova.pptx
+++ b/Prova.pptx
@@ -5,7 +5,7 @@
     <p:sldMasterId id="2147483648" r:id="rId1"/>
   </p:sldMasterIdLst>
   <p:notesMasterIdLst>
-    <p:notesMasterId r:id="rId33"/>
+    <p:notesMasterId r:id="rId34"/>
   </p:notesMasterIdLst>
   <p:sldIdLst>
     <p:sldId id="256" r:id="rId2"/>
@@ -39,6 +39,7 @@
     <p:sldId id="284" r:id="rId30"/>
     <p:sldId id="285" r:id="rId31"/>
     <p:sldId id="286" r:id="rId32"/>
+    <p:sldId id="287" r:id="rId33"/>
   </p:sldIdLst>
   <p:sldSz cx="9144000" cy="6858000" type="screen4x3"/>
   <p:notesSz cx="6858000" cy="9144000"/>
@@ -340,6 +341,22 @@
       </a:defRPr>
     </a:lvl9pPr>
   </p:defaultTextStyle>
+  <p:extLst>
+    <p:ext uri="{EFAFB233-063F-42B5-8137-9DF3F51BA10A}">
+      <p15:sldGuideLst xmlns:p15="http://schemas.microsoft.com/office/powerpoint/2012/main">
+        <p15:guide id="1" orient="horz" pos="2160">
+          <p15:clr>
+            <a:srgbClr val="A4A3A4"/>
+          </p15:clr>
+        </p15:guide>
+        <p15:guide id="2" pos="2880">
+          <p15:clr>
+            <a:srgbClr val="A4A3A4"/>
+          </p15:clr>
+        </p15:guide>
+      </p15:sldGuideLst>
+    </p:ext>
+  </p:extLst>
 </p:presentation>
 </file>
 
@@ -762,7 +779,7 @@
             <a:fld id="{86CB4B4D-7CA3-9044-876B-883B54F8677D}" type="slidenum">
               <a:rPr/>
               <a:pPr/>
-              <a:t>‹N›</a:t>
+              <a:t>‹#›</a:t>
             </a:fld>
             <a:endParaRPr/>
           </a:p>
@@ -890,7 +907,7 @@
             <a:fld id="{86CB4B4D-7CA3-9044-876B-883B54F8677D}" type="slidenum">
               <a:rPr/>
               <a:pPr/>
-              <a:t>‹N›</a:t>
+              <a:t>‹#›</a:t>
             </a:fld>
             <a:endParaRPr/>
           </a:p>
@@ -1168,7 +1185,7 @@
             <a:fld id="{86CB4B4D-7CA3-9044-876B-883B54F8677D}" type="slidenum">
               <a:rPr/>
               <a:pPr/>
-              <a:t>‹N›</a:t>
+              <a:t>‹#›</a:t>
             </a:fld>
             <a:endParaRPr/>
           </a:p>
@@ -1320,7 +1337,7 @@
             <a:fld id="{86CB4B4D-7CA3-9044-876B-883B54F8677D}" type="slidenum">
               <a:rPr/>
               <a:pPr/>
-              <a:t>‹N›</a:t>
+              <a:t>‹#›</a:t>
             </a:fld>
             <a:endParaRPr/>
           </a:p>
@@ -1514,7 +1531,7 @@
             <a:fld id="{86CB4B4D-7CA3-9044-876B-883B54F8677D}" type="slidenum">
               <a:rPr/>
               <a:pPr/>
-              <a:t>‹N›</a:t>
+              <a:t>‹#›</a:t>
             </a:fld>
             <a:endParaRPr/>
           </a:p>
@@ -1597,7 +1614,7 @@
             <a:fld id="{86CB4B4D-7CA3-9044-876B-883B54F8677D}" type="slidenum">
               <a:rPr/>
               <a:pPr/>
-              <a:t>‹N›</a:t>
+              <a:t>‹#›</a:t>
             </a:fld>
             <a:endParaRPr/>
           </a:p>
@@ -1651,7 +1668,7 @@
             <a:fld id="{86CB4B4D-7CA3-9044-876B-883B54F8677D}" type="slidenum">
               <a:rPr/>
               <a:pPr/>
-              <a:t>‹N›</a:t>
+              <a:t>‹#›</a:t>
             </a:fld>
             <a:endParaRPr/>
           </a:p>
@@ -1898,7 +1915,7 @@
             <a:fld id="{86CB4B4D-7CA3-9044-876B-883B54F8677D}" type="slidenum">
               <a:rPr/>
               <a:pPr/>
-              <a:t>‹N›</a:t>
+              <a:t>‹#›</a:t>
             </a:fld>
             <a:endParaRPr/>
           </a:p>
@@ -2182,7 +2199,7 @@
             <a:fld id="{86CB4B4D-7CA3-9044-876B-883B54F8677D}" type="slidenum">
               <a:rPr/>
               <a:pPr/>
-              <a:t>‹N›</a:t>
+              <a:t>‹#›</a:t>
             </a:fld>
             <a:endParaRPr/>
           </a:p>
@@ -2332,7 +2349,7 @@
           </a:ln>
           <a:extLst>
             <a:ext uri="{C572A759-6A51-4108-AA02-DFA0A04FC94B}">
-              <ma14:wrappingTextBoxFlag xmlns="" xmlns:m="http://schemas.openxmlformats.org/officeDocument/2006/math" xmlns:a14="http://schemas.microsoft.com/office/drawing/2010/main" xmlns:ma14="http://schemas.microsoft.com/office/mac/drawingml/2011/main" val="1"/>
+              <ma14:wrappingTextBoxFlag xmlns:ma14="http://schemas.microsoft.com/office/mac/drawingml/2011/main" xmlns:a14="http://schemas.microsoft.com/office/drawing/2010/main" xmlns:m="http://schemas.openxmlformats.org/officeDocument/2006/math" xmlns="" val="1"/>
             </a:ext>
           </a:extLst>
         </p:spPr>
@@ -2371,7 +2388,7 @@
           </a:ln>
           <a:extLst>
             <a:ext uri="{C572A759-6A51-4108-AA02-DFA0A04FC94B}">
-              <ma14:wrappingTextBoxFlag xmlns="" xmlns:m="http://schemas.openxmlformats.org/officeDocument/2006/math" xmlns:a14="http://schemas.microsoft.com/office/drawing/2010/main" xmlns:ma14="http://schemas.microsoft.com/office/mac/drawingml/2011/main" val="1"/>
+              <ma14:wrappingTextBoxFlag xmlns:ma14="http://schemas.microsoft.com/office/mac/drawingml/2011/main" xmlns:a14="http://schemas.microsoft.com/office/drawing/2010/main" xmlns:m="http://schemas.openxmlformats.org/officeDocument/2006/math" xmlns="" val="1"/>
             </a:ext>
           </a:extLst>
         </p:spPr>
@@ -2454,7 +2471,7 @@
             <a:fld id="{86CB4B4D-7CA3-9044-876B-883B54F8677D}" type="slidenum">
               <a:rPr/>
               <a:pPr/>
-              <a:t>‹N›</a:t>
+              <a:t>‹#›</a:t>
             </a:fld>
             <a:endParaRPr/>
           </a:p>
@@ -3316,7 +3333,7 @@
           </a:ln>
           <a:extLst>
             <a:ext uri="{C572A759-6A51-4108-AA02-DFA0A04FC94B}">
-              <ma14:wrappingTextBoxFlag xmlns="" xmlns:m="http://schemas.openxmlformats.org/officeDocument/2006/math" xmlns:a14="http://schemas.microsoft.com/office/drawing/2010/main" xmlns:ma14="http://schemas.microsoft.com/office/mac/drawingml/2011/main" val="1"/>
+              <ma14:wrappingTextBoxFlag xmlns:ma14="http://schemas.microsoft.com/office/mac/drawingml/2011/main" xmlns:a14="http://schemas.microsoft.com/office/drawing/2010/main" xmlns:m="http://schemas.openxmlformats.org/officeDocument/2006/math" xmlns="" val="1"/>
             </a:ext>
           </a:extLst>
         </p:spPr>
@@ -3372,7 +3389,7 @@
           </a:ln>
           <a:extLst>
             <a:ext uri="{C572A759-6A51-4108-AA02-DFA0A04FC94B}">
-              <ma14:wrappingTextBoxFlag xmlns="" xmlns:m="http://schemas.openxmlformats.org/officeDocument/2006/math" xmlns:a14="http://schemas.microsoft.com/office/drawing/2010/main" xmlns:ma14="http://schemas.microsoft.com/office/mac/drawingml/2011/main" val="1"/>
+              <ma14:wrappingTextBoxFlag xmlns:ma14="http://schemas.microsoft.com/office/mac/drawingml/2011/main" xmlns:a14="http://schemas.microsoft.com/office/drawing/2010/main" xmlns:m="http://schemas.openxmlformats.org/officeDocument/2006/math" xmlns="" val="1"/>
             </a:ext>
           </a:extLst>
         </p:spPr>
@@ -3406,13 +3423,6 @@
     <a:masterClrMapping/>
   </p:clrMapOvr>
   <p:transition spd="med"/>
-  <p:timing>
-    <p:tnLst>
-      <p:par>
-        <p:cTn id="1" dur="indefinite" restart="never" nodeType="tmRoot"/>
-      </p:par>
-    </p:tnLst>
-  </p:timing>
 </p:sld>
 </file>
 
@@ -3496,7 +3506,7 @@
           </a:ln>
           <a:extLst>
             <a:ext uri="{C572A759-6A51-4108-AA02-DFA0A04FC94B}">
-              <ma14:wrappingTextBoxFlag xmlns="" xmlns:m="http://schemas.openxmlformats.org/officeDocument/2006/math" xmlns:a14="http://schemas.microsoft.com/office/drawing/2010/main" xmlns:ma14="http://schemas.microsoft.com/office/mac/drawingml/2011/main" val="1"/>
+              <ma14:wrappingTextBoxFlag xmlns:ma14="http://schemas.microsoft.com/office/mac/drawingml/2011/main" xmlns:a14="http://schemas.microsoft.com/office/drawing/2010/main" xmlns:m="http://schemas.openxmlformats.org/officeDocument/2006/math" xmlns="" val="1"/>
             </a:ext>
           </a:extLst>
         </p:spPr>
@@ -3530,9 +3540,7 @@
           <p:nvPr/>
         </p:nvPicPr>
         <p:blipFill>
-          <a:blip r:embed="rId2" cstate="print">
-            <a:extLst/>
-          </a:blip>
+          <a:blip r:embed="rId2" cstate="print"/>
           <a:stretch>
             <a:fillRect/>
           </a:stretch>
@@ -3569,7 +3577,7 @@
           </a:ln>
           <a:extLst>
             <a:ext uri="{C572A759-6A51-4108-AA02-DFA0A04FC94B}">
-              <ma14:wrappingTextBoxFlag xmlns="" xmlns:m="http://schemas.openxmlformats.org/officeDocument/2006/math" xmlns:a14="http://schemas.microsoft.com/office/drawing/2010/main" xmlns:ma14="http://schemas.microsoft.com/office/mac/drawingml/2011/main" val="1"/>
+              <ma14:wrappingTextBoxFlag xmlns:ma14="http://schemas.microsoft.com/office/mac/drawingml/2011/main" xmlns:a14="http://schemas.microsoft.com/office/drawing/2010/main" xmlns:m="http://schemas.openxmlformats.org/officeDocument/2006/math" xmlns="" val="1"/>
             </a:ext>
           </a:extLst>
         </p:spPr>
@@ -3679,13 +3687,6 @@
     <a:masterClrMapping/>
   </p:clrMapOvr>
   <p:transition spd="med"/>
-  <p:timing>
-    <p:tnLst>
-      <p:par>
-        <p:cTn id="1" dur="indefinite" restart="never" nodeType="tmRoot"/>
-      </p:par>
-    </p:tnLst>
-  </p:timing>
 </p:sld>
 </file>
 
@@ -3769,7 +3770,7 @@
           </a:ln>
           <a:extLst>
             <a:ext uri="{C572A759-6A51-4108-AA02-DFA0A04FC94B}">
-              <ma14:wrappingTextBoxFlag xmlns="" xmlns:m="http://schemas.openxmlformats.org/officeDocument/2006/math" xmlns:a14="http://schemas.microsoft.com/office/drawing/2010/main" xmlns:ma14="http://schemas.microsoft.com/office/mac/drawingml/2011/main" val="1"/>
+              <ma14:wrappingTextBoxFlag xmlns:ma14="http://schemas.microsoft.com/office/mac/drawingml/2011/main" xmlns:a14="http://schemas.microsoft.com/office/drawing/2010/main" xmlns:m="http://schemas.openxmlformats.org/officeDocument/2006/math" xmlns="" val="1"/>
             </a:ext>
           </a:extLst>
         </p:spPr>
@@ -3816,7 +3817,7 @@
           </a:ln>
           <a:extLst>
             <a:ext uri="{C572A759-6A51-4108-AA02-DFA0A04FC94B}">
-              <ma14:wrappingTextBoxFlag xmlns="" xmlns:m="http://schemas.openxmlformats.org/officeDocument/2006/math" xmlns:a14="http://schemas.microsoft.com/office/drawing/2010/main" xmlns:ma14="http://schemas.microsoft.com/office/mac/drawingml/2011/main" val="1"/>
+              <ma14:wrappingTextBoxFlag xmlns:ma14="http://schemas.microsoft.com/office/mac/drawingml/2011/main" xmlns:a14="http://schemas.microsoft.com/office/drawing/2010/main" xmlns:m="http://schemas.openxmlformats.org/officeDocument/2006/math" xmlns="" val="1"/>
             </a:ext>
           </a:extLst>
         </p:spPr>
@@ -3880,7 +3881,7 @@
           </a:ln>
           <a:extLst>
             <a:ext uri="{C572A759-6A51-4108-AA02-DFA0A04FC94B}">
-              <ma14:wrappingTextBoxFlag xmlns="" xmlns:m="http://schemas.openxmlformats.org/officeDocument/2006/math" xmlns:a14="http://schemas.microsoft.com/office/drawing/2010/main" xmlns:ma14="http://schemas.microsoft.com/office/mac/drawingml/2011/main" val="1"/>
+              <ma14:wrappingTextBoxFlag xmlns:ma14="http://schemas.microsoft.com/office/mac/drawingml/2011/main" xmlns:a14="http://schemas.microsoft.com/office/drawing/2010/main" xmlns:m="http://schemas.openxmlformats.org/officeDocument/2006/math" xmlns="" val="1"/>
             </a:ext>
           </a:extLst>
         </p:spPr>
@@ -3927,7 +3928,7 @@
           </a:ln>
           <a:extLst>
             <a:ext uri="{C572A759-6A51-4108-AA02-DFA0A04FC94B}">
-              <ma14:wrappingTextBoxFlag xmlns="" xmlns:m="http://schemas.openxmlformats.org/officeDocument/2006/math" xmlns:a14="http://schemas.microsoft.com/office/drawing/2010/main" xmlns:ma14="http://schemas.microsoft.com/office/mac/drawingml/2011/main" val="1"/>
+              <ma14:wrappingTextBoxFlag xmlns:ma14="http://schemas.microsoft.com/office/mac/drawingml/2011/main" xmlns:a14="http://schemas.microsoft.com/office/drawing/2010/main" xmlns:m="http://schemas.openxmlformats.org/officeDocument/2006/math" xmlns="" val="1"/>
             </a:ext>
           </a:extLst>
         </p:spPr>
@@ -3978,7 +3979,7 @@
           </a:ln>
           <a:extLst>
             <a:ext uri="{C572A759-6A51-4108-AA02-DFA0A04FC94B}">
-              <ma14:wrappingTextBoxFlag xmlns="" xmlns:m="http://schemas.openxmlformats.org/officeDocument/2006/math" xmlns:a14="http://schemas.microsoft.com/office/drawing/2010/main" xmlns:ma14="http://schemas.microsoft.com/office/mac/drawingml/2011/main" val="1"/>
+              <ma14:wrappingTextBoxFlag xmlns:ma14="http://schemas.microsoft.com/office/mac/drawingml/2011/main" xmlns:a14="http://schemas.microsoft.com/office/drawing/2010/main" xmlns:m="http://schemas.openxmlformats.org/officeDocument/2006/math" xmlns="" val="1"/>
             </a:ext>
           </a:extLst>
         </p:spPr>
@@ -4022,7 +4023,7 @@
           </a:ln>
           <a:extLst>
             <a:ext uri="{C572A759-6A51-4108-AA02-DFA0A04FC94B}">
-              <ma14:wrappingTextBoxFlag xmlns="" xmlns:m="http://schemas.openxmlformats.org/officeDocument/2006/math" xmlns:a14="http://schemas.microsoft.com/office/drawing/2010/main" xmlns:ma14="http://schemas.microsoft.com/office/mac/drawingml/2011/main" val="1"/>
+              <ma14:wrappingTextBoxFlag xmlns:ma14="http://schemas.microsoft.com/office/mac/drawingml/2011/main" xmlns:a14="http://schemas.microsoft.com/office/drawing/2010/main" xmlns:m="http://schemas.openxmlformats.org/officeDocument/2006/math" xmlns="" val="1"/>
             </a:ext>
           </a:extLst>
         </p:spPr>
@@ -4060,13 +4061,6 @@
     <a:masterClrMapping/>
   </p:clrMapOvr>
   <p:transition spd="med"/>
-  <p:timing>
-    <p:tnLst>
-      <p:par>
-        <p:cTn id="1" dur="indefinite" restart="never" nodeType="tmRoot"/>
-      </p:par>
-    </p:tnLst>
-  </p:timing>
 </p:sld>
 </file>
 
@@ -4150,7 +4144,7 @@
           </a:ln>
           <a:extLst>
             <a:ext uri="{C572A759-6A51-4108-AA02-DFA0A04FC94B}">
-              <ma14:wrappingTextBoxFlag xmlns="" xmlns:m="http://schemas.openxmlformats.org/officeDocument/2006/math" xmlns:a14="http://schemas.microsoft.com/office/drawing/2010/main" xmlns:ma14="http://schemas.microsoft.com/office/mac/drawingml/2011/main" val="1"/>
+              <ma14:wrappingTextBoxFlag xmlns:ma14="http://schemas.microsoft.com/office/mac/drawingml/2011/main" xmlns:a14="http://schemas.microsoft.com/office/drawing/2010/main" xmlns:m="http://schemas.openxmlformats.org/officeDocument/2006/math" xmlns="" val="1"/>
             </a:ext>
           </a:extLst>
         </p:spPr>
@@ -4184,9 +4178,7 @@
           <p:nvPr/>
         </p:nvPicPr>
         <p:blipFill>
-          <a:blip r:embed="rId2" cstate="print">
-            <a:extLst/>
-          </a:blip>
+          <a:blip r:embed="rId2" cstate="print"/>
           <a:stretch>
             <a:fillRect/>
           </a:stretch>
@@ -4226,7 +4218,7 @@
           </a:ln>
           <a:extLst>
             <a:ext uri="{C572A759-6A51-4108-AA02-DFA0A04FC94B}">
-              <ma14:wrappingTextBoxFlag xmlns="" xmlns:m="http://schemas.openxmlformats.org/officeDocument/2006/math" xmlns:a14="http://schemas.microsoft.com/office/drawing/2010/main" xmlns:ma14="http://schemas.microsoft.com/office/mac/drawingml/2011/main" val="1"/>
+              <ma14:wrappingTextBoxFlag xmlns:ma14="http://schemas.microsoft.com/office/mac/drawingml/2011/main" xmlns:a14="http://schemas.microsoft.com/office/drawing/2010/main" xmlns:m="http://schemas.openxmlformats.org/officeDocument/2006/math" xmlns="" val="1"/>
             </a:ext>
           </a:extLst>
         </p:spPr>
@@ -4292,7 +4284,7 @@
           </a:ln>
           <a:extLst>
             <a:ext uri="{C572A759-6A51-4108-AA02-DFA0A04FC94B}">
-              <ma14:wrappingTextBoxFlag xmlns="" xmlns:m="http://schemas.openxmlformats.org/officeDocument/2006/math" xmlns:a14="http://schemas.microsoft.com/office/drawing/2010/main" xmlns:ma14="http://schemas.microsoft.com/office/mac/drawingml/2011/main" val="1"/>
+              <ma14:wrappingTextBoxFlag xmlns:ma14="http://schemas.microsoft.com/office/mac/drawingml/2011/main" xmlns:a14="http://schemas.microsoft.com/office/drawing/2010/main" xmlns:m="http://schemas.openxmlformats.org/officeDocument/2006/math" xmlns="" val="1"/>
             </a:ext>
           </a:extLst>
         </p:spPr>
@@ -4339,7 +4331,7 @@
           </a:ln>
           <a:extLst>
             <a:ext uri="{C572A759-6A51-4108-AA02-DFA0A04FC94B}">
-              <ma14:wrappingTextBoxFlag xmlns="" xmlns:m="http://schemas.openxmlformats.org/officeDocument/2006/math" xmlns:a14="http://schemas.microsoft.com/office/drawing/2010/main" xmlns:ma14="http://schemas.microsoft.com/office/mac/drawingml/2011/main" val="1"/>
+              <ma14:wrappingTextBoxFlag xmlns:ma14="http://schemas.microsoft.com/office/mac/drawingml/2011/main" xmlns:a14="http://schemas.microsoft.com/office/drawing/2010/main" xmlns:m="http://schemas.openxmlformats.org/officeDocument/2006/math" xmlns="" val="1"/>
             </a:ext>
           </a:extLst>
         </p:spPr>
@@ -4381,13 +4373,6 @@
     <a:masterClrMapping/>
   </p:clrMapOvr>
   <p:transition spd="med"/>
-  <p:timing>
-    <p:tnLst>
-      <p:par>
-        <p:cTn id="1" dur="indefinite" restart="never" nodeType="tmRoot"/>
-      </p:par>
-    </p:tnLst>
-  </p:timing>
 </p:sld>
 </file>
 
@@ -4427,7 +4412,7 @@
           </a:ln>
           <a:extLst>
             <a:ext uri="{C572A759-6A51-4108-AA02-DFA0A04FC94B}">
-              <ma14:wrappingTextBoxFlag xmlns="" xmlns:m="http://schemas.openxmlformats.org/officeDocument/2006/math" xmlns:a14="http://schemas.microsoft.com/office/drawing/2010/main" xmlns:ma14="http://schemas.microsoft.com/office/mac/drawingml/2011/main" val="1"/>
+              <ma14:wrappingTextBoxFlag xmlns:ma14="http://schemas.microsoft.com/office/mac/drawingml/2011/main" xmlns:a14="http://schemas.microsoft.com/office/drawing/2010/main" xmlns:m="http://schemas.openxmlformats.org/officeDocument/2006/math" xmlns="" val="1"/>
             </a:ext>
           </a:extLst>
         </p:spPr>
@@ -4763,7 +4748,7 @@
           </a:ln>
           <a:extLst>
             <a:ext uri="{C572A759-6A51-4108-AA02-DFA0A04FC94B}">
-              <ma14:wrappingTextBoxFlag xmlns="" xmlns:m="http://schemas.openxmlformats.org/officeDocument/2006/math" xmlns:a14="http://schemas.microsoft.com/office/drawing/2010/main" xmlns:ma14="http://schemas.microsoft.com/office/mac/drawingml/2011/main" val="1"/>
+              <ma14:wrappingTextBoxFlag xmlns:ma14="http://schemas.microsoft.com/office/mac/drawingml/2011/main" xmlns:a14="http://schemas.microsoft.com/office/drawing/2010/main" xmlns:m="http://schemas.openxmlformats.org/officeDocument/2006/math" xmlns="" val="1"/>
             </a:ext>
           </a:extLst>
         </p:spPr>
@@ -4807,7 +4792,7 @@
           </a:ln>
           <a:extLst>
             <a:ext uri="{C572A759-6A51-4108-AA02-DFA0A04FC94B}">
-              <ma14:wrappingTextBoxFlag xmlns="" xmlns:m="http://schemas.openxmlformats.org/officeDocument/2006/math" xmlns:a14="http://schemas.microsoft.com/office/drawing/2010/main" xmlns:ma14="http://schemas.microsoft.com/office/mac/drawingml/2011/main" val="1"/>
+              <ma14:wrappingTextBoxFlag xmlns:ma14="http://schemas.microsoft.com/office/mac/drawingml/2011/main" xmlns:a14="http://schemas.microsoft.com/office/drawing/2010/main" xmlns:m="http://schemas.openxmlformats.org/officeDocument/2006/math" xmlns="" val="1"/>
             </a:ext>
           </a:extLst>
         </p:spPr>
@@ -4847,9 +4832,7 @@
           <p:nvPr/>
         </p:nvPicPr>
         <p:blipFill>
-          <a:blip r:embed="rId2" cstate="print">
-            <a:extLst/>
-          </a:blip>
+          <a:blip r:embed="rId2" cstate="print"/>
           <a:srcRect t="2311" b="2312"/>
           <a:stretch>
             <a:fillRect/>
@@ -4874,13 +4857,6 @@
     <a:masterClrMapping/>
   </p:clrMapOvr>
   <p:transition spd="med"/>
-  <p:timing>
-    <p:tnLst>
-      <p:par>
-        <p:cTn id="1" dur="indefinite" restart="never" nodeType="tmRoot"/>
-      </p:par>
-    </p:tnLst>
-  </p:timing>
 </p:sld>
 </file>
 
@@ -4920,7 +4896,7 @@
           </a:ln>
           <a:extLst>
             <a:ext uri="{C572A759-6A51-4108-AA02-DFA0A04FC94B}">
-              <ma14:wrappingTextBoxFlag xmlns="" xmlns:m="http://schemas.openxmlformats.org/officeDocument/2006/math" xmlns:a14="http://schemas.microsoft.com/office/drawing/2010/main" xmlns:ma14="http://schemas.microsoft.com/office/mac/drawingml/2011/main" val="1"/>
+              <ma14:wrappingTextBoxFlag xmlns:ma14="http://schemas.microsoft.com/office/mac/drawingml/2011/main" xmlns:a14="http://schemas.microsoft.com/office/drawing/2010/main" xmlns:m="http://schemas.openxmlformats.org/officeDocument/2006/math" xmlns="" val="1"/>
             </a:ext>
           </a:extLst>
         </p:spPr>
@@ -4967,7 +4943,7 @@
           </a:ln>
           <a:extLst>
             <a:ext uri="{C572A759-6A51-4108-AA02-DFA0A04FC94B}">
-              <ma14:wrappingTextBoxFlag xmlns="" xmlns:m="http://schemas.openxmlformats.org/officeDocument/2006/math" xmlns:a14="http://schemas.microsoft.com/office/drawing/2010/main" xmlns:ma14="http://schemas.microsoft.com/office/mac/drawingml/2011/main" val="1"/>
+              <ma14:wrappingTextBoxFlag xmlns:ma14="http://schemas.microsoft.com/office/mac/drawingml/2011/main" xmlns:a14="http://schemas.microsoft.com/office/drawing/2010/main" xmlns:m="http://schemas.openxmlformats.org/officeDocument/2006/math" xmlns="" val="1"/>
             </a:ext>
           </a:extLst>
         </p:spPr>
@@ -5031,7 +5007,7 @@
           </a:ln>
           <a:extLst>
             <a:ext uri="{C572A759-6A51-4108-AA02-DFA0A04FC94B}">
-              <ma14:wrappingTextBoxFlag xmlns="" xmlns:m="http://schemas.openxmlformats.org/officeDocument/2006/math" xmlns:a14="http://schemas.microsoft.com/office/drawing/2010/main" xmlns:ma14="http://schemas.microsoft.com/office/mac/drawingml/2011/main" val="1"/>
+              <ma14:wrappingTextBoxFlag xmlns:ma14="http://schemas.microsoft.com/office/mac/drawingml/2011/main" xmlns:a14="http://schemas.microsoft.com/office/drawing/2010/main" xmlns:m="http://schemas.openxmlformats.org/officeDocument/2006/math" xmlns="" val="1"/>
             </a:ext>
           </a:extLst>
         </p:spPr>
@@ -5078,7 +5054,7 @@
           </a:ln>
           <a:extLst>
             <a:ext uri="{C572A759-6A51-4108-AA02-DFA0A04FC94B}">
-              <ma14:wrappingTextBoxFlag xmlns="" xmlns:m="http://schemas.openxmlformats.org/officeDocument/2006/math" xmlns:a14="http://schemas.microsoft.com/office/drawing/2010/main" xmlns:ma14="http://schemas.microsoft.com/office/mac/drawingml/2011/main" val="1"/>
+              <ma14:wrappingTextBoxFlag xmlns:ma14="http://schemas.microsoft.com/office/mac/drawingml/2011/main" xmlns:a14="http://schemas.microsoft.com/office/drawing/2010/main" xmlns:m="http://schemas.openxmlformats.org/officeDocument/2006/math" xmlns="" val="1"/>
             </a:ext>
           </a:extLst>
         </p:spPr>
@@ -5129,7 +5105,7 @@
           </a:ln>
           <a:extLst>
             <a:ext uri="{C572A759-6A51-4108-AA02-DFA0A04FC94B}">
-              <ma14:wrappingTextBoxFlag xmlns="" xmlns:m="http://schemas.openxmlformats.org/officeDocument/2006/math" xmlns:a14="http://schemas.microsoft.com/office/drawing/2010/main" xmlns:ma14="http://schemas.microsoft.com/office/mac/drawingml/2011/main" val="1"/>
+              <ma14:wrappingTextBoxFlag xmlns:ma14="http://schemas.microsoft.com/office/mac/drawingml/2011/main" xmlns:a14="http://schemas.microsoft.com/office/drawing/2010/main" xmlns:m="http://schemas.openxmlformats.org/officeDocument/2006/math" xmlns="" val="1"/>
             </a:ext>
           </a:extLst>
         </p:spPr>
@@ -5173,7 +5149,7 @@
           </a:ln>
           <a:extLst>
             <a:ext uri="{C572A759-6A51-4108-AA02-DFA0A04FC94B}">
-              <ma14:wrappingTextBoxFlag xmlns="" xmlns:m="http://schemas.openxmlformats.org/officeDocument/2006/math" xmlns:a14="http://schemas.microsoft.com/office/drawing/2010/main" xmlns:ma14="http://schemas.microsoft.com/office/mac/drawingml/2011/main" val="1"/>
+              <ma14:wrappingTextBoxFlag xmlns:ma14="http://schemas.microsoft.com/office/mac/drawingml/2011/main" xmlns:a14="http://schemas.microsoft.com/office/drawing/2010/main" xmlns:m="http://schemas.openxmlformats.org/officeDocument/2006/math" xmlns="" val="1"/>
             </a:ext>
           </a:extLst>
         </p:spPr>
@@ -5236,7 +5212,7 @@
           </a:ln>
           <a:extLst>
             <a:ext uri="{C572A759-6A51-4108-AA02-DFA0A04FC94B}">
-              <ma14:wrappingTextBoxFlag xmlns="" xmlns:m="http://schemas.openxmlformats.org/officeDocument/2006/math" xmlns:a14="http://schemas.microsoft.com/office/drawing/2010/main" xmlns:ma14="http://schemas.microsoft.com/office/mac/drawingml/2011/main" val="1"/>
+              <ma14:wrappingTextBoxFlag xmlns:ma14="http://schemas.microsoft.com/office/mac/drawingml/2011/main" xmlns:a14="http://schemas.microsoft.com/office/drawing/2010/main" xmlns:m="http://schemas.openxmlformats.org/officeDocument/2006/math" xmlns="" val="1"/>
             </a:ext>
           </a:extLst>
         </p:spPr>
@@ -5273,13 +5249,6 @@
     <a:masterClrMapping/>
   </p:clrMapOvr>
   <p:transition spd="med"/>
-  <p:timing>
-    <p:tnLst>
-      <p:par>
-        <p:cTn id="1" dur="indefinite" restart="never" nodeType="tmRoot"/>
-      </p:par>
-    </p:tnLst>
-  </p:timing>
 </p:sld>
 </file>
 
@@ -5309,9 +5278,7 @@
           <p:nvPr/>
         </p:nvPicPr>
         <p:blipFill>
-          <a:blip r:embed="rId2" cstate="print">
-            <a:extLst/>
-          </a:blip>
+          <a:blip r:embed="rId2" cstate="print"/>
           <a:srcRect t="897" b="896"/>
           <a:stretch>
             <a:fillRect/>
@@ -5339,9 +5306,7 @@
           <p:nvPr/>
         </p:nvPicPr>
         <p:blipFill>
-          <a:blip r:embed="rId3" cstate="print">
-            <a:extLst/>
-          </a:blip>
+          <a:blip r:embed="rId3" cstate="print"/>
           <a:srcRect l="997" r="997"/>
           <a:stretch>
             <a:fillRect/>
@@ -5379,7 +5344,7 @@
           </a:ln>
           <a:extLst>
             <a:ext uri="{C572A759-6A51-4108-AA02-DFA0A04FC94B}">
-              <ma14:wrappingTextBoxFlag xmlns="" xmlns:m="http://schemas.openxmlformats.org/officeDocument/2006/math" xmlns:a14="http://schemas.microsoft.com/office/drawing/2010/main" xmlns:ma14="http://schemas.microsoft.com/office/mac/drawingml/2011/main" val="1"/>
+              <ma14:wrappingTextBoxFlag xmlns:ma14="http://schemas.microsoft.com/office/mac/drawingml/2011/main" xmlns:a14="http://schemas.microsoft.com/office/drawing/2010/main" xmlns:m="http://schemas.openxmlformats.org/officeDocument/2006/math" xmlns="" val="1"/>
             </a:ext>
           </a:extLst>
         </p:spPr>
@@ -5429,7 +5394,7 @@
           </a:ln>
           <a:extLst>
             <a:ext uri="{C572A759-6A51-4108-AA02-DFA0A04FC94B}">
-              <ma14:wrappingTextBoxFlag xmlns="" xmlns:m="http://schemas.openxmlformats.org/officeDocument/2006/math" xmlns:a14="http://schemas.microsoft.com/office/drawing/2010/main" xmlns:ma14="http://schemas.microsoft.com/office/mac/drawingml/2011/main" val="1"/>
+              <ma14:wrappingTextBoxFlag xmlns:ma14="http://schemas.microsoft.com/office/mac/drawingml/2011/main" xmlns:a14="http://schemas.microsoft.com/office/drawing/2010/main" xmlns:m="http://schemas.openxmlformats.org/officeDocument/2006/math" xmlns="" val="1"/>
             </a:ext>
           </a:extLst>
         </p:spPr>
@@ -5489,9 +5454,7 @@
           <p:nvPr/>
         </p:nvPicPr>
         <p:blipFill>
-          <a:blip r:embed="rId2" cstate="print">
-            <a:extLst/>
-          </a:blip>
+          <a:blip r:embed="rId2" cstate="print"/>
           <a:stretch>
             <a:fillRect/>
           </a:stretch>
@@ -5528,7 +5491,7 @@
           </a:ln>
           <a:extLst>
             <a:ext uri="{C572A759-6A51-4108-AA02-DFA0A04FC94B}">
-              <ma14:wrappingTextBoxFlag xmlns="" xmlns:m="http://schemas.openxmlformats.org/officeDocument/2006/math" xmlns:a14="http://schemas.microsoft.com/office/drawing/2010/main" xmlns:ma14="http://schemas.microsoft.com/office/mac/drawingml/2011/main" val="1"/>
+              <ma14:wrappingTextBoxFlag xmlns:ma14="http://schemas.microsoft.com/office/mac/drawingml/2011/main" xmlns:a14="http://schemas.microsoft.com/office/drawing/2010/main" xmlns:m="http://schemas.openxmlformats.org/officeDocument/2006/math" xmlns="" val="1"/>
             </a:ext>
           </a:extLst>
         </p:spPr>
@@ -5575,7 +5538,7 @@
           </a:ln>
           <a:extLst>
             <a:ext uri="{C572A759-6A51-4108-AA02-DFA0A04FC94B}">
-              <ma14:wrappingTextBoxFlag xmlns="" xmlns:m="http://schemas.openxmlformats.org/officeDocument/2006/math" xmlns:a14="http://schemas.microsoft.com/office/drawing/2010/main" xmlns:ma14="http://schemas.microsoft.com/office/mac/drawingml/2011/main" val="1"/>
+              <ma14:wrappingTextBoxFlag xmlns:ma14="http://schemas.microsoft.com/office/mac/drawingml/2011/main" xmlns:a14="http://schemas.microsoft.com/office/drawing/2010/main" xmlns:m="http://schemas.openxmlformats.org/officeDocument/2006/math" xmlns="" val="1"/>
             </a:ext>
           </a:extLst>
         </p:spPr>
@@ -5641,7 +5604,7 @@
           </a:ln>
           <a:extLst>
             <a:ext uri="{C572A759-6A51-4108-AA02-DFA0A04FC94B}">
-              <ma14:wrappingTextBoxFlag xmlns="" xmlns:m="http://schemas.openxmlformats.org/officeDocument/2006/math" xmlns:a14="http://schemas.microsoft.com/office/drawing/2010/main" xmlns:ma14="http://schemas.microsoft.com/office/mac/drawingml/2011/main" val="1"/>
+              <ma14:wrappingTextBoxFlag xmlns:ma14="http://schemas.microsoft.com/office/mac/drawingml/2011/main" xmlns:a14="http://schemas.microsoft.com/office/drawing/2010/main" xmlns:m="http://schemas.openxmlformats.org/officeDocument/2006/math" xmlns="" val="1"/>
             </a:ext>
           </a:extLst>
         </p:spPr>
@@ -5688,7 +5651,7 @@
           </a:ln>
           <a:extLst>
             <a:ext uri="{C572A759-6A51-4108-AA02-DFA0A04FC94B}">
-              <ma14:wrappingTextBoxFlag xmlns="" xmlns:m="http://schemas.openxmlformats.org/officeDocument/2006/math" xmlns:a14="http://schemas.microsoft.com/office/drawing/2010/main" xmlns:ma14="http://schemas.microsoft.com/office/mac/drawingml/2011/main" val="1"/>
+              <ma14:wrappingTextBoxFlag xmlns:ma14="http://schemas.microsoft.com/office/mac/drawingml/2011/main" xmlns:a14="http://schemas.microsoft.com/office/drawing/2010/main" xmlns:m="http://schemas.openxmlformats.org/officeDocument/2006/math" xmlns="" val="1"/>
             </a:ext>
           </a:extLst>
         </p:spPr>
@@ -5743,7 +5706,7 @@
           </a:ln>
           <a:extLst>
             <a:ext uri="{C572A759-6A51-4108-AA02-DFA0A04FC94B}">
-              <ma14:wrappingTextBoxFlag xmlns="" xmlns:m="http://schemas.openxmlformats.org/officeDocument/2006/math" xmlns:a14="http://schemas.microsoft.com/office/drawing/2010/main" xmlns:ma14="http://schemas.microsoft.com/office/mac/drawingml/2011/main" val="1"/>
+              <ma14:wrappingTextBoxFlag xmlns:ma14="http://schemas.microsoft.com/office/mac/drawingml/2011/main" xmlns:a14="http://schemas.microsoft.com/office/drawing/2010/main" xmlns:m="http://schemas.openxmlformats.org/officeDocument/2006/math" xmlns="" val="1"/>
             </a:ext>
           </a:extLst>
         </p:spPr>
@@ -5809,9 +5772,7 @@
           <p:nvPr/>
         </p:nvPicPr>
         <p:blipFill>
-          <a:blip r:embed="rId2" cstate="print">
-            <a:extLst/>
-          </a:blip>
+          <a:blip r:embed="rId2" cstate="print"/>
           <a:srcRect t="420" b="420"/>
           <a:stretch>
             <a:fillRect/>
@@ -5849,7 +5810,7 @@
           </a:ln>
           <a:extLst>
             <a:ext uri="{C572A759-6A51-4108-AA02-DFA0A04FC94B}">
-              <ma14:wrappingTextBoxFlag xmlns="" xmlns:m="http://schemas.openxmlformats.org/officeDocument/2006/math" xmlns:a14="http://schemas.microsoft.com/office/drawing/2010/main" xmlns:ma14="http://schemas.microsoft.com/office/mac/drawingml/2011/main" val="1"/>
+              <ma14:wrappingTextBoxFlag xmlns:ma14="http://schemas.microsoft.com/office/mac/drawingml/2011/main" xmlns:a14="http://schemas.microsoft.com/office/drawing/2010/main" xmlns:m="http://schemas.openxmlformats.org/officeDocument/2006/math" xmlns="" val="1"/>
             </a:ext>
           </a:extLst>
         </p:spPr>
@@ -6185,7 +6146,7 @@
           </a:ln>
           <a:extLst>
             <a:ext uri="{C572A759-6A51-4108-AA02-DFA0A04FC94B}">
-              <ma14:wrappingTextBoxFlag xmlns="" xmlns:m="http://schemas.openxmlformats.org/officeDocument/2006/math" xmlns:a14="http://schemas.microsoft.com/office/drawing/2010/main" xmlns:ma14="http://schemas.microsoft.com/office/mac/drawingml/2011/main" val="1"/>
+              <ma14:wrappingTextBoxFlag xmlns:ma14="http://schemas.microsoft.com/office/mac/drawingml/2011/main" xmlns:a14="http://schemas.microsoft.com/office/drawing/2010/main" xmlns:m="http://schemas.openxmlformats.org/officeDocument/2006/math" xmlns="" val="1"/>
             </a:ext>
           </a:extLst>
         </p:spPr>
@@ -6235,7 +6196,7 @@
           </a:ln>
           <a:extLst>
             <a:ext uri="{C572A759-6A51-4108-AA02-DFA0A04FC94B}">
-              <ma14:wrappingTextBoxFlag xmlns="" xmlns:m="http://schemas.openxmlformats.org/officeDocument/2006/math" xmlns:a14="http://schemas.microsoft.com/office/drawing/2010/main" xmlns:ma14="http://schemas.microsoft.com/office/mac/drawingml/2011/main" val="1"/>
+              <ma14:wrappingTextBoxFlag xmlns:ma14="http://schemas.microsoft.com/office/mac/drawingml/2011/main" xmlns:a14="http://schemas.microsoft.com/office/drawing/2010/main" xmlns:m="http://schemas.openxmlformats.org/officeDocument/2006/math" xmlns="" val="1"/>
             </a:ext>
           </a:extLst>
         </p:spPr>
@@ -6305,7 +6266,7 @@
           </a:ln>
           <a:extLst>
             <a:ext uri="{C572A759-6A51-4108-AA02-DFA0A04FC94B}">
-              <ma14:wrappingTextBoxFlag xmlns="" xmlns:m="http://schemas.openxmlformats.org/officeDocument/2006/math" xmlns:a14="http://schemas.microsoft.com/office/drawing/2010/main" xmlns:ma14="http://schemas.microsoft.com/office/mac/drawingml/2011/main" val="1"/>
+              <ma14:wrappingTextBoxFlag xmlns:ma14="http://schemas.microsoft.com/office/mac/drawingml/2011/main" xmlns:a14="http://schemas.microsoft.com/office/drawing/2010/main" xmlns:m="http://schemas.openxmlformats.org/officeDocument/2006/math" xmlns="" val="1"/>
             </a:ext>
           </a:extLst>
         </p:spPr>
@@ -6352,7 +6313,7 @@
           </a:ln>
           <a:extLst>
             <a:ext uri="{C572A759-6A51-4108-AA02-DFA0A04FC94B}">
-              <ma14:wrappingTextBoxFlag xmlns="" xmlns:m="http://schemas.openxmlformats.org/officeDocument/2006/math" xmlns:a14="http://schemas.microsoft.com/office/drawing/2010/main" xmlns:ma14="http://schemas.microsoft.com/office/mac/drawingml/2011/main" val="1"/>
+              <ma14:wrappingTextBoxFlag xmlns:ma14="http://schemas.microsoft.com/office/mac/drawingml/2011/main" xmlns:a14="http://schemas.microsoft.com/office/drawing/2010/main" xmlns:m="http://schemas.openxmlformats.org/officeDocument/2006/math" xmlns="" val="1"/>
             </a:ext>
           </a:extLst>
         </p:spPr>
@@ -6416,7 +6377,7 @@
           </a:ln>
           <a:extLst>
             <a:ext uri="{C572A759-6A51-4108-AA02-DFA0A04FC94B}">
-              <ma14:wrappingTextBoxFlag xmlns="" xmlns:m="http://schemas.openxmlformats.org/officeDocument/2006/math" xmlns:a14="http://schemas.microsoft.com/office/drawing/2010/main" xmlns:ma14="http://schemas.microsoft.com/office/mac/drawingml/2011/main" val="1"/>
+              <ma14:wrappingTextBoxFlag xmlns:ma14="http://schemas.microsoft.com/office/mac/drawingml/2011/main" xmlns:a14="http://schemas.microsoft.com/office/drawing/2010/main" xmlns:m="http://schemas.openxmlformats.org/officeDocument/2006/math" xmlns="" val="1"/>
             </a:ext>
           </a:extLst>
         </p:spPr>
@@ -6463,7 +6424,7 @@
           </a:ln>
           <a:extLst>
             <a:ext uri="{C572A759-6A51-4108-AA02-DFA0A04FC94B}">
-              <ma14:wrappingTextBoxFlag xmlns="" xmlns:m="http://schemas.openxmlformats.org/officeDocument/2006/math" xmlns:a14="http://schemas.microsoft.com/office/drawing/2010/main" xmlns:ma14="http://schemas.microsoft.com/office/mac/drawingml/2011/main" val="1"/>
+              <ma14:wrappingTextBoxFlag xmlns:ma14="http://schemas.microsoft.com/office/mac/drawingml/2011/main" xmlns:a14="http://schemas.microsoft.com/office/drawing/2010/main" xmlns:m="http://schemas.openxmlformats.org/officeDocument/2006/math" xmlns="" val="1"/>
             </a:ext>
           </a:extLst>
         </p:spPr>
@@ -6514,7 +6475,7 @@
           </a:ln>
           <a:extLst>
             <a:ext uri="{C572A759-6A51-4108-AA02-DFA0A04FC94B}">
-              <ma14:wrappingTextBoxFlag xmlns="" xmlns:m="http://schemas.openxmlformats.org/officeDocument/2006/math" xmlns:a14="http://schemas.microsoft.com/office/drawing/2010/main" xmlns:ma14="http://schemas.microsoft.com/office/mac/drawingml/2011/main" val="1"/>
+              <ma14:wrappingTextBoxFlag xmlns:ma14="http://schemas.microsoft.com/office/mac/drawingml/2011/main" xmlns:a14="http://schemas.microsoft.com/office/drawing/2010/main" xmlns:m="http://schemas.openxmlformats.org/officeDocument/2006/math" xmlns="" val="1"/>
             </a:ext>
           </a:extLst>
         </p:spPr>
@@ -6558,7 +6519,7 @@
           </a:ln>
           <a:extLst>
             <a:ext uri="{C572A759-6A51-4108-AA02-DFA0A04FC94B}">
-              <ma14:wrappingTextBoxFlag xmlns="" xmlns:m="http://schemas.openxmlformats.org/officeDocument/2006/math" xmlns:a14="http://schemas.microsoft.com/office/drawing/2010/main" xmlns:ma14="http://schemas.microsoft.com/office/mac/drawingml/2011/main" val="1"/>
+              <ma14:wrappingTextBoxFlag xmlns:ma14="http://schemas.microsoft.com/office/mac/drawingml/2011/main" xmlns:a14="http://schemas.microsoft.com/office/drawing/2010/main" xmlns:m="http://schemas.openxmlformats.org/officeDocument/2006/math" xmlns="" val="1"/>
             </a:ext>
           </a:extLst>
         </p:spPr>
@@ -6609,7 +6570,7 @@
           </a:ln>
           <a:extLst>
             <a:ext uri="{C572A759-6A51-4108-AA02-DFA0A04FC94B}">
-              <ma14:wrappingTextBoxFlag xmlns="" xmlns:m="http://schemas.openxmlformats.org/officeDocument/2006/math" xmlns:a14="http://schemas.microsoft.com/office/drawing/2010/main" xmlns:ma14="http://schemas.microsoft.com/office/mac/drawingml/2011/main" val="1"/>
+              <ma14:wrappingTextBoxFlag xmlns:ma14="http://schemas.microsoft.com/office/mac/drawingml/2011/main" xmlns:a14="http://schemas.microsoft.com/office/drawing/2010/main" xmlns:m="http://schemas.openxmlformats.org/officeDocument/2006/math" xmlns="" val="1"/>
             </a:ext>
           </a:extLst>
         </p:spPr>
@@ -6675,9 +6636,7 @@
           <p:nvPr/>
         </p:nvPicPr>
         <p:blipFill>
-          <a:blip r:embed="rId2" cstate="print">
-            <a:extLst/>
-          </a:blip>
+          <a:blip r:embed="rId2" cstate="print"/>
           <a:srcRect t="173" b="172"/>
           <a:stretch>
             <a:fillRect/>
@@ -6715,7 +6674,7 @@
           </a:ln>
           <a:extLst>
             <a:ext uri="{C572A759-6A51-4108-AA02-DFA0A04FC94B}">
-              <ma14:wrappingTextBoxFlag xmlns="" xmlns:m="http://schemas.openxmlformats.org/officeDocument/2006/math" xmlns:a14="http://schemas.microsoft.com/office/drawing/2010/main" xmlns:ma14="http://schemas.microsoft.com/office/mac/drawingml/2011/main" val="1"/>
+              <ma14:wrappingTextBoxFlag xmlns:ma14="http://schemas.microsoft.com/office/mac/drawingml/2011/main" xmlns:a14="http://schemas.microsoft.com/office/drawing/2010/main" xmlns:m="http://schemas.openxmlformats.org/officeDocument/2006/math" xmlns="" val="1"/>
             </a:ext>
           </a:extLst>
         </p:spPr>
@@ -6765,7 +6724,7 @@
           </a:ln>
           <a:extLst>
             <a:ext uri="{C572A759-6A51-4108-AA02-DFA0A04FC94B}">
-              <ma14:wrappingTextBoxFlag xmlns="" xmlns:m="http://schemas.openxmlformats.org/officeDocument/2006/math" xmlns:a14="http://schemas.microsoft.com/office/drawing/2010/main" xmlns:ma14="http://schemas.microsoft.com/office/mac/drawingml/2011/main" val="1"/>
+              <ma14:wrappingTextBoxFlag xmlns:ma14="http://schemas.microsoft.com/office/mac/drawingml/2011/main" xmlns:a14="http://schemas.microsoft.com/office/drawing/2010/main" xmlns:m="http://schemas.openxmlformats.org/officeDocument/2006/math" xmlns="" val="1"/>
             </a:ext>
           </a:extLst>
         </p:spPr>
@@ -6812,7 +6771,7 @@
           </a:ln>
           <a:extLst>
             <a:ext uri="{C572A759-6A51-4108-AA02-DFA0A04FC94B}">
-              <ma14:wrappingTextBoxFlag xmlns="" xmlns:m="http://schemas.openxmlformats.org/officeDocument/2006/math" xmlns:a14="http://schemas.microsoft.com/office/drawing/2010/main" xmlns:ma14="http://schemas.microsoft.com/office/mac/drawingml/2011/main" val="1"/>
+              <ma14:wrappingTextBoxFlag xmlns:ma14="http://schemas.microsoft.com/office/mac/drawingml/2011/main" xmlns:a14="http://schemas.microsoft.com/office/drawing/2010/main" xmlns:m="http://schemas.openxmlformats.org/officeDocument/2006/math" xmlns="" val="1"/>
             </a:ext>
           </a:extLst>
         </p:spPr>
@@ -6878,7 +6837,7 @@
           </a:ln>
           <a:extLst>
             <a:ext uri="{C572A759-6A51-4108-AA02-DFA0A04FC94B}">
-              <ma14:wrappingTextBoxFlag xmlns="" xmlns:m="http://schemas.openxmlformats.org/officeDocument/2006/math" xmlns:a14="http://schemas.microsoft.com/office/drawing/2010/main" xmlns:ma14="http://schemas.microsoft.com/office/mac/drawingml/2011/main" val="1"/>
+              <ma14:wrappingTextBoxFlag xmlns:ma14="http://schemas.microsoft.com/office/mac/drawingml/2011/main" xmlns:a14="http://schemas.microsoft.com/office/drawing/2010/main" xmlns:m="http://schemas.openxmlformats.org/officeDocument/2006/math" xmlns="" val="1"/>
             </a:ext>
           </a:extLst>
         </p:spPr>
@@ -6925,7 +6884,7 @@
           </a:ln>
           <a:extLst>
             <a:ext uri="{C572A759-6A51-4108-AA02-DFA0A04FC94B}">
-              <ma14:wrappingTextBoxFlag xmlns="" xmlns:m="http://schemas.openxmlformats.org/officeDocument/2006/math" xmlns:a14="http://schemas.microsoft.com/office/drawing/2010/main" xmlns:ma14="http://schemas.microsoft.com/office/mac/drawingml/2011/main" val="1"/>
+              <ma14:wrappingTextBoxFlag xmlns:ma14="http://schemas.microsoft.com/office/mac/drawingml/2011/main" xmlns:a14="http://schemas.microsoft.com/office/drawing/2010/main" xmlns:m="http://schemas.openxmlformats.org/officeDocument/2006/math" xmlns="" val="1"/>
             </a:ext>
           </a:extLst>
         </p:spPr>
@@ -7072,13 +7031,9 @@
             </a:r>
             <a:r>
               <a:rPr dirty="0"/>
-              <a:t> cause of death globally</a:t>
-            </a:r>
-            <a:r>
-              <a:rPr dirty="0" smtClean="0"/>
-              <a:t>!</a:t>
-            </a:r>
-            <a:endParaRPr lang="it-IT" dirty="0" smtClean="0"/>
+              <a:t> cause of death globally!</a:t>
+            </a:r>
+            <a:endParaRPr lang="it-IT" dirty="0"/>
           </a:p>
           <a:p>
             <a:pPr marL="0" indent="0">
@@ -7127,103 +7082,103 @@
               <a:t> of a person, and his future risk of heart disease, using </a:t>
             </a:r>
             <a:r>
-              <a:rPr lang="it-IT" dirty="0" err="1" smtClean="0"/>
+              <a:rPr lang="it-IT" dirty="0" err="1"/>
               <a:t>several</a:t>
             </a:r>
             <a:r>
-              <a:rPr lang="it-IT" dirty="0" smtClean="0"/>
+              <a:rPr lang="it-IT" dirty="0"/>
               <a:t> </a:t>
             </a:r>
             <a:r>
-              <a:rPr lang="it-IT" dirty="0" err="1" smtClean="0"/>
+              <a:rPr lang="it-IT" dirty="0" err="1"/>
               <a:t>model</a:t>
             </a:r>
             <a:r>
-              <a:rPr lang="it-IT" dirty="0" smtClean="0"/>
+              <a:rPr lang="it-IT" dirty="0"/>
               <a:t> </a:t>
             </a:r>
             <a:r>
-              <a:rPr lang="it-IT" dirty="0" err="1" smtClean="0"/>
+              <a:rPr lang="it-IT" dirty="0" err="1"/>
               <a:t>such</a:t>
             </a:r>
             <a:r>
-              <a:rPr lang="it-IT" dirty="0" smtClean="0"/>
+              <a:rPr lang="it-IT" dirty="0"/>
               <a:t> </a:t>
             </a:r>
             <a:r>
-              <a:rPr lang="it-IT" dirty="0" err="1" smtClean="0"/>
+              <a:rPr lang="it-IT" dirty="0" err="1"/>
               <a:t>as</a:t>
             </a:r>
             <a:r>
-              <a:rPr lang="it-IT" dirty="0" smtClean="0"/>
+              <a:rPr lang="it-IT" dirty="0"/>
               <a:t> </a:t>
             </a:r>
             <a:r>
-              <a:rPr lang="it-IT" i="1" dirty="0" err="1" smtClean="0"/>
+              <a:rPr lang="it-IT" i="1" dirty="0" err="1"/>
               <a:t>Logistic</a:t>
             </a:r>
             <a:r>
-              <a:rPr lang="it-IT" i="1" dirty="0" smtClean="0"/>
+              <a:rPr lang="it-IT" i="1" dirty="0"/>
               <a:t> </a:t>
             </a:r>
             <a:r>
-              <a:rPr lang="it-IT" i="1" dirty="0" err="1" smtClean="0"/>
+              <a:rPr lang="it-IT" i="1" dirty="0" err="1"/>
               <a:t>Regression</a:t>
             </a:r>
             <a:r>
-              <a:rPr lang="it-IT" i="1" dirty="0" smtClean="0"/>
+              <a:rPr lang="it-IT" i="1" dirty="0"/>
               <a:t>, </a:t>
             </a:r>
             <a:r>
-              <a:rPr lang="it-IT" i="1" dirty="0" err="1" smtClean="0"/>
+              <a:rPr lang="it-IT" i="1" dirty="0" err="1"/>
               <a:t>K-Nearest</a:t>
             </a:r>
             <a:r>
-              <a:rPr lang="it-IT" i="1" dirty="0" smtClean="0"/>
+              <a:rPr lang="it-IT" i="1" dirty="0"/>
               <a:t> </a:t>
             </a:r>
             <a:r>
-              <a:rPr lang="it-IT" i="1" dirty="0" err="1" smtClean="0"/>
+              <a:rPr lang="it-IT" i="1" dirty="0" err="1"/>
               <a:t>Neighbors</a:t>
             </a:r>
             <a:r>
-              <a:rPr lang="it-IT" i="1" dirty="0" smtClean="0"/>
+              <a:rPr lang="it-IT" i="1" dirty="0"/>
               <a:t>, </a:t>
             </a:r>
             <a:r>
-              <a:rPr lang="it-IT" i="1" dirty="0" err="1" smtClean="0"/>
+              <a:rPr lang="it-IT" i="1" dirty="0" err="1"/>
               <a:t>Support</a:t>
             </a:r>
             <a:r>
-              <a:rPr lang="it-IT" i="1" dirty="0" smtClean="0"/>
+              <a:rPr lang="it-IT" i="1" dirty="0"/>
               <a:t> </a:t>
             </a:r>
             <a:r>
-              <a:rPr lang="it-IT" i="1" dirty="0" err="1" smtClean="0"/>
+              <a:rPr lang="it-IT" i="1" dirty="0" err="1"/>
               <a:t>Vector</a:t>
             </a:r>
             <a:r>
-              <a:rPr lang="it-IT" i="1" dirty="0" smtClean="0"/>
+              <a:rPr lang="it-IT" i="1" dirty="0"/>
               <a:t> </a:t>
             </a:r>
             <a:r>
-              <a:rPr lang="it-IT" i="1" dirty="0" err="1" smtClean="0"/>
+              <a:rPr lang="it-IT" i="1" dirty="0" err="1"/>
               <a:t>Machine</a:t>
             </a:r>
             <a:r>
-              <a:rPr lang="it-IT" i="1" dirty="0" smtClean="0"/>
+              <a:rPr lang="it-IT" i="1" dirty="0"/>
               <a:t>,</a:t>
             </a:r>
             <a:r>
-              <a:rPr lang="it-IT" dirty="0" smtClean="0"/>
+              <a:rPr lang="it-IT" dirty="0"/>
               <a:t> </a:t>
             </a:r>
             <a:r>
-              <a:rPr lang="it-IT" dirty="0" err="1" smtClean="0"/>
+              <a:rPr lang="it-IT" dirty="0" err="1"/>
               <a:t>etc…</a:t>
             </a:r>
             <a:r>
-              <a:rPr lang="it-IT" dirty="0" smtClean="0"/>
+              <a:rPr lang="it-IT" dirty="0"/>
               <a:t>..</a:t>
             </a:r>
           </a:p>
@@ -7246,13 +7201,6 @@
     <a:masterClrMapping/>
   </p:clrMapOvr>
   <p:transition spd="med"/>
-  <p:timing>
-    <p:tnLst>
-      <p:par>
-        <p:cTn id="1" dur="indefinite" restart="never" nodeType="tmRoot"/>
-      </p:par>
-    </p:tnLst>
-  </p:timing>
 </p:sld>
 </file>
 
@@ -7282,9 +7230,7 @@
           <p:nvPr/>
         </p:nvPicPr>
         <p:blipFill>
-          <a:blip r:embed="rId2" cstate="print">
-            <a:extLst/>
-          </a:blip>
+          <a:blip r:embed="rId2" cstate="print"/>
           <a:srcRect t="1758" b="1758"/>
           <a:stretch>
             <a:fillRect/>
@@ -7322,7 +7268,7 @@
           </a:ln>
           <a:extLst>
             <a:ext uri="{C572A759-6A51-4108-AA02-DFA0A04FC94B}">
-              <ma14:wrappingTextBoxFlag xmlns="" xmlns:m="http://schemas.openxmlformats.org/officeDocument/2006/math" xmlns:a14="http://schemas.microsoft.com/office/drawing/2010/main" xmlns:ma14="http://schemas.microsoft.com/office/mac/drawingml/2011/main" val="1"/>
+              <ma14:wrappingTextBoxFlag xmlns:ma14="http://schemas.microsoft.com/office/mac/drawingml/2011/main" xmlns:a14="http://schemas.microsoft.com/office/drawing/2010/main" xmlns:m="http://schemas.openxmlformats.org/officeDocument/2006/math" xmlns="" val="1"/>
             </a:ext>
           </a:extLst>
         </p:spPr>
@@ -7372,7 +7318,7 @@
           </a:ln>
           <a:extLst>
             <a:ext uri="{C572A759-6A51-4108-AA02-DFA0A04FC94B}">
-              <ma14:wrappingTextBoxFlag xmlns="" xmlns:m="http://schemas.openxmlformats.org/officeDocument/2006/math" xmlns:a14="http://schemas.microsoft.com/office/drawing/2010/main" xmlns:ma14="http://schemas.microsoft.com/office/mac/drawingml/2011/main" val="1"/>
+              <ma14:wrappingTextBoxFlag xmlns:ma14="http://schemas.microsoft.com/office/mac/drawingml/2011/main" xmlns:a14="http://schemas.microsoft.com/office/drawing/2010/main" xmlns:m="http://schemas.openxmlformats.org/officeDocument/2006/math" xmlns="" val="1"/>
             </a:ext>
           </a:extLst>
         </p:spPr>
@@ -7734,7 +7680,7 @@
           </a:ln>
           <a:extLst>
             <a:ext uri="{C572A759-6A51-4108-AA02-DFA0A04FC94B}">
-              <ma14:wrappingTextBoxFlag xmlns="" xmlns:m="http://schemas.openxmlformats.org/officeDocument/2006/math" xmlns:a14="http://schemas.microsoft.com/office/drawing/2010/main" xmlns:ma14="http://schemas.microsoft.com/office/mac/drawingml/2011/main" val="1"/>
+              <ma14:wrappingTextBoxFlag xmlns:ma14="http://schemas.microsoft.com/office/mac/drawingml/2011/main" xmlns:a14="http://schemas.microsoft.com/office/drawing/2010/main" xmlns:m="http://schemas.openxmlformats.org/officeDocument/2006/math" xmlns="" val="1"/>
             </a:ext>
           </a:extLst>
         </p:spPr>
@@ -7781,7 +7727,7 @@
           </a:ln>
           <a:extLst>
             <a:ext uri="{C572A759-6A51-4108-AA02-DFA0A04FC94B}">
-              <ma14:wrappingTextBoxFlag xmlns="" xmlns:m="http://schemas.openxmlformats.org/officeDocument/2006/math" xmlns:a14="http://schemas.microsoft.com/office/drawing/2010/main" xmlns:ma14="http://schemas.microsoft.com/office/mac/drawingml/2011/main" val="1"/>
+              <ma14:wrappingTextBoxFlag xmlns:ma14="http://schemas.microsoft.com/office/mac/drawingml/2011/main" xmlns:a14="http://schemas.microsoft.com/office/drawing/2010/main" xmlns:m="http://schemas.openxmlformats.org/officeDocument/2006/math" xmlns="" val="1"/>
             </a:ext>
           </a:extLst>
         </p:spPr>
@@ -7845,7 +7791,7 @@
           </a:ln>
           <a:extLst>
             <a:ext uri="{C572A759-6A51-4108-AA02-DFA0A04FC94B}">
-              <ma14:wrappingTextBoxFlag xmlns="" xmlns:m="http://schemas.openxmlformats.org/officeDocument/2006/math" xmlns:a14="http://schemas.microsoft.com/office/drawing/2010/main" xmlns:ma14="http://schemas.microsoft.com/office/mac/drawingml/2011/main" val="1"/>
+              <ma14:wrappingTextBoxFlag xmlns:ma14="http://schemas.microsoft.com/office/mac/drawingml/2011/main" xmlns:a14="http://schemas.microsoft.com/office/drawing/2010/main" xmlns:m="http://schemas.openxmlformats.org/officeDocument/2006/math" xmlns="" val="1"/>
             </a:ext>
           </a:extLst>
         </p:spPr>
@@ -7892,7 +7838,7 @@
           </a:ln>
           <a:extLst>
             <a:ext uri="{C572A759-6A51-4108-AA02-DFA0A04FC94B}">
-              <ma14:wrappingTextBoxFlag xmlns="" xmlns:m="http://schemas.openxmlformats.org/officeDocument/2006/math" xmlns:a14="http://schemas.microsoft.com/office/drawing/2010/main" xmlns:ma14="http://schemas.microsoft.com/office/mac/drawingml/2011/main" val="1"/>
+              <ma14:wrappingTextBoxFlag xmlns:ma14="http://schemas.microsoft.com/office/mac/drawingml/2011/main" xmlns:a14="http://schemas.microsoft.com/office/drawing/2010/main" xmlns:m="http://schemas.openxmlformats.org/officeDocument/2006/math" xmlns="" val="1"/>
             </a:ext>
           </a:extLst>
         </p:spPr>
@@ -7943,7 +7889,7 @@
           </a:ln>
           <a:extLst>
             <a:ext uri="{C572A759-6A51-4108-AA02-DFA0A04FC94B}">
-              <ma14:wrappingTextBoxFlag xmlns="" xmlns:m="http://schemas.openxmlformats.org/officeDocument/2006/math" xmlns:a14="http://schemas.microsoft.com/office/drawing/2010/main" xmlns:ma14="http://schemas.microsoft.com/office/mac/drawingml/2011/main" val="1"/>
+              <ma14:wrappingTextBoxFlag xmlns:ma14="http://schemas.microsoft.com/office/mac/drawingml/2011/main" xmlns:a14="http://schemas.microsoft.com/office/drawing/2010/main" xmlns:m="http://schemas.openxmlformats.org/officeDocument/2006/math" xmlns="" val="1"/>
             </a:ext>
           </a:extLst>
         </p:spPr>
@@ -7987,7 +7933,7 @@
           </a:ln>
           <a:extLst>
             <a:ext uri="{C572A759-6A51-4108-AA02-DFA0A04FC94B}">
-              <ma14:wrappingTextBoxFlag xmlns="" xmlns:m="http://schemas.openxmlformats.org/officeDocument/2006/math" xmlns:a14="http://schemas.microsoft.com/office/drawing/2010/main" xmlns:ma14="http://schemas.microsoft.com/office/mac/drawingml/2011/main" val="1"/>
+              <ma14:wrappingTextBoxFlag xmlns:ma14="http://schemas.microsoft.com/office/mac/drawingml/2011/main" xmlns:a14="http://schemas.microsoft.com/office/drawing/2010/main" xmlns:m="http://schemas.openxmlformats.org/officeDocument/2006/math" xmlns="" val="1"/>
             </a:ext>
           </a:extLst>
         </p:spPr>
@@ -8038,7 +7984,7 @@
           </a:ln>
           <a:extLst>
             <a:ext uri="{C572A759-6A51-4108-AA02-DFA0A04FC94B}">
-              <ma14:wrappingTextBoxFlag xmlns="" xmlns:m="http://schemas.openxmlformats.org/officeDocument/2006/math" xmlns:a14="http://schemas.microsoft.com/office/drawing/2010/main" xmlns:ma14="http://schemas.microsoft.com/office/mac/drawingml/2011/main" val="1"/>
+              <ma14:wrappingTextBoxFlag xmlns:ma14="http://schemas.microsoft.com/office/mac/drawingml/2011/main" xmlns:a14="http://schemas.microsoft.com/office/drawing/2010/main" xmlns:m="http://schemas.openxmlformats.org/officeDocument/2006/math" xmlns="" val="1"/>
             </a:ext>
           </a:extLst>
         </p:spPr>
@@ -8114,7 +8060,7 @@
           </a:ln>
           <a:extLst>
             <a:ext uri="{C572A759-6A51-4108-AA02-DFA0A04FC94B}">
-              <ma14:wrappingTextBoxFlag xmlns="" xmlns:m="http://schemas.openxmlformats.org/officeDocument/2006/math" xmlns:a14="http://schemas.microsoft.com/office/drawing/2010/main" xmlns:ma14="http://schemas.microsoft.com/office/mac/drawingml/2011/main" val="1"/>
+              <ma14:wrappingTextBoxFlag xmlns:ma14="http://schemas.microsoft.com/office/mac/drawingml/2011/main" xmlns:a14="http://schemas.microsoft.com/office/drawing/2010/main" xmlns:m="http://schemas.openxmlformats.org/officeDocument/2006/math" xmlns="" val="1"/>
             </a:ext>
           </a:extLst>
         </p:spPr>
@@ -8164,7 +8110,7 @@
           </a:ln>
           <a:extLst>
             <a:ext uri="{C572A759-6A51-4108-AA02-DFA0A04FC94B}">
-              <ma14:wrappingTextBoxFlag xmlns="" xmlns:m="http://schemas.openxmlformats.org/officeDocument/2006/math" xmlns:a14="http://schemas.microsoft.com/office/drawing/2010/main" xmlns:ma14="http://schemas.microsoft.com/office/mac/drawingml/2011/main" val="1"/>
+              <ma14:wrappingTextBoxFlag xmlns:ma14="http://schemas.microsoft.com/office/mac/drawingml/2011/main" xmlns:a14="http://schemas.microsoft.com/office/drawing/2010/main" xmlns:m="http://schemas.openxmlformats.org/officeDocument/2006/math" xmlns="" val="1"/>
             </a:ext>
           </a:extLst>
         </p:spPr>
@@ -8211,7 +8157,7 @@
           </a:ln>
           <a:extLst>
             <a:ext uri="{C572A759-6A51-4108-AA02-DFA0A04FC94B}">
-              <ma14:wrappingTextBoxFlag xmlns="" xmlns:m="http://schemas.openxmlformats.org/officeDocument/2006/math" xmlns:a14="http://schemas.microsoft.com/office/drawing/2010/main" xmlns:ma14="http://schemas.microsoft.com/office/mac/drawingml/2011/main" val="1"/>
+              <ma14:wrappingTextBoxFlag xmlns:ma14="http://schemas.microsoft.com/office/mac/drawingml/2011/main" xmlns:a14="http://schemas.microsoft.com/office/drawing/2010/main" xmlns:m="http://schemas.openxmlformats.org/officeDocument/2006/math" xmlns="" val="1"/>
             </a:ext>
           </a:extLst>
         </p:spPr>
@@ -8269,7 +8215,7 @@
           </a:ln>
           <a:extLst>
             <a:ext uri="{C572A759-6A51-4108-AA02-DFA0A04FC94B}">
-              <ma14:wrappingTextBoxFlag xmlns="" xmlns:m="http://schemas.openxmlformats.org/officeDocument/2006/math" xmlns:a14="http://schemas.microsoft.com/office/drawing/2010/main" xmlns:ma14="http://schemas.microsoft.com/office/mac/drawingml/2011/main" val="1"/>
+              <ma14:wrappingTextBoxFlag xmlns:ma14="http://schemas.microsoft.com/office/mac/drawingml/2011/main" xmlns:a14="http://schemas.microsoft.com/office/drawing/2010/main" xmlns:m="http://schemas.openxmlformats.org/officeDocument/2006/math" xmlns="" val="1"/>
             </a:ext>
           </a:extLst>
         </p:spPr>
@@ -8316,7 +8262,7 @@
           </a:ln>
           <a:extLst>
             <a:ext uri="{C572A759-6A51-4108-AA02-DFA0A04FC94B}">
-              <ma14:wrappingTextBoxFlag xmlns="" xmlns:m="http://schemas.openxmlformats.org/officeDocument/2006/math" xmlns:a14="http://schemas.microsoft.com/office/drawing/2010/main" xmlns:ma14="http://schemas.microsoft.com/office/mac/drawingml/2011/main" val="1"/>
+              <ma14:wrappingTextBoxFlag xmlns:ma14="http://schemas.microsoft.com/office/mac/drawingml/2011/main" xmlns:a14="http://schemas.microsoft.com/office/drawing/2010/main" xmlns:m="http://schemas.openxmlformats.org/officeDocument/2006/math" xmlns="" val="1"/>
             </a:ext>
           </a:extLst>
         </p:spPr>
@@ -8361,9 +8307,7 @@
           <p:nvPr/>
         </p:nvPicPr>
         <p:blipFill>
-          <a:blip r:embed="rId2" cstate="print">
-            <a:extLst/>
-          </a:blip>
+          <a:blip r:embed="rId2" cstate="print"/>
           <a:stretch>
             <a:fillRect/>
           </a:stretch>
@@ -8426,7 +8370,7 @@
           </a:ln>
           <a:extLst>
             <a:ext uri="{C572A759-6A51-4108-AA02-DFA0A04FC94B}">
-              <ma14:wrappingTextBoxFlag xmlns="" xmlns:m="http://schemas.openxmlformats.org/officeDocument/2006/math" xmlns:a14="http://schemas.microsoft.com/office/drawing/2010/main" xmlns:ma14="http://schemas.microsoft.com/office/mac/drawingml/2011/main" val="1"/>
+              <ma14:wrappingTextBoxFlag xmlns:ma14="http://schemas.microsoft.com/office/mac/drawingml/2011/main" xmlns:a14="http://schemas.microsoft.com/office/drawing/2010/main" xmlns:m="http://schemas.openxmlformats.org/officeDocument/2006/math" xmlns="" val="1"/>
             </a:ext>
           </a:extLst>
         </p:spPr>
@@ -8476,7 +8420,7 @@
           </a:ln>
           <a:extLst>
             <a:ext uri="{C572A759-6A51-4108-AA02-DFA0A04FC94B}">
-              <ma14:wrappingTextBoxFlag xmlns="" xmlns:m="http://schemas.openxmlformats.org/officeDocument/2006/math" xmlns:a14="http://schemas.microsoft.com/office/drawing/2010/main" xmlns:ma14="http://schemas.microsoft.com/office/mac/drawingml/2011/main" val="1"/>
+              <ma14:wrappingTextBoxFlag xmlns:ma14="http://schemas.microsoft.com/office/mac/drawingml/2011/main" xmlns:a14="http://schemas.microsoft.com/office/drawing/2010/main" xmlns:m="http://schemas.openxmlformats.org/officeDocument/2006/math" xmlns="" val="1"/>
             </a:ext>
           </a:extLst>
         </p:spPr>
@@ -8510,9 +8454,7 @@
           <p:nvPr/>
         </p:nvPicPr>
         <p:blipFill>
-          <a:blip r:embed="rId2" cstate="print">
-            <a:extLst/>
-          </a:blip>
+          <a:blip r:embed="rId2" cstate="print"/>
           <a:stretch>
             <a:fillRect/>
           </a:stretch>
@@ -8596,9 +8538,7 @@
           </p:nvPr>
         </p:nvPicPr>
         <p:blipFill>
-          <a:blip r:embed="rId2" cstate="print">
-            <a:extLst/>
-          </a:blip>
+          <a:blip r:embed="rId2" cstate="print"/>
           <a:srcRect l="17313" r="17313"/>
           <a:stretch>
             <a:fillRect/>
@@ -8703,7 +8643,7 @@
           </a:ln>
           <a:extLst>
             <a:ext uri="{C572A759-6A51-4108-AA02-DFA0A04FC94B}">
-              <ma14:wrappingTextBoxFlag xmlns="" xmlns:m="http://schemas.openxmlformats.org/officeDocument/2006/math" xmlns:a14="http://schemas.microsoft.com/office/drawing/2010/main" xmlns:ma14="http://schemas.microsoft.com/office/mac/drawingml/2011/main" val="1"/>
+              <ma14:wrappingTextBoxFlag xmlns:ma14="http://schemas.microsoft.com/office/mac/drawingml/2011/main" xmlns:a14="http://schemas.microsoft.com/office/drawing/2010/main" xmlns:m="http://schemas.openxmlformats.org/officeDocument/2006/math" xmlns="" val="1"/>
             </a:ext>
           </a:extLst>
         </p:spPr>
@@ -9082,7 +9022,7 @@
           </a:ln>
           <a:extLst>
             <a:ext uri="{C572A759-6A51-4108-AA02-DFA0A04FC94B}">
-              <ma14:wrappingTextBoxFlag xmlns="" xmlns:m="http://schemas.openxmlformats.org/officeDocument/2006/math" xmlns:a14="http://schemas.microsoft.com/office/drawing/2010/main" xmlns:ma14="http://schemas.microsoft.com/office/mac/drawingml/2011/main" val="1"/>
+              <ma14:wrappingTextBoxFlag xmlns:ma14="http://schemas.microsoft.com/office/mac/drawingml/2011/main" xmlns:a14="http://schemas.microsoft.com/office/drawing/2010/main" xmlns:m="http://schemas.openxmlformats.org/officeDocument/2006/math" xmlns="" val="1"/>
             </a:ext>
           </a:extLst>
         </p:spPr>
@@ -9117,9 +9057,7 @@
           </p:nvPr>
         </p:nvPicPr>
         <p:blipFill>
-          <a:blip r:embed="rId2" cstate="print">
-            <a:extLst/>
-          </a:blip>
+          <a:blip r:embed="rId2" cstate="print"/>
           <a:stretch>
             <a:fillRect/>
           </a:stretch>
@@ -9229,9 +9167,7 @@
           <p:nvPr/>
         </p:nvPicPr>
         <p:blipFill>
-          <a:blip r:embed="rId2" cstate="print">
-            <a:extLst/>
-          </a:blip>
+          <a:blip r:embed="rId2" cstate="print"/>
           <a:stretch>
             <a:fillRect/>
           </a:stretch>
@@ -9393,7 +9329,7 @@
           </a:ln>
           <a:extLst>
             <a:ext uri="{C572A759-6A51-4108-AA02-DFA0A04FC94B}">
-              <ma14:wrappingTextBoxFlag xmlns="" xmlns:m="http://schemas.openxmlformats.org/officeDocument/2006/math" xmlns:a14="http://schemas.microsoft.com/office/drawing/2010/main" xmlns:ma14="http://schemas.microsoft.com/office/mac/drawingml/2011/main" val="1"/>
+              <ma14:wrappingTextBoxFlag xmlns:ma14="http://schemas.microsoft.com/office/mac/drawingml/2011/main" xmlns:a14="http://schemas.microsoft.com/office/drawing/2010/main" xmlns:m="http://schemas.openxmlformats.org/officeDocument/2006/math" xmlns="" val="1"/>
             </a:ext>
           </a:extLst>
         </p:spPr>
@@ -9428,9 +9364,7 @@
           </p:nvPr>
         </p:nvPicPr>
         <p:blipFill>
-          <a:blip r:embed="rId2" cstate="print">
-            <a:extLst/>
-          </a:blip>
+          <a:blip r:embed="rId2" cstate="print"/>
           <a:srcRect l="17313" r="17313"/>
           <a:stretch>
             <a:fillRect/>
@@ -9735,7 +9669,7 @@
           </a:ln>
           <a:extLst>
             <a:ext uri="{C572A759-6A51-4108-AA02-DFA0A04FC94B}">
-              <ma14:wrappingTextBoxFlag xmlns="" xmlns:m="http://schemas.openxmlformats.org/officeDocument/2006/math" xmlns:a14="http://schemas.microsoft.com/office/drawing/2010/main" xmlns:ma14="http://schemas.microsoft.com/office/mac/drawingml/2011/main" val="1"/>
+              <ma14:wrappingTextBoxFlag xmlns:ma14="http://schemas.microsoft.com/office/mac/drawingml/2011/main" xmlns:a14="http://schemas.microsoft.com/office/drawing/2010/main" xmlns:m="http://schemas.openxmlformats.org/officeDocument/2006/math" xmlns="" val="1"/>
             </a:ext>
           </a:extLst>
         </p:spPr>
@@ -9906,13 +9840,6 @@
     <a:masterClrMapping/>
   </p:clrMapOvr>
   <p:transition spd="med"/>
-  <p:timing>
-    <p:tnLst>
-      <p:par>
-        <p:cTn id="1" dur="indefinite" restart="never" nodeType="tmRoot"/>
-      </p:par>
-    </p:tnLst>
-  </p:timing>
 </p:sld>
 </file>
 
@@ -10059,7 +9986,7 @@
           </a:ln>
           <a:extLst>
             <a:ext uri="{C572A759-6A51-4108-AA02-DFA0A04FC94B}">
-              <ma14:wrappingTextBoxFlag xmlns="" xmlns:m="http://schemas.openxmlformats.org/officeDocument/2006/math" xmlns:a14="http://schemas.microsoft.com/office/drawing/2010/main" xmlns:ma14="http://schemas.microsoft.com/office/mac/drawingml/2011/main" val="1"/>
+              <ma14:wrappingTextBoxFlag xmlns:ma14="http://schemas.microsoft.com/office/mac/drawingml/2011/main" xmlns:a14="http://schemas.microsoft.com/office/drawing/2010/main" xmlns:m="http://schemas.openxmlformats.org/officeDocument/2006/math" xmlns="" val="1"/>
             </a:ext>
           </a:extLst>
         </p:spPr>
@@ -10094,9 +10021,7 @@
           </p:nvPr>
         </p:nvPicPr>
         <p:blipFill>
-          <a:blip r:embed="rId2" cstate="print">
-            <a:extLst/>
-          </a:blip>
+          <a:blip r:embed="rId2" cstate="print"/>
           <a:stretch>
             <a:fillRect/>
           </a:stretch>
@@ -10199,15 +10124,25 @@
       </p:sp>
       <p:pic>
         <p:nvPicPr>
-          <p:cNvPr id="267" name="Picture 7" descr="Picture 7"/>
+          <p:cNvPr id="3" name="Picture 2" descr="Chart, line chart&#10;&#10;Description automatically generated">
+            <a:extLst>
+              <a:ext uri="{FF2B5EF4-FFF2-40B4-BE49-F238E27FC236}">
+                <a16:creationId xmlns:a16="http://schemas.microsoft.com/office/drawing/2014/main" id="{CD6874F3-D645-4928-8CC4-3393010B682A}"/>
+              </a:ext>
+            </a:extLst>
+          </p:cNvPr>
           <p:cNvPicPr>
             <a:picLocks noChangeAspect="1"/>
           </p:cNvPicPr>
           <p:nvPr/>
         </p:nvPicPr>
         <p:blipFill>
-          <a:blip r:embed="rId2" cstate="print">
-            <a:extLst/>
+          <a:blip r:embed="rId2">
+            <a:extLst>
+              <a:ext uri="{28A0092B-C50C-407E-A947-70E740481C1C}">
+                <a14:useLocalDpi xmlns:a14="http://schemas.microsoft.com/office/drawing/2010/main" val="0"/>
+              </a:ext>
+            </a:extLst>
           </a:blip>
           <a:stretch>
             <a:fillRect/>
@@ -10215,18 +10150,205 @@
         </p:blipFill>
         <p:spPr>
           <a:xfrm>
-            <a:off x="0" y="1517485"/>
-            <a:ext cx="9144000" cy="5141021"/>
-          </a:xfrm>
-          <a:prstGeom prst="rect">
-            <a:avLst/>
-          </a:prstGeom>
-          <a:ln w="12700">
-            <a:miter lim="400000"/>
-          </a:ln>
+            <a:off x="0" y="1517486"/>
+            <a:ext cx="9144000" cy="5141019"/>
+          </a:xfrm>
+          <a:prstGeom prst="rect">
+            <a:avLst/>
+          </a:prstGeom>
         </p:spPr>
       </p:pic>
     </p:spTree>
+  </p:cSld>
+  <p:clrMapOvr>
+    <a:masterClrMapping/>
+  </p:clrMapOvr>
+  <p:transition spd="med"/>
+</p:sld>
+</file>
+
+<file path=ppt/slides/slide32.xml><?xml version="1.0" encoding="utf-8"?>
+<p:sld xmlns:a="http://schemas.openxmlformats.org/drawingml/2006/main" xmlns:r="http://schemas.openxmlformats.org/officeDocument/2006/relationships" xmlns:p="http://schemas.openxmlformats.org/presentationml/2006/main">
+  <p:cSld>
+    <p:spTree>
+      <p:nvGrpSpPr>
+        <p:cNvPr id="1" name=""/>
+        <p:cNvGrpSpPr/>
+        <p:nvPr/>
+      </p:nvGrpSpPr>
+      <p:grpSpPr>
+        <a:xfrm>
+          <a:off x="0" y="0"/>
+          <a:ext cx="0" cy="0"/>
+          <a:chOff x="0" y="0"/>
+          <a:chExt cx="0" cy="0"/>
+        </a:xfrm>
+      </p:grpSpPr>
+      <p:sp>
+        <p:nvSpPr>
+          <p:cNvPr id="6" name="Title 5">
+            <a:extLst>
+              <a:ext uri="{FF2B5EF4-FFF2-40B4-BE49-F238E27FC236}">
+                <a16:creationId xmlns:a16="http://schemas.microsoft.com/office/drawing/2014/main" id="{EF653355-0059-4A90-ABC3-1451EB5373CC}"/>
+              </a:ext>
+            </a:extLst>
+          </p:cNvPr>
+          <p:cNvSpPr>
+            <a:spLocks noGrp="1"/>
+          </p:cNvSpPr>
+          <p:nvPr>
+            <p:ph type="title"/>
+          </p:nvPr>
+        </p:nvSpPr>
+        <p:spPr/>
+        <p:txBody>
+          <a:bodyPr/>
+          <a:lstStyle/>
+          <a:p>
+            <a:r>
+              <a:rPr lang="en-US" dirty="0"/>
+              <a:t>F1 and Accuracy Comparisons</a:t>
+            </a:r>
+          </a:p>
+        </p:txBody>
+      </p:sp>
+      <p:sp>
+        <p:nvSpPr>
+          <p:cNvPr id="7" name="Text Placeholder 6">
+            <a:extLst>
+              <a:ext uri="{FF2B5EF4-FFF2-40B4-BE49-F238E27FC236}">
+                <a16:creationId xmlns:a16="http://schemas.microsoft.com/office/drawing/2014/main" id="{952C28E7-0270-4E27-A759-93485E79BB9E}"/>
+              </a:ext>
+            </a:extLst>
+          </p:cNvPr>
+          <p:cNvSpPr>
+            <a:spLocks noGrp="1"/>
+          </p:cNvSpPr>
+          <p:nvPr>
+            <p:ph type="body" sz="quarter" idx="1"/>
+          </p:nvPr>
+        </p:nvSpPr>
+        <p:spPr/>
+        <p:txBody>
+          <a:bodyPr/>
+          <a:lstStyle/>
+          <a:p>
+            <a:r>
+              <a:rPr lang="en-US" dirty="0"/>
+              <a:t>F1</a:t>
+            </a:r>
+          </a:p>
+        </p:txBody>
+      </p:sp>
+      <p:sp>
+        <p:nvSpPr>
+          <p:cNvPr id="8" name="Text Placeholder 7">
+            <a:extLst>
+              <a:ext uri="{FF2B5EF4-FFF2-40B4-BE49-F238E27FC236}">
+                <a16:creationId xmlns:a16="http://schemas.microsoft.com/office/drawing/2014/main" id="{0AF480C8-F461-45B0-B0F2-F10C89FE9866}"/>
+              </a:ext>
+            </a:extLst>
+          </p:cNvPr>
+          <p:cNvSpPr>
+            <a:spLocks noGrp="1"/>
+          </p:cNvSpPr>
+          <p:nvPr>
+            <p:ph type="body" sz="quarter" idx="13"/>
+          </p:nvPr>
+        </p:nvSpPr>
+        <p:spPr/>
+        <p:txBody>
+          <a:bodyPr/>
+          <a:lstStyle/>
+          <a:p>
+            <a:pPr marL="118872" indent="0">
+              <a:buNone/>
+            </a:pPr>
+            <a:r>
+              <a:rPr lang="en-US" dirty="0"/>
+              <a:t>Accuracy</a:t>
+            </a:r>
+          </a:p>
+        </p:txBody>
+      </p:sp>
+      <p:pic>
+        <p:nvPicPr>
+          <p:cNvPr id="10" name="Picture 9" descr="Chart, bar chart&#10;&#10;Description automatically generated">
+            <a:extLst>
+              <a:ext uri="{FF2B5EF4-FFF2-40B4-BE49-F238E27FC236}">
+                <a16:creationId xmlns:a16="http://schemas.microsoft.com/office/drawing/2014/main" id="{53E6EC72-5581-4ED7-B467-7C3FA644A99F}"/>
+              </a:ext>
+            </a:extLst>
+          </p:cNvPr>
+          <p:cNvPicPr>
+            <a:picLocks noChangeAspect="1"/>
+          </p:cNvPicPr>
+          <p:nvPr/>
+        </p:nvPicPr>
+        <p:blipFill>
+          <a:blip r:embed="rId2">
+            <a:extLst>
+              <a:ext uri="{28A0092B-C50C-407E-A947-70E740481C1C}">
+                <a14:useLocalDpi xmlns:a14="http://schemas.microsoft.com/office/drawing/2010/main" val="0"/>
+              </a:ext>
+            </a:extLst>
+          </a:blip>
+          <a:stretch>
+            <a:fillRect/>
+          </a:stretch>
+        </p:blipFill>
+        <p:spPr>
+          <a:xfrm>
+            <a:off x="0" y="2414344"/>
+            <a:ext cx="4571999" cy="4291255"/>
+          </a:xfrm>
+          <a:prstGeom prst="rect">
+            <a:avLst/>
+          </a:prstGeom>
+        </p:spPr>
+      </p:pic>
+      <p:pic>
+        <p:nvPicPr>
+          <p:cNvPr id="12" name="Picture 11" descr="Chart, bar chart&#10;&#10;Description automatically generated">
+            <a:extLst>
+              <a:ext uri="{FF2B5EF4-FFF2-40B4-BE49-F238E27FC236}">
+                <a16:creationId xmlns:a16="http://schemas.microsoft.com/office/drawing/2014/main" id="{98FB2628-9A34-4326-B1BB-2E53CF3DC701}"/>
+              </a:ext>
+            </a:extLst>
+          </p:cNvPr>
+          <p:cNvPicPr>
+            <a:picLocks noChangeAspect="1"/>
+          </p:cNvPicPr>
+          <p:nvPr/>
+        </p:nvPicPr>
+        <p:blipFill>
+          <a:blip r:embed="rId3">
+            <a:extLst>
+              <a:ext uri="{28A0092B-C50C-407E-A947-70E740481C1C}">
+                <a14:useLocalDpi xmlns:a14="http://schemas.microsoft.com/office/drawing/2010/main" val="0"/>
+              </a:ext>
+            </a:extLst>
+          </a:blip>
+          <a:stretch>
+            <a:fillRect/>
+          </a:stretch>
+        </p:blipFill>
+        <p:spPr>
+          <a:xfrm>
+            <a:off x="4379911" y="2414345"/>
+            <a:ext cx="4572001" cy="4291254"/>
+          </a:xfrm>
+          <a:prstGeom prst="rect">
+            <a:avLst/>
+          </a:prstGeom>
+        </p:spPr>
+      </p:pic>
+    </p:spTree>
+    <p:extLst>
+      <p:ext uri="{BB962C8B-B14F-4D97-AF65-F5344CB8AC3E}">
+        <p14:creationId xmlns:p14="http://schemas.microsoft.com/office/powerpoint/2010/main" val="4147429674"/>
+      </p:ext>
+    </p:extLst>
   </p:cSld>
   <p:clrMapOvr>
     <a:masterClrMapping/>
@@ -10333,18 +10455,13 @@
             </a:pPr>
             <a:r>
               <a:rPr dirty="0"/>
-              <a:t>The dataset </a:t>
-            </a:r>
-            <a:r>
-              <a:rPr dirty="0" smtClean="0"/>
-              <a:t>consist</a:t>
-            </a:r>
-            <a:r>
-              <a:rPr lang="it-IT" smtClean="0"/>
+              <a:t>The dataset consist</a:t>
+            </a:r>
+            <a:r>
+              <a:rPr lang="it-IT"/>
               <a:t>s</a:t>
             </a:r>
             <a:r>
-              <a:rPr smtClean="0"/>
               <a:t> </a:t>
             </a:r>
             <a:r>
@@ -10440,13 +10557,6 @@
     <a:masterClrMapping/>
   </p:clrMapOvr>
   <p:transition spd="med"/>
-  <p:timing>
-    <p:tnLst>
-      <p:par>
-        <p:cTn id="1" dur="indefinite" restart="never" nodeType="tmRoot"/>
-      </p:par>
-    </p:tnLst>
-  </p:timing>
 </p:sld>
 </file>
 
@@ -10527,9 +10637,7 @@
           <p:nvPr/>
         </p:nvPicPr>
         <p:blipFill>
-          <a:blip r:embed="rId2" cstate="print">
-            <a:extLst/>
-          </a:blip>
+          <a:blip r:embed="rId2" cstate="print"/>
           <a:stretch>
             <a:fillRect/>
           </a:stretch>
@@ -10553,13 +10661,6 @@
     <a:masterClrMapping/>
   </p:clrMapOvr>
   <p:transition spd="med"/>
-  <p:timing>
-    <p:tnLst>
-      <p:par>
-        <p:cTn id="1" dur="indefinite" restart="never" nodeType="tmRoot"/>
-      </p:par>
-    </p:tnLst>
-  </p:timing>
 </p:sld>
 </file>
 
@@ -10640,9 +10741,7 @@
           <p:nvPr/>
         </p:nvPicPr>
         <p:blipFill>
-          <a:blip r:embed="rId2" cstate="print">
-            <a:extLst/>
-          </a:blip>
+          <a:blip r:embed="rId2" cstate="print"/>
           <a:stretch>
             <a:fillRect/>
           </a:stretch>
@@ -10669,9 +10768,7 @@
           <p:nvPr/>
         </p:nvPicPr>
         <p:blipFill>
-          <a:blip r:embed="rId3" cstate="print">
-            <a:extLst/>
-          </a:blip>
+          <a:blip r:embed="rId3" cstate="print"/>
           <a:stretch>
             <a:fillRect/>
           </a:stretch>
@@ -10695,13 +10792,6 @@
     <a:masterClrMapping/>
   </p:clrMapOvr>
   <p:transition spd="med"/>
-  <p:timing>
-    <p:tnLst>
-      <p:par>
-        <p:cTn id="1" dur="indefinite" restart="never" nodeType="tmRoot"/>
-      </p:par>
-    </p:tnLst>
-  </p:timing>
 </p:sld>
 </file>
 
@@ -10782,7 +10872,7 @@
           </a:ln>
           <a:extLst>
             <a:ext uri="{C572A759-6A51-4108-AA02-DFA0A04FC94B}">
-              <ma14:wrappingTextBoxFlag xmlns="" xmlns:m="http://schemas.openxmlformats.org/officeDocument/2006/math" xmlns:a14="http://schemas.microsoft.com/office/drawing/2010/main" xmlns:ma14="http://schemas.microsoft.com/office/mac/drawingml/2011/main" val="1"/>
+              <ma14:wrappingTextBoxFlag xmlns:ma14="http://schemas.microsoft.com/office/mac/drawingml/2011/main" xmlns:a14="http://schemas.microsoft.com/office/drawing/2010/main" xmlns:m="http://schemas.openxmlformats.org/officeDocument/2006/math" xmlns="" val="1"/>
             </a:ext>
           </a:extLst>
         </p:spPr>
@@ -10828,9 +10918,7 @@
           <p:nvPr/>
         </p:nvPicPr>
         <p:blipFill>
-          <a:blip r:embed="rId2" cstate="print">
-            <a:extLst/>
-          </a:blip>
+          <a:blip r:embed="rId2" cstate="print"/>
           <a:stretch>
             <a:fillRect/>
           </a:stretch>
@@ -10867,7 +10955,7 @@
           </a:ln>
           <a:extLst>
             <a:ext uri="{C572A759-6A51-4108-AA02-DFA0A04FC94B}">
-              <ma14:wrappingTextBoxFlag xmlns="" xmlns:m="http://schemas.openxmlformats.org/officeDocument/2006/math" xmlns:a14="http://schemas.microsoft.com/office/drawing/2010/main" xmlns:ma14="http://schemas.microsoft.com/office/mac/drawingml/2011/main" val="1"/>
+              <ma14:wrappingTextBoxFlag xmlns:ma14="http://schemas.microsoft.com/office/mac/drawingml/2011/main" xmlns:a14="http://schemas.microsoft.com/office/drawing/2010/main" xmlns:m="http://schemas.openxmlformats.org/officeDocument/2006/math" xmlns="" val="1"/>
             </a:ext>
           </a:extLst>
         </p:spPr>
@@ -10917,7 +11005,7 @@
           </a:ln>
           <a:extLst>
             <a:ext uri="{C572A759-6A51-4108-AA02-DFA0A04FC94B}">
-              <ma14:wrappingTextBoxFlag xmlns="" xmlns:m="http://schemas.openxmlformats.org/officeDocument/2006/math" xmlns:a14="http://schemas.microsoft.com/office/drawing/2010/main" xmlns:ma14="http://schemas.microsoft.com/office/mac/drawingml/2011/main" val="1"/>
+              <ma14:wrappingTextBoxFlag xmlns:ma14="http://schemas.microsoft.com/office/mac/drawingml/2011/main" xmlns:a14="http://schemas.microsoft.com/office/drawing/2010/main" xmlns:m="http://schemas.openxmlformats.org/officeDocument/2006/math" xmlns="" val="1"/>
             </a:ext>
           </a:extLst>
         </p:spPr>
@@ -10951,9 +11039,7 @@
           <p:nvPr/>
         </p:nvPicPr>
         <p:blipFill>
-          <a:blip r:embed="rId3" cstate="print">
-            <a:extLst/>
-          </a:blip>
+          <a:blip r:embed="rId3" cstate="print"/>
           <a:stretch>
             <a:fillRect/>
           </a:stretch>
@@ -10990,7 +11076,7 @@
           </a:ln>
           <a:extLst>
             <a:ext uri="{C572A759-6A51-4108-AA02-DFA0A04FC94B}">
-              <ma14:wrappingTextBoxFlag xmlns="" xmlns:m="http://schemas.openxmlformats.org/officeDocument/2006/math" xmlns:a14="http://schemas.microsoft.com/office/drawing/2010/main" xmlns:ma14="http://schemas.microsoft.com/office/mac/drawingml/2011/main" val="1"/>
+              <ma14:wrappingTextBoxFlag xmlns:ma14="http://schemas.microsoft.com/office/mac/drawingml/2011/main" xmlns:a14="http://schemas.microsoft.com/office/drawing/2010/main" xmlns:m="http://schemas.openxmlformats.org/officeDocument/2006/math" xmlns="" val="1"/>
             </a:ext>
           </a:extLst>
         </p:spPr>
@@ -11030,9 +11116,7 @@
           <p:nvPr/>
         </p:nvPicPr>
         <p:blipFill>
-          <a:blip r:embed="rId4" cstate="print">
-            <a:extLst/>
-          </a:blip>
+          <a:blip r:embed="rId4" cstate="print"/>
           <a:stretch>
             <a:fillRect/>
           </a:stretch>
@@ -11056,13 +11140,6 @@
     <a:masterClrMapping/>
   </p:clrMapOvr>
   <p:transition spd="med"/>
-  <p:timing>
-    <p:tnLst>
-      <p:par>
-        <p:cTn id="1" dur="indefinite" restart="never" nodeType="tmRoot"/>
-      </p:par>
-    </p:tnLst>
-  </p:timing>
 </p:sld>
 </file>
 
@@ -11143,7 +11220,7 @@
           </a:ln>
           <a:extLst>
             <a:ext uri="{C572A759-6A51-4108-AA02-DFA0A04FC94B}">
-              <ma14:wrappingTextBoxFlag xmlns="" xmlns:m="http://schemas.openxmlformats.org/officeDocument/2006/math" xmlns:a14="http://schemas.microsoft.com/office/drawing/2010/main" xmlns:ma14="http://schemas.microsoft.com/office/mac/drawingml/2011/main" val="1"/>
+              <ma14:wrappingTextBoxFlag xmlns:ma14="http://schemas.microsoft.com/office/mac/drawingml/2011/main" xmlns:a14="http://schemas.microsoft.com/office/drawing/2010/main" xmlns:m="http://schemas.openxmlformats.org/officeDocument/2006/math" xmlns="" val="1"/>
             </a:ext>
           </a:extLst>
         </p:spPr>
@@ -11183,9 +11260,7 @@
           <p:nvPr/>
         </p:nvPicPr>
         <p:blipFill>
-          <a:blip r:embed="rId2" cstate="print">
-            <a:extLst/>
-          </a:blip>
+          <a:blip r:embed="rId2" cstate="print"/>
           <a:stretch>
             <a:fillRect/>
           </a:stretch>
@@ -11209,13 +11284,6 @@
     <a:masterClrMapping/>
   </p:clrMapOvr>
   <p:transition spd="med"/>
-  <p:timing>
-    <p:tnLst>
-      <p:par>
-        <p:cTn id="1" dur="indefinite" restart="never" nodeType="tmRoot"/>
-      </p:par>
-    </p:tnLst>
-  </p:timing>
 </p:sld>
 </file>
 
@@ -11297,7 +11365,7 @@
           </a:ln>
           <a:extLst>
             <a:ext uri="{C572A759-6A51-4108-AA02-DFA0A04FC94B}">
-              <ma14:wrappingTextBoxFlag xmlns="" xmlns:m="http://schemas.openxmlformats.org/officeDocument/2006/math" xmlns:a14="http://schemas.microsoft.com/office/drawing/2010/main" xmlns:ma14="http://schemas.microsoft.com/office/mac/drawingml/2011/main" val="1"/>
+              <ma14:wrappingTextBoxFlag xmlns:ma14="http://schemas.microsoft.com/office/mac/drawingml/2011/main" xmlns:a14="http://schemas.microsoft.com/office/drawing/2010/main" xmlns:m="http://schemas.openxmlformats.org/officeDocument/2006/math" xmlns="" val="1"/>
             </a:ext>
           </a:extLst>
         </p:spPr>
@@ -11341,7 +11409,7 @@
           </a:ln>
           <a:extLst>
             <a:ext uri="{C572A759-6A51-4108-AA02-DFA0A04FC94B}">
-              <ma14:wrappingTextBoxFlag xmlns="" xmlns:m="http://schemas.openxmlformats.org/officeDocument/2006/math" xmlns:a14="http://schemas.microsoft.com/office/drawing/2010/main" xmlns:ma14="http://schemas.microsoft.com/office/mac/drawingml/2011/main" val="1"/>
+              <ma14:wrappingTextBoxFlag xmlns:ma14="http://schemas.microsoft.com/office/mac/drawingml/2011/main" xmlns:a14="http://schemas.microsoft.com/office/drawing/2010/main" xmlns:m="http://schemas.openxmlformats.org/officeDocument/2006/math" xmlns="" val="1"/>
             </a:ext>
           </a:extLst>
         </p:spPr>
@@ -11380,23 +11448,23 @@
               <a:t>' column, we delete some row representing patients whose risk is =0 (that is, </a:t>
             </a:r>
             <a:r>
-              <a:rPr dirty="0" err="1" smtClean="0"/>
+              <a:rPr dirty="0" err="1"/>
               <a:t>pati</a:t>
             </a:r>
             <a:r>
-              <a:rPr lang="it-IT" dirty="0" smtClean="0"/>
+              <a:rPr lang="it-IT" dirty="0"/>
               <a:t>e</a:t>
             </a:r>
             <a:r>
-              <a:rPr dirty="0" err="1" smtClean="0"/>
+              <a:rPr dirty="0" err="1"/>
               <a:t>nt</a:t>
             </a:r>
             <a:r>
-              <a:rPr lang="it-IT" dirty="0" smtClean="0"/>
+              <a:rPr lang="it-IT" dirty="0"/>
               <a:t>s</a:t>
             </a:r>
             <a:r>
-              <a:rPr dirty="0" smtClean="0"/>
+              <a:rPr dirty="0"/>
               <a:t> </a:t>
             </a:r>
             <a:r>
@@ -11419,9 +11487,7 @@
           <p:nvPr/>
         </p:nvPicPr>
         <p:blipFill>
-          <a:blip r:embed="rId2" cstate="print">
-            <a:extLst/>
-          </a:blip>
+          <a:blip r:embed="rId2" cstate="print"/>
           <a:stretch>
             <a:fillRect/>
           </a:stretch>
@@ -11458,7 +11524,7 @@
           </a:ln>
           <a:extLst>
             <a:ext uri="{C572A759-6A51-4108-AA02-DFA0A04FC94B}">
-              <ma14:wrappingTextBoxFlag xmlns="" xmlns:m="http://schemas.openxmlformats.org/officeDocument/2006/math" xmlns:a14="http://schemas.microsoft.com/office/drawing/2010/main" xmlns:ma14="http://schemas.microsoft.com/office/mac/drawingml/2011/main" val="1"/>
+              <ma14:wrappingTextBoxFlag xmlns:ma14="http://schemas.microsoft.com/office/mac/drawingml/2011/main" xmlns:a14="http://schemas.microsoft.com/office/drawing/2010/main" xmlns:m="http://schemas.openxmlformats.org/officeDocument/2006/math" xmlns="" val="1"/>
             </a:ext>
           </a:extLst>
         </p:spPr>
@@ -11492,9 +11558,7 @@
           <p:nvPr/>
         </p:nvPicPr>
         <p:blipFill>
-          <a:blip r:embed="rId3" cstate="print">
-            <a:extLst/>
-          </a:blip>
+          <a:blip r:embed="rId3" cstate="print"/>
           <a:stretch>
             <a:fillRect/>
           </a:stretch>
@@ -11531,7 +11595,7 @@
           </a:ln>
           <a:extLst>
             <a:ext uri="{C572A759-6A51-4108-AA02-DFA0A04FC94B}">
-              <ma14:wrappingTextBoxFlag xmlns="" xmlns:m="http://schemas.openxmlformats.org/officeDocument/2006/math" xmlns:a14="http://schemas.microsoft.com/office/drawing/2010/main" xmlns:ma14="http://schemas.microsoft.com/office/mac/drawingml/2011/main" val="1"/>
+              <ma14:wrappingTextBoxFlag xmlns:ma14="http://schemas.microsoft.com/office/mac/drawingml/2011/main" xmlns:a14="http://schemas.microsoft.com/office/drawing/2010/main" xmlns:m="http://schemas.openxmlformats.org/officeDocument/2006/math" xmlns="" val="1"/>
             </a:ext>
           </a:extLst>
         </p:spPr>
@@ -11568,13 +11632,6 @@
     <a:masterClrMapping/>
   </p:clrMapOvr>
   <p:transition spd="med"/>
-  <p:timing>
-    <p:tnLst>
-      <p:par>
-        <p:cTn id="1" dur="indefinite" restart="never" nodeType="tmRoot"/>
-      </p:par>
-    </p:tnLst>
-  </p:timing>
 </p:sld>
 </file>
 

</xml_diff>

<commit_message>
daic he è finita
</commit_message>
<xml_diff>
--- a/Prova.pptx
+++ b/Prova.pptx
@@ -5,7 +5,7 @@
     <p:sldMasterId id="2147483648" r:id="rId1"/>
   </p:sldMasterIdLst>
   <p:notesMasterIdLst>
-    <p:notesMasterId r:id="rId34"/>
+    <p:notesMasterId r:id="rId37"/>
   </p:notesMasterIdLst>
   <p:sldIdLst>
     <p:sldId id="256" r:id="rId2"/>
@@ -31,15 +31,18 @@
     <p:sldId id="276" r:id="rId22"/>
     <p:sldId id="277" r:id="rId23"/>
     <p:sldId id="278" r:id="rId24"/>
-    <p:sldId id="279" r:id="rId25"/>
-    <p:sldId id="280" r:id="rId26"/>
-    <p:sldId id="281" r:id="rId27"/>
-    <p:sldId id="282" r:id="rId28"/>
-    <p:sldId id="283" r:id="rId29"/>
-    <p:sldId id="284" r:id="rId30"/>
-    <p:sldId id="285" r:id="rId31"/>
-    <p:sldId id="286" r:id="rId32"/>
-    <p:sldId id="287" r:id="rId33"/>
+    <p:sldId id="288" r:id="rId25"/>
+    <p:sldId id="282" r:id="rId26"/>
+    <p:sldId id="279" r:id="rId27"/>
+    <p:sldId id="280" r:id="rId28"/>
+    <p:sldId id="281" r:id="rId29"/>
+    <p:sldId id="283" r:id="rId30"/>
+    <p:sldId id="284" r:id="rId31"/>
+    <p:sldId id="285" r:id="rId32"/>
+    <p:sldId id="286" r:id="rId33"/>
+    <p:sldId id="287" r:id="rId34"/>
+    <p:sldId id="289" r:id="rId35"/>
+    <p:sldId id="290" r:id="rId36"/>
   </p:sldIdLst>
   <p:sldSz cx="9144000" cy="6858000" type="screen4x3"/>
   <p:notesSz cx="6858000" cy="9144000"/>
@@ -2349,7 +2352,7 @@
           </a:ln>
           <a:extLst>
             <a:ext uri="{C572A759-6A51-4108-AA02-DFA0A04FC94B}">
-              <ma14:wrappingTextBoxFlag xmlns="" xmlns:m="http://schemas.openxmlformats.org/officeDocument/2006/math" xmlns:a14="http://schemas.microsoft.com/office/drawing/2010/main" xmlns:ma14="http://schemas.microsoft.com/office/mac/drawingml/2011/main" val="1"/>
+              <ma14:wrappingTextBoxFlag xmlns:ma14="http://schemas.microsoft.com/office/mac/drawingml/2011/main" xmlns:a14="http://schemas.microsoft.com/office/drawing/2010/main" xmlns:m="http://schemas.openxmlformats.org/officeDocument/2006/math" xmlns="" val="1"/>
             </a:ext>
           </a:extLst>
         </p:spPr>
@@ -2388,7 +2391,7 @@
           </a:ln>
           <a:extLst>
             <a:ext uri="{C572A759-6A51-4108-AA02-DFA0A04FC94B}">
-              <ma14:wrappingTextBoxFlag xmlns="" xmlns:m="http://schemas.openxmlformats.org/officeDocument/2006/math" xmlns:a14="http://schemas.microsoft.com/office/drawing/2010/main" xmlns:ma14="http://schemas.microsoft.com/office/mac/drawingml/2011/main" val="1"/>
+              <ma14:wrappingTextBoxFlag xmlns:ma14="http://schemas.microsoft.com/office/mac/drawingml/2011/main" xmlns:a14="http://schemas.microsoft.com/office/drawing/2010/main" xmlns:m="http://schemas.openxmlformats.org/officeDocument/2006/math" xmlns="" val="1"/>
             </a:ext>
           </a:extLst>
         </p:spPr>
@@ -3333,7 +3336,7 @@
           </a:ln>
           <a:extLst>
             <a:ext uri="{C572A759-6A51-4108-AA02-DFA0A04FC94B}">
-              <ma14:wrappingTextBoxFlag xmlns="" xmlns:m="http://schemas.openxmlformats.org/officeDocument/2006/math" xmlns:a14="http://schemas.microsoft.com/office/drawing/2010/main" xmlns:ma14="http://schemas.microsoft.com/office/mac/drawingml/2011/main" val="1"/>
+              <ma14:wrappingTextBoxFlag xmlns:ma14="http://schemas.microsoft.com/office/mac/drawingml/2011/main" xmlns:a14="http://schemas.microsoft.com/office/drawing/2010/main" xmlns:m="http://schemas.openxmlformats.org/officeDocument/2006/math" xmlns="" val="1"/>
             </a:ext>
           </a:extLst>
         </p:spPr>
@@ -3389,7 +3392,7 @@
           </a:ln>
           <a:extLst>
             <a:ext uri="{C572A759-6A51-4108-AA02-DFA0A04FC94B}">
-              <ma14:wrappingTextBoxFlag xmlns="" xmlns:m="http://schemas.openxmlformats.org/officeDocument/2006/math" xmlns:a14="http://schemas.microsoft.com/office/drawing/2010/main" xmlns:ma14="http://schemas.microsoft.com/office/mac/drawingml/2011/main" val="1"/>
+              <ma14:wrappingTextBoxFlag xmlns:ma14="http://schemas.microsoft.com/office/mac/drawingml/2011/main" xmlns:a14="http://schemas.microsoft.com/office/drawing/2010/main" xmlns:m="http://schemas.openxmlformats.org/officeDocument/2006/math" xmlns="" val="1"/>
             </a:ext>
           </a:extLst>
         </p:spPr>
@@ -3506,7 +3509,7 @@
           </a:ln>
           <a:extLst>
             <a:ext uri="{C572A759-6A51-4108-AA02-DFA0A04FC94B}">
-              <ma14:wrappingTextBoxFlag xmlns="" xmlns:m="http://schemas.openxmlformats.org/officeDocument/2006/math" xmlns:a14="http://schemas.microsoft.com/office/drawing/2010/main" xmlns:ma14="http://schemas.microsoft.com/office/mac/drawingml/2011/main" val="1"/>
+              <ma14:wrappingTextBoxFlag xmlns:ma14="http://schemas.microsoft.com/office/mac/drawingml/2011/main" xmlns:a14="http://schemas.microsoft.com/office/drawing/2010/main" xmlns:m="http://schemas.openxmlformats.org/officeDocument/2006/math" xmlns="" val="1"/>
             </a:ext>
           </a:extLst>
         </p:spPr>
@@ -3577,7 +3580,7 @@
           </a:ln>
           <a:extLst>
             <a:ext uri="{C572A759-6A51-4108-AA02-DFA0A04FC94B}">
-              <ma14:wrappingTextBoxFlag xmlns="" xmlns:m="http://schemas.openxmlformats.org/officeDocument/2006/math" xmlns:a14="http://schemas.microsoft.com/office/drawing/2010/main" xmlns:ma14="http://schemas.microsoft.com/office/mac/drawingml/2011/main" val="1"/>
+              <ma14:wrappingTextBoxFlag xmlns:ma14="http://schemas.microsoft.com/office/mac/drawingml/2011/main" xmlns:a14="http://schemas.microsoft.com/office/drawing/2010/main" xmlns:m="http://schemas.openxmlformats.org/officeDocument/2006/math" xmlns="" val="1"/>
             </a:ext>
           </a:extLst>
         </p:spPr>
@@ -3770,7 +3773,7 @@
           </a:ln>
           <a:extLst>
             <a:ext uri="{C572A759-6A51-4108-AA02-DFA0A04FC94B}">
-              <ma14:wrappingTextBoxFlag xmlns="" xmlns:m="http://schemas.openxmlformats.org/officeDocument/2006/math" xmlns:a14="http://schemas.microsoft.com/office/drawing/2010/main" xmlns:ma14="http://schemas.microsoft.com/office/mac/drawingml/2011/main" val="1"/>
+              <ma14:wrappingTextBoxFlag xmlns:ma14="http://schemas.microsoft.com/office/mac/drawingml/2011/main" xmlns:a14="http://schemas.microsoft.com/office/drawing/2010/main" xmlns:m="http://schemas.openxmlformats.org/officeDocument/2006/math" xmlns="" val="1"/>
             </a:ext>
           </a:extLst>
         </p:spPr>
@@ -3817,7 +3820,7 @@
           </a:ln>
           <a:extLst>
             <a:ext uri="{C572A759-6A51-4108-AA02-DFA0A04FC94B}">
-              <ma14:wrappingTextBoxFlag xmlns="" xmlns:m="http://schemas.openxmlformats.org/officeDocument/2006/math" xmlns:a14="http://schemas.microsoft.com/office/drawing/2010/main" xmlns:ma14="http://schemas.microsoft.com/office/mac/drawingml/2011/main" val="1"/>
+              <ma14:wrappingTextBoxFlag xmlns:ma14="http://schemas.microsoft.com/office/mac/drawingml/2011/main" xmlns:a14="http://schemas.microsoft.com/office/drawing/2010/main" xmlns:m="http://schemas.openxmlformats.org/officeDocument/2006/math" xmlns="" val="1"/>
             </a:ext>
           </a:extLst>
         </p:spPr>
@@ -3881,7 +3884,7 @@
           </a:ln>
           <a:extLst>
             <a:ext uri="{C572A759-6A51-4108-AA02-DFA0A04FC94B}">
-              <ma14:wrappingTextBoxFlag xmlns="" xmlns:m="http://schemas.openxmlformats.org/officeDocument/2006/math" xmlns:a14="http://schemas.microsoft.com/office/drawing/2010/main" xmlns:ma14="http://schemas.microsoft.com/office/mac/drawingml/2011/main" val="1"/>
+              <ma14:wrappingTextBoxFlag xmlns:ma14="http://schemas.microsoft.com/office/mac/drawingml/2011/main" xmlns:a14="http://schemas.microsoft.com/office/drawing/2010/main" xmlns:m="http://schemas.openxmlformats.org/officeDocument/2006/math" xmlns="" val="1"/>
             </a:ext>
           </a:extLst>
         </p:spPr>
@@ -3928,7 +3931,7 @@
           </a:ln>
           <a:extLst>
             <a:ext uri="{C572A759-6A51-4108-AA02-DFA0A04FC94B}">
-              <ma14:wrappingTextBoxFlag xmlns="" xmlns:m="http://schemas.openxmlformats.org/officeDocument/2006/math" xmlns:a14="http://schemas.microsoft.com/office/drawing/2010/main" xmlns:ma14="http://schemas.microsoft.com/office/mac/drawingml/2011/main" val="1"/>
+              <ma14:wrappingTextBoxFlag xmlns:ma14="http://schemas.microsoft.com/office/mac/drawingml/2011/main" xmlns:a14="http://schemas.microsoft.com/office/drawing/2010/main" xmlns:m="http://schemas.openxmlformats.org/officeDocument/2006/math" xmlns="" val="1"/>
             </a:ext>
           </a:extLst>
         </p:spPr>
@@ -3979,7 +3982,7 @@
           </a:ln>
           <a:extLst>
             <a:ext uri="{C572A759-6A51-4108-AA02-DFA0A04FC94B}">
-              <ma14:wrappingTextBoxFlag xmlns="" xmlns:m="http://schemas.openxmlformats.org/officeDocument/2006/math" xmlns:a14="http://schemas.microsoft.com/office/drawing/2010/main" xmlns:ma14="http://schemas.microsoft.com/office/mac/drawingml/2011/main" val="1"/>
+              <ma14:wrappingTextBoxFlag xmlns:ma14="http://schemas.microsoft.com/office/mac/drawingml/2011/main" xmlns:a14="http://schemas.microsoft.com/office/drawing/2010/main" xmlns:m="http://schemas.openxmlformats.org/officeDocument/2006/math" xmlns="" val="1"/>
             </a:ext>
           </a:extLst>
         </p:spPr>
@@ -4023,7 +4026,7 @@
           </a:ln>
           <a:extLst>
             <a:ext uri="{C572A759-6A51-4108-AA02-DFA0A04FC94B}">
-              <ma14:wrappingTextBoxFlag xmlns="" xmlns:m="http://schemas.openxmlformats.org/officeDocument/2006/math" xmlns:a14="http://schemas.microsoft.com/office/drawing/2010/main" xmlns:ma14="http://schemas.microsoft.com/office/mac/drawingml/2011/main" val="1"/>
+              <ma14:wrappingTextBoxFlag xmlns:ma14="http://schemas.microsoft.com/office/mac/drawingml/2011/main" xmlns:a14="http://schemas.microsoft.com/office/drawing/2010/main" xmlns:m="http://schemas.openxmlformats.org/officeDocument/2006/math" xmlns="" val="1"/>
             </a:ext>
           </a:extLst>
         </p:spPr>
@@ -4144,7 +4147,7 @@
           </a:ln>
           <a:extLst>
             <a:ext uri="{C572A759-6A51-4108-AA02-DFA0A04FC94B}">
-              <ma14:wrappingTextBoxFlag xmlns="" xmlns:m="http://schemas.openxmlformats.org/officeDocument/2006/math" xmlns:a14="http://schemas.microsoft.com/office/drawing/2010/main" xmlns:ma14="http://schemas.microsoft.com/office/mac/drawingml/2011/main" val="1"/>
+              <ma14:wrappingTextBoxFlag xmlns:ma14="http://schemas.microsoft.com/office/mac/drawingml/2011/main" xmlns:a14="http://schemas.microsoft.com/office/drawing/2010/main" xmlns:m="http://schemas.openxmlformats.org/officeDocument/2006/math" xmlns="" val="1"/>
             </a:ext>
           </a:extLst>
         </p:spPr>
@@ -4218,7 +4221,7 @@
           </a:ln>
           <a:extLst>
             <a:ext uri="{C572A759-6A51-4108-AA02-DFA0A04FC94B}">
-              <ma14:wrappingTextBoxFlag xmlns="" xmlns:m="http://schemas.openxmlformats.org/officeDocument/2006/math" xmlns:a14="http://schemas.microsoft.com/office/drawing/2010/main" xmlns:ma14="http://schemas.microsoft.com/office/mac/drawingml/2011/main" val="1"/>
+              <ma14:wrappingTextBoxFlag xmlns:ma14="http://schemas.microsoft.com/office/mac/drawingml/2011/main" xmlns:a14="http://schemas.microsoft.com/office/drawing/2010/main" xmlns:m="http://schemas.openxmlformats.org/officeDocument/2006/math" xmlns="" val="1"/>
             </a:ext>
           </a:extLst>
         </p:spPr>
@@ -4284,7 +4287,7 @@
           </a:ln>
           <a:extLst>
             <a:ext uri="{C572A759-6A51-4108-AA02-DFA0A04FC94B}">
-              <ma14:wrappingTextBoxFlag xmlns="" xmlns:m="http://schemas.openxmlformats.org/officeDocument/2006/math" xmlns:a14="http://schemas.microsoft.com/office/drawing/2010/main" xmlns:ma14="http://schemas.microsoft.com/office/mac/drawingml/2011/main" val="1"/>
+              <ma14:wrappingTextBoxFlag xmlns:ma14="http://schemas.microsoft.com/office/mac/drawingml/2011/main" xmlns:a14="http://schemas.microsoft.com/office/drawing/2010/main" xmlns:m="http://schemas.openxmlformats.org/officeDocument/2006/math" xmlns="" val="1"/>
             </a:ext>
           </a:extLst>
         </p:spPr>
@@ -4331,7 +4334,7 @@
           </a:ln>
           <a:extLst>
             <a:ext uri="{C572A759-6A51-4108-AA02-DFA0A04FC94B}">
-              <ma14:wrappingTextBoxFlag xmlns="" xmlns:m="http://schemas.openxmlformats.org/officeDocument/2006/math" xmlns:a14="http://schemas.microsoft.com/office/drawing/2010/main" xmlns:ma14="http://schemas.microsoft.com/office/mac/drawingml/2011/main" val="1"/>
+              <ma14:wrappingTextBoxFlag xmlns:ma14="http://schemas.microsoft.com/office/mac/drawingml/2011/main" xmlns:a14="http://schemas.microsoft.com/office/drawing/2010/main" xmlns:m="http://schemas.openxmlformats.org/officeDocument/2006/math" xmlns="" val="1"/>
             </a:ext>
           </a:extLst>
         </p:spPr>
@@ -4412,7 +4415,7 @@
           </a:ln>
           <a:extLst>
             <a:ext uri="{C572A759-6A51-4108-AA02-DFA0A04FC94B}">
-              <ma14:wrappingTextBoxFlag xmlns="" xmlns:m="http://schemas.openxmlformats.org/officeDocument/2006/math" xmlns:a14="http://schemas.microsoft.com/office/drawing/2010/main" xmlns:ma14="http://schemas.microsoft.com/office/mac/drawingml/2011/main" val="1"/>
+              <ma14:wrappingTextBoxFlag xmlns:ma14="http://schemas.microsoft.com/office/mac/drawingml/2011/main" xmlns:a14="http://schemas.microsoft.com/office/drawing/2010/main" xmlns:m="http://schemas.openxmlformats.org/officeDocument/2006/math" xmlns="" val="1"/>
             </a:ext>
           </a:extLst>
         </p:spPr>
@@ -4748,7 +4751,7 @@
           </a:ln>
           <a:extLst>
             <a:ext uri="{C572A759-6A51-4108-AA02-DFA0A04FC94B}">
-              <ma14:wrappingTextBoxFlag xmlns="" xmlns:m="http://schemas.openxmlformats.org/officeDocument/2006/math" xmlns:a14="http://schemas.microsoft.com/office/drawing/2010/main" xmlns:ma14="http://schemas.microsoft.com/office/mac/drawingml/2011/main" val="1"/>
+              <ma14:wrappingTextBoxFlag xmlns:ma14="http://schemas.microsoft.com/office/mac/drawingml/2011/main" xmlns:a14="http://schemas.microsoft.com/office/drawing/2010/main" xmlns:m="http://schemas.openxmlformats.org/officeDocument/2006/math" xmlns="" val="1"/>
             </a:ext>
           </a:extLst>
         </p:spPr>
@@ -4792,7 +4795,7 @@
           </a:ln>
           <a:extLst>
             <a:ext uri="{C572A759-6A51-4108-AA02-DFA0A04FC94B}">
-              <ma14:wrappingTextBoxFlag xmlns="" xmlns:m="http://schemas.openxmlformats.org/officeDocument/2006/math" xmlns:a14="http://schemas.microsoft.com/office/drawing/2010/main" xmlns:ma14="http://schemas.microsoft.com/office/mac/drawingml/2011/main" val="1"/>
+              <ma14:wrappingTextBoxFlag xmlns:ma14="http://schemas.microsoft.com/office/mac/drawingml/2011/main" xmlns:a14="http://schemas.microsoft.com/office/drawing/2010/main" xmlns:m="http://schemas.openxmlformats.org/officeDocument/2006/math" xmlns="" val="1"/>
             </a:ext>
           </a:extLst>
         </p:spPr>
@@ -4896,7 +4899,7 @@
           </a:ln>
           <a:extLst>
             <a:ext uri="{C572A759-6A51-4108-AA02-DFA0A04FC94B}">
-              <ma14:wrappingTextBoxFlag xmlns="" xmlns:m="http://schemas.openxmlformats.org/officeDocument/2006/math" xmlns:a14="http://schemas.microsoft.com/office/drawing/2010/main" xmlns:ma14="http://schemas.microsoft.com/office/mac/drawingml/2011/main" val="1"/>
+              <ma14:wrappingTextBoxFlag xmlns:ma14="http://schemas.microsoft.com/office/mac/drawingml/2011/main" xmlns:a14="http://schemas.microsoft.com/office/drawing/2010/main" xmlns:m="http://schemas.openxmlformats.org/officeDocument/2006/math" xmlns="" val="1"/>
             </a:ext>
           </a:extLst>
         </p:spPr>
@@ -4943,7 +4946,7 @@
           </a:ln>
           <a:extLst>
             <a:ext uri="{C572A759-6A51-4108-AA02-DFA0A04FC94B}">
-              <ma14:wrappingTextBoxFlag xmlns="" xmlns:m="http://schemas.openxmlformats.org/officeDocument/2006/math" xmlns:a14="http://schemas.microsoft.com/office/drawing/2010/main" xmlns:ma14="http://schemas.microsoft.com/office/mac/drawingml/2011/main" val="1"/>
+              <ma14:wrappingTextBoxFlag xmlns:ma14="http://schemas.microsoft.com/office/mac/drawingml/2011/main" xmlns:a14="http://schemas.microsoft.com/office/drawing/2010/main" xmlns:m="http://schemas.openxmlformats.org/officeDocument/2006/math" xmlns="" val="1"/>
             </a:ext>
           </a:extLst>
         </p:spPr>
@@ -5007,7 +5010,7 @@
           </a:ln>
           <a:extLst>
             <a:ext uri="{C572A759-6A51-4108-AA02-DFA0A04FC94B}">
-              <ma14:wrappingTextBoxFlag xmlns="" xmlns:m="http://schemas.openxmlformats.org/officeDocument/2006/math" xmlns:a14="http://schemas.microsoft.com/office/drawing/2010/main" xmlns:ma14="http://schemas.microsoft.com/office/mac/drawingml/2011/main" val="1"/>
+              <ma14:wrappingTextBoxFlag xmlns:ma14="http://schemas.microsoft.com/office/mac/drawingml/2011/main" xmlns:a14="http://schemas.microsoft.com/office/drawing/2010/main" xmlns:m="http://schemas.openxmlformats.org/officeDocument/2006/math" xmlns="" val="1"/>
             </a:ext>
           </a:extLst>
         </p:spPr>
@@ -5054,7 +5057,7 @@
           </a:ln>
           <a:extLst>
             <a:ext uri="{C572A759-6A51-4108-AA02-DFA0A04FC94B}">
-              <ma14:wrappingTextBoxFlag xmlns="" xmlns:m="http://schemas.openxmlformats.org/officeDocument/2006/math" xmlns:a14="http://schemas.microsoft.com/office/drawing/2010/main" xmlns:ma14="http://schemas.microsoft.com/office/mac/drawingml/2011/main" val="1"/>
+              <ma14:wrappingTextBoxFlag xmlns:ma14="http://schemas.microsoft.com/office/mac/drawingml/2011/main" xmlns:a14="http://schemas.microsoft.com/office/drawing/2010/main" xmlns:m="http://schemas.openxmlformats.org/officeDocument/2006/math" xmlns="" val="1"/>
             </a:ext>
           </a:extLst>
         </p:spPr>
@@ -5105,7 +5108,7 @@
           </a:ln>
           <a:extLst>
             <a:ext uri="{C572A759-6A51-4108-AA02-DFA0A04FC94B}">
-              <ma14:wrappingTextBoxFlag xmlns="" xmlns:m="http://schemas.openxmlformats.org/officeDocument/2006/math" xmlns:a14="http://schemas.microsoft.com/office/drawing/2010/main" xmlns:ma14="http://schemas.microsoft.com/office/mac/drawingml/2011/main" val="1"/>
+              <ma14:wrappingTextBoxFlag xmlns:ma14="http://schemas.microsoft.com/office/mac/drawingml/2011/main" xmlns:a14="http://schemas.microsoft.com/office/drawing/2010/main" xmlns:m="http://schemas.openxmlformats.org/officeDocument/2006/math" xmlns="" val="1"/>
             </a:ext>
           </a:extLst>
         </p:spPr>
@@ -5149,7 +5152,7 @@
           </a:ln>
           <a:extLst>
             <a:ext uri="{C572A759-6A51-4108-AA02-DFA0A04FC94B}">
-              <ma14:wrappingTextBoxFlag xmlns="" xmlns:m="http://schemas.openxmlformats.org/officeDocument/2006/math" xmlns:a14="http://schemas.microsoft.com/office/drawing/2010/main" xmlns:ma14="http://schemas.microsoft.com/office/mac/drawingml/2011/main" val="1"/>
+              <ma14:wrappingTextBoxFlag xmlns:ma14="http://schemas.microsoft.com/office/mac/drawingml/2011/main" xmlns:a14="http://schemas.microsoft.com/office/drawing/2010/main" xmlns:m="http://schemas.openxmlformats.org/officeDocument/2006/math" xmlns="" val="1"/>
             </a:ext>
           </a:extLst>
         </p:spPr>
@@ -5212,7 +5215,7 @@
           </a:ln>
           <a:extLst>
             <a:ext uri="{C572A759-6A51-4108-AA02-DFA0A04FC94B}">
-              <ma14:wrappingTextBoxFlag xmlns="" xmlns:m="http://schemas.openxmlformats.org/officeDocument/2006/math" xmlns:a14="http://schemas.microsoft.com/office/drawing/2010/main" xmlns:ma14="http://schemas.microsoft.com/office/mac/drawingml/2011/main" val="1"/>
+              <ma14:wrappingTextBoxFlag xmlns:ma14="http://schemas.microsoft.com/office/mac/drawingml/2011/main" xmlns:a14="http://schemas.microsoft.com/office/drawing/2010/main" xmlns:m="http://schemas.openxmlformats.org/officeDocument/2006/math" xmlns="" val="1"/>
             </a:ext>
           </a:extLst>
         </p:spPr>
@@ -5344,7 +5347,7 @@
           </a:ln>
           <a:extLst>
             <a:ext uri="{C572A759-6A51-4108-AA02-DFA0A04FC94B}">
-              <ma14:wrappingTextBoxFlag xmlns="" xmlns:m="http://schemas.openxmlformats.org/officeDocument/2006/math" xmlns:a14="http://schemas.microsoft.com/office/drawing/2010/main" xmlns:ma14="http://schemas.microsoft.com/office/mac/drawingml/2011/main" val="1"/>
+              <ma14:wrappingTextBoxFlag xmlns:ma14="http://schemas.microsoft.com/office/mac/drawingml/2011/main" xmlns:a14="http://schemas.microsoft.com/office/drawing/2010/main" xmlns:m="http://schemas.openxmlformats.org/officeDocument/2006/math" xmlns="" val="1"/>
             </a:ext>
           </a:extLst>
         </p:spPr>
@@ -5394,7 +5397,7 @@
           </a:ln>
           <a:extLst>
             <a:ext uri="{C572A759-6A51-4108-AA02-DFA0A04FC94B}">
-              <ma14:wrappingTextBoxFlag xmlns="" xmlns:m="http://schemas.openxmlformats.org/officeDocument/2006/math" xmlns:a14="http://schemas.microsoft.com/office/drawing/2010/main" xmlns:ma14="http://schemas.microsoft.com/office/mac/drawingml/2011/main" val="1"/>
+              <ma14:wrappingTextBoxFlag xmlns:ma14="http://schemas.microsoft.com/office/mac/drawingml/2011/main" xmlns:a14="http://schemas.microsoft.com/office/drawing/2010/main" xmlns:m="http://schemas.openxmlformats.org/officeDocument/2006/math" xmlns="" val="1"/>
             </a:ext>
           </a:extLst>
         </p:spPr>
@@ -5491,7 +5494,7 @@
           </a:ln>
           <a:extLst>
             <a:ext uri="{C572A759-6A51-4108-AA02-DFA0A04FC94B}">
-              <ma14:wrappingTextBoxFlag xmlns="" xmlns:m="http://schemas.openxmlformats.org/officeDocument/2006/math" xmlns:a14="http://schemas.microsoft.com/office/drawing/2010/main" xmlns:ma14="http://schemas.microsoft.com/office/mac/drawingml/2011/main" val="1"/>
+              <ma14:wrappingTextBoxFlag xmlns:ma14="http://schemas.microsoft.com/office/mac/drawingml/2011/main" xmlns:a14="http://schemas.microsoft.com/office/drawing/2010/main" xmlns:m="http://schemas.openxmlformats.org/officeDocument/2006/math" xmlns="" val="1"/>
             </a:ext>
           </a:extLst>
         </p:spPr>
@@ -5538,7 +5541,7 @@
           </a:ln>
           <a:extLst>
             <a:ext uri="{C572A759-6A51-4108-AA02-DFA0A04FC94B}">
-              <ma14:wrappingTextBoxFlag xmlns="" xmlns:m="http://schemas.openxmlformats.org/officeDocument/2006/math" xmlns:a14="http://schemas.microsoft.com/office/drawing/2010/main" xmlns:ma14="http://schemas.microsoft.com/office/mac/drawingml/2011/main" val="1"/>
+              <ma14:wrappingTextBoxFlag xmlns:ma14="http://schemas.microsoft.com/office/mac/drawingml/2011/main" xmlns:a14="http://schemas.microsoft.com/office/drawing/2010/main" xmlns:m="http://schemas.openxmlformats.org/officeDocument/2006/math" xmlns="" val="1"/>
             </a:ext>
           </a:extLst>
         </p:spPr>
@@ -5604,7 +5607,7 @@
           </a:ln>
           <a:extLst>
             <a:ext uri="{C572A759-6A51-4108-AA02-DFA0A04FC94B}">
-              <ma14:wrappingTextBoxFlag xmlns="" xmlns:m="http://schemas.openxmlformats.org/officeDocument/2006/math" xmlns:a14="http://schemas.microsoft.com/office/drawing/2010/main" xmlns:ma14="http://schemas.microsoft.com/office/mac/drawingml/2011/main" val="1"/>
+              <ma14:wrappingTextBoxFlag xmlns:ma14="http://schemas.microsoft.com/office/mac/drawingml/2011/main" xmlns:a14="http://schemas.microsoft.com/office/drawing/2010/main" xmlns:m="http://schemas.openxmlformats.org/officeDocument/2006/math" xmlns="" val="1"/>
             </a:ext>
           </a:extLst>
         </p:spPr>
@@ -5651,7 +5654,7 @@
           </a:ln>
           <a:extLst>
             <a:ext uri="{C572A759-6A51-4108-AA02-DFA0A04FC94B}">
-              <ma14:wrappingTextBoxFlag xmlns="" xmlns:m="http://schemas.openxmlformats.org/officeDocument/2006/math" xmlns:a14="http://schemas.microsoft.com/office/drawing/2010/main" xmlns:ma14="http://schemas.microsoft.com/office/mac/drawingml/2011/main" val="1"/>
+              <ma14:wrappingTextBoxFlag xmlns:ma14="http://schemas.microsoft.com/office/mac/drawingml/2011/main" xmlns:a14="http://schemas.microsoft.com/office/drawing/2010/main" xmlns:m="http://schemas.openxmlformats.org/officeDocument/2006/math" xmlns="" val="1"/>
             </a:ext>
           </a:extLst>
         </p:spPr>
@@ -5706,7 +5709,7 @@
           </a:ln>
           <a:extLst>
             <a:ext uri="{C572A759-6A51-4108-AA02-DFA0A04FC94B}">
-              <ma14:wrappingTextBoxFlag xmlns="" xmlns:m="http://schemas.openxmlformats.org/officeDocument/2006/math" xmlns:a14="http://schemas.microsoft.com/office/drawing/2010/main" xmlns:ma14="http://schemas.microsoft.com/office/mac/drawingml/2011/main" val="1"/>
+              <ma14:wrappingTextBoxFlag xmlns:ma14="http://schemas.microsoft.com/office/mac/drawingml/2011/main" xmlns:a14="http://schemas.microsoft.com/office/drawing/2010/main" xmlns:m="http://schemas.openxmlformats.org/officeDocument/2006/math" xmlns="" val="1"/>
             </a:ext>
           </a:extLst>
         </p:spPr>
@@ -5810,7 +5813,7 @@
           </a:ln>
           <a:extLst>
             <a:ext uri="{C572A759-6A51-4108-AA02-DFA0A04FC94B}">
-              <ma14:wrappingTextBoxFlag xmlns="" xmlns:m="http://schemas.openxmlformats.org/officeDocument/2006/math" xmlns:a14="http://schemas.microsoft.com/office/drawing/2010/main" xmlns:ma14="http://schemas.microsoft.com/office/mac/drawingml/2011/main" val="1"/>
+              <ma14:wrappingTextBoxFlag xmlns:ma14="http://schemas.microsoft.com/office/mac/drawingml/2011/main" xmlns:a14="http://schemas.microsoft.com/office/drawing/2010/main" xmlns:m="http://schemas.openxmlformats.org/officeDocument/2006/math" xmlns="" val="1"/>
             </a:ext>
           </a:extLst>
         </p:spPr>
@@ -6146,7 +6149,7 @@
           </a:ln>
           <a:extLst>
             <a:ext uri="{C572A759-6A51-4108-AA02-DFA0A04FC94B}">
-              <ma14:wrappingTextBoxFlag xmlns="" xmlns:m="http://schemas.openxmlformats.org/officeDocument/2006/math" xmlns:a14="http://schemas.microsoft.com/office/drawing/2010/main" xmlns:ma14="http://schemas.microsoft.com/office/mac/drawingml/2011/main" val="1"/>
+              <ma14:wrappingTextBoxFlag xmlns:ma14="http://schemas.microsoft.com/office/mac/drawingml/2011/main" xmlns:a14="http://schemas.microsoft.com/office/drawing/2010/main" xmlns:m="http://schemas.openxmlformats.org/officeDocument/2006/math" xmlns="" val="1"/>
             </a:ext>
           </a:extLst>
         </p:spPr>
@@ -6196,7 +6199,7 @@
           </a:ln>
           <a:extLst>
             <a:ext uri="{C572A759-6A51-4108-AA02-DFA0A04FC94B}">
-              <ma14:wrappingTextBoxFlag xmlns="" xmlns:m="http://schemas.openxmlformats.org/officeDocument/2006/math" xmlns:a14="http://schemas.microsoft.com/office/drawing/2010/main" xmlns:ma14="http://schemas.microsoft.com/office/mac/drawingml/2011/main" val="1"/>
+              <ma14:wrappingTextBoxFlag xmlns:ma14="http://schemas.microsoft.com/office/mac/drawingml/2011/main" xmlns:a14="http://schemas.microsoft.com/office/drawing/2010/main" xmlns:m="http://schemas.openxmlformats.org/officeDocument/2006/math" xmlns="" val="1"/>
             </a:ext>
           </a:extLst>
         </p:spPr>
@@ -6266,7 +6269,7 @@
           </a:ln>
           <a:extLst>
             <a:ext uri="{C572A759-6A51-4108-AA02-DFA0A04FC94B}">
-              <ma14:wrappingTextBoxFlag xmlns="" xmlns:m="http://schemas.openxmlformats.org/officeDocument/2006/math" xmlns:a14="http://schemas.microsoft.com/office/drawing/2010/main" xmlns:ma14="http://schemas.microsoft.com/office/mac/drawingml/2011/main" val="1"/>
+              <ma14:wrappingTextBoxFlag xmlns:ma14="http://schemas.microsoft.com/office/mac/drawingml/2011/main" xmlns:a14="http://schemas.microsoft.com/office/drawing/2010/main" xmlns:m="http://schemas.openxmlformats.org/officeDocument/2006/math" xmlns="" val="1"/>
             </a:ext>
           </a:extLst>
         </p:spPr>
@@ -6313,7 +6316,7 @@
           </a:ln>
           <a:extLst>
             <a:ext uri="{C572A759-6A51-4108-AA02-DFA0A04FC94B}">
-              <ma14:wrappingTextBoxFlag xmlns="" xmlns:m="http://schemas.openxmlformats.org/officeDocument/2006/math" xmlns:a14="http://schemas.microsoft.com/office/drawing/2010/main" xmlns:ma14="http://schemas.microsoft.com/office/mac/drawingml/2011/main" val="1"/>
+              <ma14:wrappingTextBoxFlag xmlns:ma14="http://schemas.microsoft.com/office/mac/drawingml/2011/main" xmlns:a14="http://schemas.microsoft.com/office/drawing/2010/main" xmlns:m="http://schemas.openxmlformats.org/officeDocument/2006/math" xmlns="" val="1"/>
             </a:ext>
           </a:extLst>
         </p:spPr>
@@ -6377,7 +6380,7 @@
           </a:ln>
           <a:extLst>
             <a:ext uri="{C572A759-6A51-4108-AA02-DFA0A04FC94B}">
-              <ma14:wrappingTextBoxFlag xmlns="" xmlns:m="http://schemas.openxmlformats.org/officeDocument/2006/math" xmlns:a14="http://schemas.microsoft.com/office/drawing/2010/main" xmlns:ma14="http://schemas.microsoft.com/office/mac/drawingml/2011/main" val="1"/>
+              <ma14:wrappingTextBoxFlag xmlns:ma14="http://schemas.microsoft.com/office/mac/drawingml/2011/main" xmlns:a14="http://schemas.microsoft.com/office/drawing/2010/main" xmlns:m="http://schemas.openxmlformats.org/officeDocument/2006/math" xmlns="" val="1"/>
             </a:ext>
           </a:extLst>
         </p:spPr>
@@ -6424,7 +6427,7 @@
           </a:ln>
           <a:extLst>
             <a:ext uri="{C572A759-6A51-4108-AA02-DFA0A04FC94B}">
-              <ma14:wrappingTextBoxFlag xmlns="" xmlns:m="http://schemas.openxmlformats.org/officeDocument/2006/math" xmlns:a14="http://schemas.microsoft.com/office/drawing/2010/main" xmlns:ma14="http://schemas.microsoft.com/office/mac/drawingml/2011/main" val="1"/>
+              <ma14:wrappingTextBoxFlag xmlns:ma14="http://schemas.microsoft.com/office/mac/drawingml/2011/main" xmlns:a14="http://schemas.microsoft.com/office/drawing/2010/main" xmlns:m="http://schemas.openxmlformats.org/officeDocument/2006/math" xmlns="" val="1"/>
             </a:ext>
           </a:extLst>
         </p:spPr>
@@ -6475,7 +6478,7 @@
           </a:ln>
           <a:extLst>
             <a:ext uri="{C572A759-6A51-4108-AA02-DFA0A04FC94B}">
-              <ma14:wrappingTextBoxFlag xmlns="" xmlns:m="http://schemas.openxmlformats.org/officeDocument/2006/math" xmlns:a14="http://schemas.microsoft.com/office/drawing/2010/main" xmlns:ma14="http://schemas.microsoft.com/office/mac/drawingml/2011/main" val="1"/>
+              <ma14:wrappingTextBoxFlag xmlns:ma14="http://schemas.microsoft.com/office/mac/drawingml/2011/main" xmlns:a14="http://schemas.microsoft.com/office/drawing/2010/main" xmlns:m="http://schemas.openxmlformats.org/officeDocument/2006/math" xmlns="" val="1"/>
             </a:ext>
           </a:extLst>
         </p:spPr>
@@ -6519,7 +6522,7 @@
           </a:ln>
           <a:extLst>
             <a:ext uri="{C572A759-6A51-4108-AA02-DFA0A04FC94B}">
-              <ma14:wrappingTextBoxFlag xmlns="" xmlns:m="http://schemas.openxmlformats.org/officeDocument/2006/math" xmlns:a14="http://schemas.microsoft.com/office/drawing/2010/main" xmlns:ma14="http://schemas.microsoft.com/office/mac/drawingml/2011/main" val="1"/>
+              <ma14:wrappingTextBoxFlag xmlns:ma14="http://schemas.microsoft.com/office/mac/drawingml/2011/main" xmlns:a14="http://schemas.microsoft.com/office/drawing/2010/main" xmlns:m="http://schemas.openxmlformats.org/officeDocument/2006/math" xmlns="" val="1"/>
             </a:ext>
           </a:extLst>
         </p:spPr>
@@ -6570,7 +6573,7 @@
           </a:ln>
           <a:extLst>
             <a:ext uri="{C572A759-6A51-4108-AA02-DFA0A04FC94B}">
-              <ma14:wrappingTextBoxFlag xmlns="" xmlns:m="http://schemas.openxmlformats.org/officeDocument/2006/math" xmlns:a14="http://schemas.microsoft.com/office/drawing/2010/main" xmlns:ma14="http://schemas.microsoft.com/office/mac/drawingml/2011/main" val="1"/>
+              <ma14:wrappingTextBoxFlag xmlns:ma14="http://schemas.microsoft.com/office/mac/drawingml/2011/main" xmlns:a14="http://schemas.microsoft.com/office/drawing/2010/main" xmlns:m="http://schemas.openxmlformats.org/officeDocument/2006/math" xmlns="" val="1"/>
             </a:ext>
           </a:extLst>
         </p:spPr>
@@ -6674,7 +6677,7 @@
           </a:ln>
           <a:extLst>
             <a:ext uri="{C572A759-6A51-4108-AA02-DFA0A04FC94B}">
-              <ma14:wrappingTextBoxFlag xmlns="" xmlns:m="http://schemas.openxmlformats.org/officeDocument/2006/math" xmlns:a14="http://schemas.microsoft.com/office/drawing/2010/main" xmlns:ma14="http://schemas.microsoft.com/office/mac/drawingml/2011/main" val="1"/>
+              <ma14:wrappingTextBoxFlag xmlns:ma14="http://schemas.microsoft.com/office/mac/drawingml/2011/main" xmlns:a14="http://schemas.microsoft.com/office/drawing/2010/main" xmlns:m="http://schemas.openxmlformats.org/officeDocument/2006/math" xmlns="" val="1"/>
             </a:ext>
           </a:extLst>
         </p:spPr>
@@ -6724,7 +6727,7 @@
           </a:ln>
           <a:extLst>
             <a:ext uri="{C572A759-6A51-4108-AA02-DFA0A04FC94B}">
-              <ma14:wrappingTextBoxFlag xmlns="" xmlns:m="http://schemas.openxmlformats.org/officeDocument/2006/math" xmlns:a14="http://schemas.microsoft.com/office/drawing/2010/main" xmlns:ma14="http://schemas.microsoft.com/office/mac/drawingml/2011/main" val="1"/>
+              <ma14:wrappingTextBoxFlag xmlns:ma14="http://schemas.microsoft.com/office/mac/drawingml/2011/main" xmlns:a14="http://schemas.microsoft.com/office/drawing/2010/main" xmlns:m="http://schemas.openxmlformats.org/officeDocument/2006/math" xmlns="" val="1"/>
             </a:ext>
           </a:extLst>
         </p:spPr>
@@ -6771,7 +6774,7 @@
           </a:ln>
           <a:extLst>
             <a:ext uri="{C572A759-6A51-4108-AA02-DFA0A04FC94B}">
-              <ma14:wrappingTextBoxFlag xmlns="" xmlns:m="http://schemas.openxmlformats.org/officeDocument/2006/math" xmlns:a14="http://schemas.microsoft.com/office/drawing/2010/main" xmlns:ma14="http://schemas.microsoft.com/office/mac/drawingml/2011/main" val="1"/>
+              <ma14:wrappingTextBoxFlag xmlns:ma14="http://schemas.microsoft.com/office/mac/drawingml/2011/main" xmlns:a14="http://schemas.microsoft.com/office/drawing/2010/main" xmlns:m="http://schemas.openxmlformats.org/officeDocument/2006/math" xmlns="" val="1"/>
             </a:ext>
           </a:extLst>
         </p:spPr>
@@ -6837,7 +6840,7 @@
           </a:ln>
           <a:extLst>
             <a:ext uri="{C572A759-6A51-4108-AA02-DFA0A04FC94B}">
-              <ma14:wrappingTextBoxFlag xmlns="" xmlns:m="http://schemas.openxmlformats.org/officeDocument/2006/math" xmlns:a14="http://schemas.microsoft.com/office/drawing/2010/main" xmlns:ma14="http://schemas.microsoft.com/office/mac/drawingml/2011/main" val="1"/>
+              <ma14:wrappingTextBoxFlag xmlns:ma14="http://schemas.microsoft.com/office/mac/drawingml/2011/main" xmlns:a14="http://schemas.microsoft.com/office/drawing/2010/main" xmlns:m="http://schemas.openxmlformats.org/officeDocument/2006/math" xmlns="" val="1"/>
             </a:ext>
           </a:extLst>
         </p:spPr>
@@ -6884,7 +6887,7 @@
           </a:ln>
           <a:extLst>
             <a:ext uri="{C572A759-6A51-4108-AA02-DFA0A04FC94B}">
-              <ma14:wrappingTextBoxFlag xmlns="" xmlns:m="http://schemas.openxmlformats.org/officeDocument/2006/math" xmlns:a14="http://schemas.microsoft.com/office/drawing/2010/main" xmlns:ma14="http://schemas.microsoft.com/office/mac/drawingml/2011/main" val="1"/>
+              <ma14:wrappingTextBoxFlag xmlns:ma14="http://schemas.microsoft.com/office/mac/drawingml/2011/main" xmlns:a14="http://schemas.microsoft.com/office/drawing/2010/main" xmlns:m="http://schemas.openxmlformats.org/officeDocument/2006/math" xmlns="" val="1"/>
             </a:ext>
           </a:extLst>
         </p:spPr>
@@ -7268,7 +7271,7 @@
           </a:ln>
           <a:extLst>
             <a:ext uri="{C572A759-6A51-4108-AA02-DFA0A04FC94B}">
-              <ma14:wrappingTextBoxFlag xmlns="" xmlns:m="http://schemas.openxmlformats.org/officeDocument/2006/math" xmlns:a14="http://schemas.microsoft.com/office/drawing/2010/main" xmlns:ma14="http://schemas.microsoft.com/office/mac/drawingml/2011/main" val="1"/>
+              <ma14:wrappingTextBoxFlag xmlns:ma14="http://schemas.microsoft.com/office/mac/drawingml/2011/main" xmlns:a14="http://schemas.microsoft.com/office/drawing/2010/main" xmlns:m="http://schemas.openxmlformats.org/officeDocument/2006/math" xmlns="" val="1"/>
             </a:ext>
           </a:extLst>
         </p:spPr>
@@ -7318,7 +7321,7 @@
           </a:ln>
           <a:extLst>
             <a:ext uri="{C572A759-6A51-4108-AA02-DFA0A04FC94B}">
-              <ma14:wrappingTextBoxFlag xmlns="" xmlns:m="http://schemas.openxmlformats.org/officeDocument/2006/math" xmlns:a14="http://schemas.microsoft.com/office/drawing/2010/main" xmlns:ma14="http://schemas.microsoft.com/office/mac/drawingml/2011/main" val="1"/>
+              <ma14:wrappingTextBoxFlag xmlns:ma14="http://schemas.microsoft.com/office/mac/drawingml/2011/main" xmlns:a14="http://schemas.microsoft.com/office/drawing/2010/main" xmlns:m="http://schemas.openxmlformats.org/officeDocument/2006/math" xmlns="" val="1"/>
             </a:ext>
           </a:extLst>
         </p:spPr>
@@ -7680,7 +7683,7 @@
           </a:ln>
           <a:extLst>
             <a:ext uri="{C572A759-6A51-4108-AA02-DFA0A04FC94B}">
-              <ma14:wrappingTextBoxFlag xmlns="" xmlns:m="http://schemas.openxmlformats.org/officeDocument/2006/math" xmlns:a14="http://schemas.microsoft.com/office/drawing/2010/main" xmlns:ma14="http://schemas.microsoft.com/office/mac/drawingml/2011/main" val="1"/>
+              <ma14:wrappingTextBoxFlag xmlns:ma14="http://schemas.microsoft.com/office/mac/drawingml/2011/main" xmlns:a14="http://schemas.microsoft.com/office/drawing/2010/main" xmlns:m="http://schemas.openxmlformats.org/officeDocument/2006/math" xmlns="" val="1"/>
             </a:ext>
           </a:extLst>
         </p:spPr>
@@ -7727,7 +7730,7 @@
           </a:ln>
           <a:extLst>
             <a:ext uri="{C572A759-6A51-4108-AA02-DFA0A04FC94B}">
-              <ma14:wrappingTextBoxFlag xmlns="" xmlns:m="http://schemas.openxmlformats.org/officeDocument/2006/math" xmlns:a14="http://schemas.microsoft.com/office/drawing/2010/main" xmlns:ma14="http://schemas.microsoft.com/office/mac/drawingml/2011/main" val="1"/>
+              <ma14:wrappingTextBoxFlag xmlns:ma14="http://schemas.microsoft.com/office/mac/drawingml/2011/main" xmlns:a14="http://schemas.microsoft.com/office/drawing/2010/main" xmlns:m="http://schemas.openxmlformats.org/officeDocument/2006/math" xmlns="" val="1"/>
             </a:ext>
           </a:extLst>
         </p:spPr>
@@ -7791,7 +7794,7 @@
           </a:ln>
           <a:extLst>
             <a:ext uri="{C572A759-6A51-4108-AA02-DFA0A04FC94B}">
-              <ma14:wrappingTextBoxFlag xmlns="" xmlns:m="http://schemas.openxmlformats.org/officeDocument/2006/math" xmlns:a14="http://schemas.microsoft.com/office/drawing/2010/main" xmlns:ma14="http://schemas.microsoft.com/office/mac/drawingml/2011/main" val="1"/>
+              <ma14:wrappingTextBoxFlag xmlns:ma14="http://schemas.microsoft.com/office/mac/drawingml/2011/main" xmlns:a14="http://schemas.microsoft.com/office/drawing/2010/main" xmlns:m="http://schemas.openxmlformats.org/officeDocument/2006/math" xmlns="" val="1"/>
             </a:ext>
           </a:extLst>
         </p:spPr>
@@ -7838,7 +7841,7 @@
           </a:ln>
           <a:extLst>
             <a:ext uri="{C572A759-6A51-4108-AA02-DFA0A04FC94B}">
-              <ma14:wrappingTextBoxFlag xmlns="" xmlns:m="http://schemas.openxmlformats.org/officeDocument/2006/math" xmlns:a14="http://schemas.microsoft.com/office/drawing/2010/main" xmlns:ma14="http://schemas.microsoft.com/office/mac/drawingml/2011/main" val="1"/>
+              <ma14:wrappingTextBoxFlag xmlns:ma14="http://schemas.microsoft.com/office/mac/drawingml/2011/main" xmlns:a14="http://schemas.microsoft.com/office/drawing/2010/main" xmlns:m="http://schemas.openxmlformats.org/officeDocument/2006/math" xmlns="" val="1"/>
             </a:ext>
           </a:extLst>
         </p:spPr>
@@ -7889,7 +7892,7 @@
           </a:ln>
           <a:extLst>
             <a:ext uri="{C572A759-6A51-4108-AA02-DFA0A04FC94B}">
-              <ma14:wrappingTextBoxFlag xmlns="" xmlns:m="http://schemas.openxmlformats.org/officeDocument/2006/math" xmlns:a14="http://schemas.microsoft.com/office/drawing/2010/main" xmlns:ma14="http://schemas.microsoft.com/office/mac/drawingml/2011/main" val="1"/>
+              <ma14:wrappingTextBoxFlag xmlns:ma14="http://schemas.microsoft.com/office/mac/drawingml/2011/main" xmlns:a14="http://schemas.microsoft.com/office/drawing/2010/main" xmlns:m="http://schemas.openxmlformats.org/officeDocument/2006/math" xmlns="" val="1"/>
             </a:ext>
           </a:extLst>
         </p:spPr>
@@ -7933,7 +7936,7 @@
           </a:ln>
           <a:extLst>
             <a:ext uri="{C572A759-6A51-4108-AA02-DFA0A04FC94B}">
-              <ma14:wrappingTextBoxFlag xmlns="" xmlns:m="http://schemas.openxmlformats.org/officeDocument/2006/math" xmlns:a14="http://schemas.microsoft.com/office/drawing/2010/main" xmlns:ma14="http://schemas.microsoft.com/office/mac/drawingml/2011/main" val="1"/>
+              <ma14:wrappingTextBoxFlag xmlns:ma14="http://schemas.microsoft.com/office/mac/drawingml/2011/main" xmlns:a14="http://schemas.microsoft.com/office/drawing/2010/main" xmlns:m="http://schemas.openxmlformats.org/officeDocument/2006/math" xmlns="" val="1"/>
             </a:ext>
           </a:extLst>
         </p:spPr>
@@ -7984,7 +7987,7 @@
           </a:ln>
           <a:extLst>
             <a:ext uri="{C572A759-6A51-4108-AA02-DFA0A04FC94B}">
-              <ma14:wrappingTextBoxFlag xmlns="" xmlns:m="http://schemas.openxmlformats.org/officeDocument/2006/math" xmlns:a14="http://schemas.microsoft.com/office/drawing/2010/main" xmlns:ma14="http://schemas.microsoft.com/office/mac/drawingml/2011/main" val="1"/>
+              <ma14:wrappingTextBoxFlag xmlns:ma14="http://schemas.microsoft.com/office/mac/drawingml/2011/main" xmlns:a14="http://schemas.microsoft.com/office/drawing/2010/main" xmlns:m="http://schemas.openxmlformats.org/officeDocument/2006/math" xmlns="" val="1"/>
             </a:ext>
           </a:extLst>
         </p:spPr>
@@ -8060,7 +8063,7 @@
           </a:ln>
           <a:extLst>
             <a:ext uri="{C572A759-6A51-4108-AA02-DFA0A04FC94B}">
-              <ma14:wrappingTextBoxFlag xmlns="" xmlns:m="http://schemas.openxmlformats.org/officeDocument/2006/math" xmlns:a14="http://schemas.microsoft.com/office/drawing/2010/main" xmlns:ma14="http://schemas.microsoft.com/office/mac/drawingml/2011/main" val="1"/>
+              <ma14:wrappingTextBoxFlag xmlns:ma14="http://schemas.microsoft.com/office/mac/drawingml/2011/main" xmlns:a14="http://schemas.microsoft.com/office/drawing/2010/main" xmlns:m="http://schemas.openxmlformats.org/officeDocument/2006/math" xmlns="" val="1"/>
             </a:ext>
           </a:extLst>
         </p:spPr>
@@ -8110,7 +8113,7 @@
           </a:ln>
           <a:extLst>
             <a:ext uri="{C572A759-6A51-4108-AA02-DFA0A04FC94B}">
-              <ma14:wrappingTextBoxFlag xmlns="" xmlns:m="http://schemas.openxmlformats.org/officeDocument/2006/math" xmlns:a14="http://schemas.microsoft.com/office/drawing/2010/main" xmlns:ma14="http://schemas.microsoft.com/office/mac/drawingml/2011/main" val="1"/>
+              <ma14:wrappingTextBoxFlag xmlns:ma14="http://schemas.microsoft.com/office/mac/drawingml/2011/main" xmlns:a14="http://schemas.microsoft.com/office/drawing/2010/main" xmlns:m="http://schemas.openxmlformats.org/officeDocument/2006/math" xmlns="" val="1"/>
             </a:ext>
           </a:extLst>
         </p:spPr>
@@ -8157,7 +8160,7 @@
           </a:ln>
           <a:extLst>
             <a:ext uri="{C572A759-6A51-4108-AA02-DFA0A04FC94B}">
-              <ma14:wrappingTextBoxFlag xmlns="" xmlns:m="http://schemas.openxmlformats.org/officeDocument/2006/math" xmlns:a14="http://schemas.microsoft.com/office/drawing/2010/main" xmlns:ma14="http://schemas.microsoft.com/office/mac/drawingml/2011/main" val="1"/>
+              <ma14:wrappingTextBoxFlag xmlns:ma14="http://schemas.microsoft.com/office/mac/drawingml/2011/main" xmlns:a14="http://schemas.microsoft.com/office/drawing/2010/main" xmlns:m="http://schemas.openxmlformats.org/officeDocument/2006/math" xmlns="" val="1"/>
             </a:ext>
           </a:extLst>
         </p:spPr>
@@ -8215,7 +8218,7 @@
           </a:ln>
           <a:extLst>
             <a:ext uri="{C572A759-6A51-4108-AA02-DFA0A04FC94B}">
-              <ma14:wrappingTextBoxFlag xmlns="" xmlns:m="http://schemas.openxmlformats.org/officeDocument/2006/math" xmlns:a14="http://schemas.microsoft.com/office/drawing/2010/main" xmlns:ma14="http://schemas.microsoft.com/office/mac/drawingml/2011/main" val="1"/>
+              <ma14:wrappingTextBoxFlag xmlns:ma14="http://schemas.microsoft.com/office/mac/drawingml/2011/main" xmlns:a14="http://schemas.microsoft.com/office/drawing/2010/main" xmlns:m="http://schemas.openxmlformats.org/officeDocument/2006/math" xmlns="" val="1"/>
             </a:ext>
           </a:extLst>
         </p:spPr>
@@ -8262,7 +8265,7 @@
           </a:ln>
           <a:extLst>
             <a:ext uri="{C572A759-6A51-4108-AA02-DFA0A04FC94B}">
-              <ma14:wrappingTextBoxFlag xmlns="" xmlns:m="http://schemas.openxmlformats.org/officeDocument/2006/math" xmlns:a14="http://schemas.microsoft.com/office/drawing/2010/main" xmlns:ma14="http://schemas.microsoft.com/office/mac/drawingml/2011/main" val="1"/>
+              <ma14:wrappingTextBoxFlag xmlns:ma14="http://schemas.microsoft.com/office/mac/drawingml/2011/main" xmlns:a14="http://schemas.microsoft.com/office/drawing/2010/main" xmlns:m="http://schemas.openxmlformats.org/officeDocument/2006/math" xmlns="" val="1"/>
             </a:ext>
           </a:extLst>
         </p:spPr>
@@ -8370,7 +8373,7 @@
           </a:ln>
           <a:extLst>
             <a:ext uri="{C572A759-6A51-4108-AA02-DFA0A04FC94B}">
-              <ma14:wrappingTextBoxFlag xmlns="" xmlns:m="http://schemas.openxmlformats.org/officeDocument/2006/math" xmlns:a14="http://schemas.microsoft.com/office/drawing/2010/main" xmlns:ma14="http://schemas.microsoft.com/office/mac/drawingml/2011/main" val="1"/>
+              <ma14:wrappingTextBoxFlag xmlns:ma14="http://schemas.microsoft.com/office/mac/drawingml/2011/main" xmlns:a14="http://schemas.microsoft.com/office/drawing/2010/main" xmlns:m="http://schemas.openxmlformats.org/officeDocument/2006/math" xmlns="" val="1"/>
             </a:ext>
           </a:extLst>
         </p:spPr>
@@ -8420,7 +8423,7 @@
           </a:ln>
           <a:extLst>
             <a:ext uri="{C572A759-6A51-4108-AA02-DFA0A04FC94B}">
-              <ma14:wrappingTextBoxFlag xmlns="" xmlns:m="http://schemas.openxmlformats.org/officeDocument/2006/math" xmlns:a14="http://schemas.microsoft.com/office/drawing/2010/main" xmlns:ma14="http://schemas.microsoft.com/office/mac/drawingml/2011/main" val="1"/>
+              <ma14:wrappingTextBoxFlag xmlns:ma14="http://schemas.microsoft.com/office/mac/drawingml/2011/main" xmlns:a14="http://schemas.microsoft.com/office/drawing/2010/main" xmlns:m="http://schemas.openxmlformats.org/officeDocument/2006/math" xmlns="" val="1"/>
             </a:ext>
           </a:extLst>
         </p:spPr>
@@ -8500,174 +8503,99 @@
       </p:grpSpPr>
       <p:sp>
         <p:nvSpPr>
-          <p:cNvPr id="235" name="Title 1"/>
-          <p:cNvSpPr txBox="1">
+          <p:cNvPr id="2" name="Title 1">
+            <a:extLst>
+              <a:ext uri="{FF2B5EF4-FFF2-40B4-BE49-F238E27FC236}">
+                <a16:creationId xmlns:a16="http://schemas.microsoft.com/office/drawing/2014/main" id="{DBC5D14A-C6F2-4DB7-95B9-63F4D36CBA05}"/>
+              </a:ext>
+            </a:extLst>
+          </p:cNvPr>
+          <p:cNvSpPr>
             <a:spLocks noGrp="1"/>
           </p:cNvSpPr>
           <p:nvPr>
             <p:ph type="title"/>
           </p:nvPr>
         </p:nvSpPr>
-        <p:spPr>
-          <a:xfrm>
-            <a:off x="164591" y="155446"/>
-            <a:ext cx="2525152" cy="978413"/>
-          </a:xfrm>
-          <a:prstGeom prst="rect">
-            <a:avLst/>
-          </a:prstGeom>
-        </p:spPr>
+        <p:spPr/>
         <p:txBody>
           <a:bodyPr/>
           <a:lstStyle/>
           <a:p>
             <a:r>
-              <a:t>Prediction with Decision Trees</a:t>
-            </a:r>
+              <a:rPr lang="en-US" dirty="0"/>
+              <a:t>Depth Selection for Decision Tree</a:t>
+            </a:r>
+          </a:p>
+        </p:txBody>
+      </p:sp>
+      <p:sp>
+        <p:nvSpPr>
+          <p:cNvPr id="4" name="Text Placeholder 3">
+            <a:extLst>
+              <a:ext uri="{FF2B5EF4-FFF2-40B4-BE49-F238E27FC236}">
+                <a16:creationId xmlns:a16="http://schemas.microsoft.com/office/drawing/2014/main" id="{91BA11CC-2570-4CA2-85A0-61FA5DC37BCE}"/>
+              </a:ext>
+            </a:extLst>
+          </p:cNvPr>
+          <p:cNvSpPr>
+            <a:spLocks noGrp="1"/>
+          </p:cNvSpPr>
+          <p:nvPr>
+            <p:ph type="body" idx="1"/>
+          </p:nvPr>
+        </p:nvSpPr>
+        <p:spPr/>
+        <p:txBody>
+          <a:bodyPr/>
+          <a:lstStyle/>
+          <a:p>
+            <a:endParaRPr lang="en-US"/>
           </a:p>
         </p:txBody>
       </p:sp>
       <p:pic>
         <p:nvPicPr>
-          <p:cNvPr id="236" name="Picture Placeholder 9" descr="Picture Placeholder 9"/>
+          <p:cNvPr id="6" name="Picture 5" descr="Chart, line chart&#10;&#10;Description automatically generated">
+            <a:extLst>
+              <a:ext uri="{FF2B5EF4-FFF2-40B4-BE49-F238E27FC236}">
+                <a16:creationId xmlns:a16="http://schemas.microsoft.com/office/drawing/2014/main" id="{6547C447-D8E6-4908-A845-AA39EF404E37}"/>
+              </a:ext>
+            </a:extLst>
+          </p:cNvPr>
           <p:cNvPicPr>
-            <a:picLocks noGrp="1" noChangeAspect="1"/>
+            <a:picLocks noChangeAspect="1"/>
           </p:cNvPicPr>
-          <p:nvPr>
-            <p:ph type="pic" idx="13"/>
-          </p:nvPr>
+          <p:nvPr/>
         </p:nvPicPr>
         <p:blipFill>
-          <a:blip r:embed="rId2" cstate="print"/>
-          <a:srcRect l="17313" r="17313"/>
+          <a:blip r:embed="rId2">
+            <a:extLst>
+              <a:ext uri="{28A0092B-C50C-407E-A947-70E740481C1C}">
+                <a14:useLocalDpi xmlns:a14="http://schemas.microsoft.com/office/drawing/2010/main" val="0"/>
+              </a:ext>
+            </a:extLst>
+          </a:blip>
           <a:stretch>
             <a:fillRect/>
           </a:stretch>
         </p:blipFill>
         <p:spPr>
           <a:xfrm>
-            <a:off x="2903802" y="1484808"/>
-            <a:ext cx="6247402" cy="5373193"/>
+            <a:off x="0" y="1517486"/>
+            <a:ext cx="9144000" cy="5141019"/>
           </a:xfrm>
           <a:prstGeom prst="rect">
             <a:avLst/>
           </a:prstGeom>
         </p:spPr>
       </p:pic>
-      <p:sp>
-        <p:nvSpPr>
-          <p:cNvPr id="237" name="Text Placeholder 2"/>
-          <p:cNvSpPr txBox="1">
-            <a:spLocks noGrp="1"/>
-          </p:cNvSpPr>
-          <p:nvPr>
-            <p:ph type="body" sz="quarter" idx="1"/>
-          </p:nvPr>
-        </p:nvSpPr>
-        <p:spPr>
-          <a:xfrm>
-            <a:off x="164591" y="1728216"/>
-            <a:ext cx="2468882" cy="4572002"/>
-          </a:xfrm>
-          <a:prstGeom prst="rect">
-            <a:avLst/>
-          </a:prstGeom>
-        </p:spPr>
-        <p:txBody>
-          <a:bodyPr/>
-          <a:lstStyle/>
-          <a:p>
-            <a:pPr indent="118871"/>
-            <a:r>
-              <a:t>The average confusion matrix for the best depth decision tree (depth 5) are as follows:</a:t>
-            </a:r>
-          </a:p>
-          <a:p>
-            <a:pPr marL="285750" indent="-285750">
-              <a:buSzPct val="100000"/>
-              <a:buFont typeface="Arial"/>
-              <a:buChar char="•"/>
-            </a:pPr>
-            <a:r>
-              <a:t>75 were correctly classified positive</a:t>
-            </a:r>
-          </a:p>
-          <a:p>
-            <a:pPr marL="285750" indent="-285750">
-              <a:buSzPct val="100000"/>
-              <a:buFont typeface="Arial"/>
-              <a:buChar char="•"/>
-            </a:pPr>
-            <a:r>
-              <a:t>75 were correctly classified negative</a:t>
-            </a:r>
-          </a:p>
-          <a:p>
-            <a:pPr marL="285750" indent="-285750">
-              <a:buSzPct val="100000"/>
-              <a:buFont typeface="Arial"/>
-              <a:buChar char="•"/>
-            </a:pPr>
-            <a:r>
-              <a:t>An average of 47 were incorrectly classified as positive</a:t>
-            </a:r>
-          </a:p>
-          <a:p>
-            <a:pPr marL="285750" indent="-285750">
-              <a:buSzPct val="100000"/>
-              <a:buFont typeface="Arial"/>
-              <a:buChar char="•"/>
-            </a:pPr>
-            <a:r>
-              <a:t>An average of 32 were incorrectly classified as negative</a:t>
-            </a:r>
-          </a:p>
-        </p:txBody>
-      </p:sp>
-      <p:sp>
-        <p:nvSpPr>
-          <p:cNvPr id="238" name="TextBox 12"/>
-          <p:cNvSpPr txBox="1"/>
-          <p:nvPr/>
-        </p:nvSpPr>
-        <p:spPr>
-          <a:xfrm>
-            <a:off x="3006969" y="459988"/>
-            <a:ext cx="5972439" cy="370837"/>
-          </a:xfrm>
-          <a:prstGeom prst="rect">
-            <a:avLst/>
-          </a:prstGeom>
-          <a:ln w="12700">
-            <a:miter lim="400000"/>
-          </a:ln>
-          <a:extLst>
-            <a:ext uri="{C572A759-6A51-4108-AA02-DFA0A04FC94B}">
-              <ma14:wrappingTextBoxFlag xmlns="" xmlns:m="http://schemas.openxmlformats.org/officeDocument/2006/math" xmlns:a14="http://schemas.microsoft.com/office/drawing/2010/main" xmlns:ma14="http://schemas.microsoft.com/office/mac/drawingml/2011/main" val="1"/>
-            </a:ext>
-          </a:extLst>
-        </p:spPr>
-        <p:txBody>
-          <a:bodyPr lIns="45718" tIns="45718" rIns="45718" bIns="45718">
-            <a:spAutoFit/>
-          </a:bodyPr>
-          <a:lstStyle>
-            <a:lvl1pPr>
-              <a:defRPr>
-                <a:solidFill>
-                  <a:srgbClr val="FFFFFF"/>
-                </a:solidFill>
-              </a:defRPr>
-            </a:lvl1pPr>
-          </a:lstStyle>
-          <a:p>
-            <a:r>
-              <a:t>Confusion Matrix</a:t>
-            </a:r>
-          </a:p>
-        </p:txBody>
-      </p:sp>
     </p:spTree>
+    <p:extLst>
+      <p:ext uri="{BB962C8B-B14F-4D97-AF65-F5344CB8AC3E}">
+        <p14:creationId xmlns:p14="http://schemas.microsoft.com/office/powerpoint/2010/main" val="344719140"/>
+      </p:ext>
+    </p:extLst>
   </p:cSld>
   <p:clrMapOvr>
     <a:masterClrMapping/>
@@ -8695,7 +8623,7 @@
       </p:grpSpPr>
       <p:sp>
         <p:nvSpPr>
-          <p:cNvPr id="240" name="Title 1"/>
+          <p:cNvPr id="248" name="Title 4"/>
           <p:cNvSpPr txBox="1">
             <a:spLocks noGrp="1"/>
           </p:cNvSpPr>
@@ -8717,14 +8645,14 @@
           <a:lstStyle/>
           <a:p>
             <a:r>
-              <a:t>Prediction with Decision Trees</a:t>
-            </a:r>
-          </a:p>
-        </p:txBody>
-      </p:sp>
-      <p:sp>
-        <p:nvSpPr>
-          <p:cNvPr id="241" name="Text Placeholder 6"/>
+              <a:t>The Decision Tree</a:t>
+            </a:r>
+          </a:p>
+        </p:txBody>
+      </p:sp>
+      <p:sp>
+        <p:nvSpPr>
+          <p:cNvPr id="249" name="Text Placeholder 5"/>
           <p:cNvSpPr txBox="1">
             <a:spLocks noGrp="1"/>
           </p:cNvSpPr>
@@ -8746,130 +8674,40 @@
           <a:lstStyle/>
           <a:p>
             <a:pPr marL="0" indent="118871">
-              <a:lnSpc>
-                <a:spcPct val="80000"/>
-              </a:lnSpc>
               <a:buSzTx/>
               <a:buNone/>
-              <a:defRPr sz="2200"/>
-            </a:pPr>
-            <a:r>
-              <a:t>Precision:</a:t>
-            </a:r>
-          </a:p>
-          <a:p>
-            <a:pPr marL="0" indent="118871">
-              <a:lnSpc>
-                <a:spcPct val="80000"/>
-              </a:lnSpc>
-              <a:buSzTx/>
-              <a:buNone/>
-              <a:defRPr sz="2200"/>
-            </a:pPr>
-            <a:r>
-              <a:t>The percentage of the accuracy of our positive predictions, represented by the Precision, is:  </a:t>
-            </a:r>
-            <a:r>
-              <a:rPr i="1">
-                <a:solidFill>
-                  <a:srgbClr val="0070C0"/>
-                </a:solidFill>
-              </a:rPr>
-              <a:t>60.98%</a:t>
-            </a:r>
-          </a:p>
-          <a:p>
-            <a:pPr marL="0" indent="118871">
-              <a:lnSpc>
-                <a:spcPct val="80000"/>
-              </a:lnSpc>
-              <a:buSzTx/>
-              <a:buNone/>
-              <a:defRPr sz="2200"/>
             </a:pPr>
             <a:endParaRPr/>
           </a:p>
-          <a:p>
-            <a:pPr marL="0" indent="118871">
-              <a:lnSpc>
-                <a:spcPct val="80000"/>
-              </a:lnSpc>
-              <a:buSzTx/>
-              <a:buNone/>
-              <a:defRPr sz="2200"/>
-            </a:pPr>
-            <a:r>
-              <a:t>Recall: </a:t>
-            </a:r>
-          </a:p>
-          <a:p>
-            <a:pPr marL="0" indent="118871">
-              <a:lnSpc>
-                <a:spcPct val="80000"/>
-              </a:lnSpc>
-              <a:buSzTx/>
-              <a:buNone/>
-              <a:defRPr sz="2200"/>
-            </a:pPr>
-            <a:r>
-              <a:t>The ratio of positive instances that are correctly detected by the classifier (true positive rate), represented by the Recall, is:  </a:t>
-            </a:r>
-            <a:r>
-              <a:rPr i="1">
-                <a:solidFill>
-                  <a:srgbClr val="0070C0"/>
-                </a:solidFill>
-              </a:rPr>
-              <a:t>70.09%</a:t>
-            </a:r>
-          </a:p>
-          <a:p>
-            <a:pPr marL="0" indent="118871">
-              <a:lnSpc>
-                <a:spcPct val="80000"/>
-              </a:lnSpc>
-              <a:buSzTx/>
-              <a:buNone/>
-              <a:defRPr sz="2200"/>
-            </a:pPr>
-            <a:endParaRPr/>
-          </a:p>
-          <a:p>
-            <a:pPr marL="0" indent="118871">
-              <a:lnSpc>
-                <a:spcPct val="80000"/>
-              </a:lnSpc>
-              <a:buSzTx/>
-              <a:buNone/>
-              <a:defRPr sz="2200"/>
-            </a:pPr>
-            <a:r>
-              <a:t>F1-Score: </a:t>
-            </a:r>
-          </a:p>
-          <a:p>
-            <a:pPr marL="0" indent="118871">
-              <a:lnSpc>
-                <a:spcPct val="80000"/>
-              </a:lnSpc>
-              <a:buSzTx/>
-              <a:buNone/>
-              <a:defRPr sz="2200"/>
-            </a:pPr>
-            <a:r>
-              <a:t>The F1-score, represented by the harmonic mean of precision and recall which,  differently from the regular mean (that gives equal weight to all values),  gives more weight  to low values - favoring classifiers that have similar precision and recall  - is:   </a:t>
-            </a:r>
-            <a:r>
-              <a:rPr sz="2500" i="1">
-                <a:solidFill>
-                  <a:srgbClr val="0070C0"/>
-                </a:solidFill>
-              </a:rPr>
-              <a:t>65.22%</a:t>
-            </a:r>
-          </a:p>
-        </p:txBody>
-      </p:sp>
+        </p:txBody>
+      </p:sp>
+      <p:pic>
+        <p:nvPicPr>
+          <p:cNvPr id="250" name="Picture 11" descr="Picture 11"/>
+          <p:cNvPicPr>
+            <a:picLocks noChangeAspect="1"/>
+          </p:cNvPicPr>
+          <p:nvPr/>
+        </p:nvPicPr>
+        <p:blipFill>
+          <a:blip r:embed="rId2" cstate="print"/>
+          <a:stretch>
+            <a:fillRect/>
+          </a:stretch>
+        </p:blipFill>
+        <p:spPr>
+          <a:xfrm>
+            <a:off x="457200" y="1775191"/>
+            <a:ext cx="8229600" cy="4626918"/>
+          </a:xfrm>
+          <a:prstGeom prst="rect">
+            <a:avLst/>
+          </a:prstGeom>
+          <a:ln w="12700">
+            <a:miter lim="400000"/>
+          </a:ln>
+        </p:spPr>
+      </p:pic>
     </p:spTree>
   </p:cSld>
   <p:clrMapOvr>
@@ -8898,7 +8736,7 @@
       </p:grpSpPr>
       <p:sp>
         <p:nvSpPr>
-          <p:cNvPr id="243" name="Title 1"/>
+          <p:cNvPr id="235" name="Title 1"/>
           <p:cNvSpPr txBox="1">
             <a:spLocks noGrp="1"/>
           </p:cNvSpPr>
@@ -8925,9 +8763,36 @@
           </a:p>
         </p:txBody>
       </p:sp>
-      <p:sp>
-        <p:nvSpPr>
-          <p:cNvPr id="244" name="Text Placeholder 2"/>
+      <p:pic>
+        <p:nvPicPr>
+          <p:cNvPr id="236" name="Picture Placeholder 9" descr="Picture Placeholder 9"/>
+          <p:cNvPicPr>
+            <a:picLocks noGrp="1" noChangeAspect="1"/>
+          </p:cNvPicPr>
+          <p:nvPr>
+            <p:ph type="pic" idx="13"/>
+          </p:nvPr>
+        </p:nvPicPr>
+        <p:blipFill>
+          <a:blip r:embed="rId2" cstate="print"/>
+          <a:srcRect l="17313" r="17313"/>
+          <a:stretch>
+            <a:fillRect/>
+          </a:stretch>
+        </p:blipFill>
+        <p:spPr>
+          <a:xfrm>
+            <a:off x="2903802" y="1484808"/>
+            <a:ext cx="6247402" cy="5373193"/>
+          </a:xfrm>
+          <a:prstGeom prst="rect">
+            <a:avLst/>
+          </a:prstGeom>
+        </p:spPr>
+      </p:pic>
+      <p:sp>
+        <p:nvSpPr>
+          <p:cNvPr id="237" name="Text Placeholder 2"/>
           <p:cNvSpPr txBox="1">
             <a:spLocks noGrp="1"/>
           </p:cNvSpPr>
@@ -8950,62 +8815,54 @@
           <a:p>
             <a:pPr indent="118871"/>
             <a:r>
-              <a:t>The curve to the right represents the ROC of our model.</a:t>
-            </a:r>
-          </a:p>
-          <a:p>
-            <a:pPr indent="118871"/>
-            <a:r>
-              <a:t>The Area Under Curve is: </a:t>
-            </a:r>
-            <a:r>
-              <a:rPr i="1">
-                <a:solidFill>
-                  <a:srgbClr val="0070C0"/>
-                </a:solidFill>
-              </a:rPr>
-              <a:t>0.689</a:t>
-            </a:r>
-          </a:p>
-          <a:p>
-            <a:pPr indent="118871">
-              <a:defRPr i="1">
-                <a:solidFill>
-                  <a:srgbClr val="0070C0"/>
-                </a:solidFill>
-              </a:defRPr>
-            </a:pPr>
-            <a:endParaRPr/>
-          </a:p>
-          <a:p>
-            <a:pPr indent="118871"/>
-            <a:r>
-              <a:t>Accuracy: </a:t>
-            </a:r>
-          </a:p>
-          <a:p>
-            <a:pPr indent="118871"/>
-            <a:r>
-              <a:t>he overall predicted accuracy of the model is: </a:t>
-            </a:r>
-            <a:r>
-              <a:rPr i="1">
-                <a:solidFill>
-                  <a:srgbClr val="0070C0"/>
-                </a:solidFill>
-              </a:rPr>
-              <a:t>65.07%</a:t>
-            </a:r>
-            <a:r>
-              <a:rPr sz="900"/>
-              <a:t> </a:t>
-            </a:r>
-          </a:p>
-        </p:txBody>
-      </p:sp>
-      <p:sp>
-        <p:nvSpPr>
-          <p:cNvPr id="245" name="TextBox 12"/>
+              <a:t>The average confusion matrix for the best depth decision tree (depth 5) are as follows:</a:t>
+            </a:r>
+          </a:p>
+          <a:p>
+            <a:pPr marL="285750" indent="-285750">
+              <a:buSzPct val="100000"/>
+              <a:buFont typeface="Arial"/>
+              <a:buChar char="•"/>
+            </a:pPr>
+            <a:r>
+              <a:t>75 were correctly classified positive</a:t>
+            </a:r>
+          </a:p>
+          <a:p>
+            <a:pPr marL="285750" indent="-285750">
+              <a:buSzPct val="100000"/>
+              <a:buFont typeface="Arial"/>
+              <a:buChar char="•"/>
+            </a:pPr>
+            <a:r>
+              <a:t>75 were correctly classified negative</a:t>
+            </a:r>
+          </a:p>
+          <a:p>
+            <a:pPr marL="285750" indent="-285750">
+              <a:buSzPct val="100000"/>
+              <a:buFont typeface="Arial"/>
+              <a:buChar char="•"/>
+            </a:pPr>
+            <a:r>
+              <a:t>An average of 47 were incorrectly classified as positive</a:t>
+            </a:r>
+          </a:p>
+          <a:p>
+            <a:pPr marL="285750" indent="-285750">
+              <a:buSzPct val="100000"/>
+              <a:buFont typeface="Arial"/>
+              <a:buChar char="•"/>
+            </a:pPr>
+            <a:r>
+              <a:t>An average of 32 were incorrectly classified as negative</a:t>
+            </a:r>
+          </a:p>
+        </p:txBody>
+      </p:sp>
+      <p:sp>
+        <p:nvSpPr>
+          <p:cNvPr id="238" name="TextBox 12"/>
           <p:cNvSpPr txBox="1"/>
           <p:nvPr/>
         </p:nvSpPr>
@@ -9022,7 +8879,7 @@
           </a:ln>
           <a:extLst>
             <a:ext uri="{C572A759-6A51-4108-AA02-DFA0A04FC94B}">
-              <ma14:wrappingTextBoxFlag xmlns="" xmlns:m="http://schemas.openxmlformats.org/officeDocument/2006/math" xmlns:a14="http://schemas.microsoft.com/office/drawing/2010/main" xmlns:ma14="http://schemas.microsoft.com/office/mac/drawingml/2011/main" val="1"/>
+              <ma14:wrappingTextBoxFlag xmlns:ma14="http://schemas.microsoft.com/office/mac/drawingml/2011/main" xmlns:a14="http://schemas.microsoft.com/office/drawing/2010/main" xmlns:m="http://schemas.openxmlformats.org/officeDocument/2006/math" xmlns="" val="1"/>
             </a:ext>
           </a:extLst>
         </p:spPr>
@@ -9041,37 +8898,11 @@
           </a:lstStyle>
           <a:p>
             <a:r>
-              <a:t>ROC, AUC and Accuracy</a:t>
-            </a:r>
-          </a:p>
-        </p:txBody>
-      </p:sp>
-      <p:pic>
-        <p:nvPicPr>
-          <p:cNvPr id="246" name="Picture Placeholder 11" descr="Picture Placeholder 11"/>
-          <p:cNvPicPr>
-            <a:picLocks noGrp="1" noChangeAspect="1"/>
-          </p:cNvPicPr>
-          <p:nvPr>
-            <p:ph type="pic" idx="13"/>
-          </p:nvPr>
-        </p:nvPicPr>
-        <p:blipFill>
-          <a:blip r:embed="rId2" cstate="print"/>
-          <a:stretch>
-            <a:fillRect/>
-          </a:stretch>
-        </p:blipFill>
-        <p:spPr>
-          <a:xfrm>
-            <a:off x="3249363" y="2184999"/>
-            <a:ext cx="5487651" cy="3658434"/>
-          </a:xfrm>
-          <a:prstGeom prst="rect">
-            <a:avLst/>
-          </a:prstGeom>
-        </p:spPr>
-      </p:pic>
+              <a:t>Confusion Matrix</a:t>
+            </a:r>
+          </a:p>
+        </p:txBody>
+      </p:sp>
     </p:spTree>
   </p:cSld>
   <p:clrMapOvr>
@@ -9100,7 +8931,7 @@
       </p:grpSpPr>
       <p:sp>
         <p:nvSpPr>
-          <p:cNvPr id="248" name="Title 4"/>
+          <p:cNvPr id="240" name="Title 1"/>
           <p:cNvSpPr txBox="1">
             <a:spLocks noGrp="1"/>
           </p:cNvSpPr>
@@ -9122,14 +8953,14 @@
           <a:lstStyle/>
           <a:p>
             <a:r>
-              <a:t>The Decision Tree</a:t>
-            </a:r>
-          </a:p>
-        </p:txBody>
-      </p:sp>
-      <p:sp>
-        <p:nvSpPr>
-          <p:cNvPr id="249" name="Text Placeholder 5"/>
+              <a:t>Prediction with Decision Trees</a:t>
+            </a:r>
+          </a:p>
+        </p:txBody>
+      </p:sp>
+      <p:sp>
+        <p:nvSpPr>
+          <p:cNvPr id="241" name="Text Placeholder 6"/>
           <p:cNvSpPr txBox="1">
             <a:spLocks noGrp="1"/>
           </p:cNvSpPr>
@@ -9151,40 +8982,130 @@
           <a:lstStyle/>
           <a:p>
             <a:pPr marL="0" indent="118871">
+              <a:lnSpc>
+                <a:spcPct val="80000"/>
+              </a:lnSpc>
               <a:buSzTx/>
               <a:buNone/>
+              <a:defRPr sz="2200"/>
+            </a:pPr>
+            <a:r>
+              <a:t>Precision:</a:t>
+            </a:r>
+          </a:p>
+          <a:p>
+            <a:pPr marL="0" indent="118871">
+              <a:lnSpc>
+                <a:spcPct val="80000"/>
+              </a:lnSpc>
+              <a:buSzTx/>
+              <a:buNone/>
+              <a:defRPr sz="2200"/>
+            </a:pPr>
+            <a:r>
+              <a:t>The percentage of the accuracy of our positive predictions, represented by the Precision, is:  </a:t>
+            </a:r>
+            <a:r>
+              <a:rPr i="1">
+                <a:solidFill>
+                  <a:srgbClr val="0070C0"/>
+                </a:solidFill>
+              </a:rPr>
+              <a:t>60.98%</a:t>
+            </a:r>
+          </a:p>
+          <a:p>
+            <a:pPr marL="0" indent="118871">
+              <a:lnSpc>
+                <a:spcPct val="80000"/>
+              </a:lnSpc>
+              <a:buSzTx/>
+              <a:buNone/>
+              <a:defRPr sz="2200"/>
             </a:pPr>
             <a:endParaRPr/>
           </a:p>
-        </p:txBody>
-      </p:sp>
-      <p:pic>
-        <p:nvPicPr>
-          <p:cNvPr id="250" name="Picture 11" descr="Picture 11"/>
-          <p:cNvPicPr>
-            <a:picLocks noChangeAspect="1"/>
-          </p:cNvPicPr>
-          <p:nvPr/>
-        </p:nvPicPr>
-        <p:blipFill>
-          <a:blip r:embed="rId2" cstate="print"/>
-          <a:stretch>
-            <a:fillRect/>
-          </a:stretch>
-        </p:blipFill>
-        <p:spPr>
-          <a:xfrm>
-            <a:off x="457200" y="1775191"/>
-            <a:ext cx="8229600" cy="4626918"/>
-          </a:xfrm>
-          <a:prstGeom prst="rect">
-            <a:avLst/>
-          </a:prstGeom>
-          <a:ln w="12700">
-            <a:miter lim="400000"/>
-          </a:ln>
-        </p:spPr>
-      </p:pic>
+          <a:p>
+            <a:pPr marL="0" indent="118871">
+              <a:lnSpc>
+                <a:spcPct val="80000"/>
+              </a:lnSpc>
+              <a:buSzTx/>
+              <a:buNone/>
+              <a:defRPr sz="2200"/>
+            </a:pPr>
+            <a:r>
+              <a:t>Recall: </a:t>
+            </a:r>
+          </a:p>
+          <a:p>
+            <a:pPr marL="0" indent="118871">
+              <a:lnSpc>
+                <a:spcPct val="80000"/>
+              </a:lnSpc>
+              <a:buSzTx/>
+              <a:buNone/>
+              <a:defRPr sz="2200"/>
+            </a:pPr>
+            <a:r>
+              <a:t>The ratio of positive instances that are correctly detected by the classifier (true positive rate), represented by the Recall, is:  </a:t>
+            </a:r>
+            <a:r>
+              <a:rPr i="1">
+                <a:solidFill>
+                  <a:srgbClr val="0070C0"/>
+                </a:solidFill>
+              </a:rPr>
+              <a:t>70.09%</a:t>
+            </a:r>
+          </a:p>
+          <a:p>
+            <a:pPr marL="0" indent="118871">
+              <a:lnSpc>
+                <a:spcPct val="80000"/>
+              </a:lnSpc>
+              <a:buSzTx/>
+              <a:buNone/>
+              <a:defRPr sz="2200"/>
+            </a:pPr>
+            <a:endParaRPr/>
+          </a:p>
+          <a:p>
+            <a:pPr marL="0" indent="118871">
+              <a:lnSpc>
+                <a:spcPct val="80000"/>
+              </a:lnSpc>
+              <a:buSzTx/>
+              <a:buNone/>
+              <a:defRPr sz="2200"/>
+            </a:pPr>
+            <a:r>
+              <a:t>F1-Score: </a:t>
+            </a:r>
+          </a:p>
+          <a:p>
+            <a:pPr marL="0" indent="118871">
+              <a:lnSpc>
+                <a:spcPct val="80000"/>
+              </a:lnSpc>
+              <a:buSzTx/>
+              <a:buNone/>
+              <a:defRPr sz="2200"/>
+            </a:pPr>
+            <a:r>
+              <a:t>The F1-score, represented by the harmonic mean of precision and recall which,  differently from the regular mean (that gives equal weight to all values),  gives more weight  to low values - favoring classifiers that have similar precision and recall  - is:   </a:t>
+            </a:r>
+            <a:r>
+              <a:rPr sz="2500" i="1">
+                <a:solidFill>
+                  <a:srgbClr val="0070C0"/>
+                </a:solidFill>
+              </a:rPr>
+              <a:t>65.22%</a:t>
+            </a:r>
+          </a:p>
+        </p:txBody>
+      </p:sp>
     </p:spTree>
   </p:cSld>
   <p:clrMapOvr>
@@ -9213,7 +9134,7 @@
       </p:grpSpPr>
       <p:sp>
         <p:nvSpPr>
-          <p:cNvPr id="252" name="Title 1"/>
+          <p:cNvPr id="243" name="Title 1"/>
           <p:cNvSpPr txBox="1">
             <a:spLocks noGrp="1"/>
           </p:cNvSpPr>
@@ -9235,14 +9156,14 @@
           <a:lstStyle/>
           <a:p>
             <a:r>
-              <a:t>Prediction with Randon Forest Classifiers</a:t>
-            </a:r>
-          </a:p>
-        </p:txBody>
-      </p:sp>
-      <p:sp>
-        <p:nvSpPr>
-          <p:cNvPr id="253" name="Text Placeholder 2"/>
+              <a:t>Prediction with Decision Trees</a:t>
+            </a:r>
+          </a:p>
+        </p:txBody>
+      </p:sp>
+      <p:sp>
+        <p:nvSpPr>
+          <p:cNvPr id="244" name="Text Placeholder 2"/>
           <p:cNvSpPr txBox="1">
             <a:spLocks noGrp="1"/>
           </p:cNvSpPr>
@@ -9265,54 +9186,62 @@
           <a:p>
             <a:pPr indent="118871"/>
             <a:r>
-              <a:t>The average confusion matrix for the trained  Classifier has values</a:t>
-            </a:r>
-          </a:p>
-          <a:p>
-            <a:pPr marL="285750" indent="-285750">
-              <a:buSzPct val="100000"/>
-              <a:buFont typeface="Arial"/>
-              <a:buChar char="•"/>
-            </a:pPr>
-            <a:r>
-              <a:t>75 were correctly classified positive</a:t>
-            </a:r>
-          </a:p>
-          <a:p>
-            <a:pPr marL="285750" indent="-285750">
-              <a:buSzPct val="100000"/>
-              <a:buFont typeface="Arial"/>
-              <a:buChar char="•"/>
-            </a:pPr>
-            <a:r>
-              <a:t>74 were correctly classified negative</a:t>
-            </a:r>
-          </a:p>
-          <a:p>
-            <a:pPr marL="285750" indent="-285750">
-              <a:buSzPct val="100000"/>
-              <a:buFont typeface="Arial"/>
-              <a:buChar char="•"/>
-            </a:pPr>
-            <a:r>
-              <a:t>48 were incorrectly classified as positive</a:t>
-            </a:r>
-          </a:p>
-          <a:p>
-            <a:pPr marL="285750" indent="-285750">
-              <a:buSzPct val="100000"/>
-              <a:buFont typeface="Arial"/>
-              <a:buChar char="•"/>
-            </a:pPr>
-            <a:r>
-              <a:t>32 were incorrectly classified as negative</a:t>
-            </a:r>
-          </a:p>
-        </p:txBody>
-      </p:sp>
-      <p:sp>
-        <p:nvSpPr>
-          <p:cNvPr id="254" name="TextBox 12"/>
+              <a:t>The curve to the right represents the ROC of our model.</a:t>
+            </a:r>
+          </a:p>
+          <a:p>
+            <a:pPr indent="118871"/>
+            <a:r>
+              <a:t>The Area Under Curve is: </a:t>
+            </a:r>
+            <a:r>
+              <a:rPr i="1">
+                <a:solidFill>
+                  <a:srgbClr val="0070C0"/>
+                </a:solidFill>
+              </a:rPr>
+              <a:t>0.689</a:t>
+            </a:r>
+          </a:p>
+          <a:p>
+            <a:pPr indent="118871">
+              <a:defRPr i="1">
+                <a:solidFill>
+                  <a:srgbClr val="0070C0"/>
+                </a:solidFill>
+              </a:defRPr>
+            </a:pPr>
+            <a:endParaRPr/>
+          </a:p>
+          <a:p>
+            <a:pPr indent="118871"/>
+            <a:r>
+              <a:t>Accuracy: </a:t>
+            </a:r>
+          </a:p>
+          <a:p>
+            <a:pPr indent="118871"/>
+            <a:r>
+              <a:t>he overall predicted accuracy of the model is: </a:t>
+            </a:r>
+            <a:r>
+              <a:rPr i="1">
+                <a:solidFill>
+                  <a:srgbClr val="0070C0"/>
+                </a:solidFill>
+              </a:rPr>
+              <a:t>65.07%</a:t>
+            </a:r>
+            <a:r>
+              <a:rPr sz="900"/>
+              <a:t> </a:t>
+            </a:r>
+          </a:p>
+        </p:txBody>
+      </p:sp>
+      <p:sp>
+        <p:nvSpPr>
+          <p:cNvPr id="245" name="TextBox 12"/>
           <p:cNvSpPr txBox="1"/>
           <p:nvPr/>
         </p:nvSpPr>
@@ -9329,7 +9258,7 @@
           </a:ln>
           <a:extLst>
             <a:ext uri="{C572A759-6A51-4108-AA02-DFA0A04FC94B}">
-              <ma14:wrappingTextBoxFlag xmlns="" xmlns:m="http://schemas.openxmlformats.org/officeDocument/2006/math" xmlns:a14="http://schemas.microsoft.com/office/drawing/2010/main" xmlns:ma14="http://schemas.microsoft.com/office/mac/drawingml/2011/main" val="1"/>
+              <ma14:wrappingTextBoxFlag xmlns:ma14="http://schemas.microsoft.com/office/mac/drawingml/2011/main" xmlns:a14="http://schemas.microsoft.com/office/drawing/2010/main" xmlns:m="http://schemas.openxmlformats.org/officeDocument/2006/math" xmlns="" val="1"/>
             </a:ext>
           </a:extLst>
         </p:spPr>
@@ -9348,14 +9277,14 @@
           </a:lstStyle>
           <a:p>
             <a:r>
-              <a:t>Confusion Matrix</a:t>
+              <a:t>ROC, AUC and Accuracy</a:t>
             </a:r>
           </a:p>
         </p:txBody>
       </p:sp>
       <p:pic>
         <p:nvPicPr>
-          <p:cNvPr id="255" name="Picture Placeholder 7" descr="Picture Placeholder 7"/>
+          <p:cNvPr id="246" name="Picture Placeholder 11" descr="Picture Placeholder 11"/>
           <p:cNvPicPr>
             <a:picLocks noGrp="1" noChangeAspect="1"/>
           </p:cNvPicPr>
@@ -9365,15 +9294,14 @@
         </p:nvPicPr>
         <p:blipFill>
           <a:blip r:embed="rId2" cstate="print"/>
-          <a:srcRect l="17313" r="17313"/>
           <a:stretch>
             <a:fillRect/>
           </a:stretch>
         </p:blipFill>
         <p:spPr>
           <a:xfrm>
-            <a:off x="2903802" y="1484808"/>
-            <a:ext cx="6247402" cy="5373193"/>
+            <a:off x="3249363" y="2184999"/>
+            <a:ext cx="5487651" cy="3658434"/>
           </a:xfrm>
           <a:prstGeom prst="rect">
             <a:avLst/>
@@ -9408,7 +9336,7 @@
       </p:grpSpPr>
       <p:sp>
         <p:nvSpPr>
-          <p:cNvPr id="257" name="Title 1"/>
+          <p:cNvPr id="252" name="Title 1"/>
           <p:cNvSpPr txBox="1">
             <a:spLocks noGrp="1"/>
           </p:cNvSpPr>
@@ -9418,8 +9346,8 @@
         </p:nvSpPr>
         <p:spPr>
           <a:xfrm>
-            <a:off x="457200" y="155446"/>
-            <a:ext cx="8229600" cy="1252731"/>
+            <a:off x="164591" y="155446"/>
+            <a:ext cx="2525152" cy="978413"/>
           </a:xfrm>
           <a:prstGeom prst="rect">
             <a:avLst/>
@@ -9430,25 +9358,34 @@
           <a:lstStyle/>
           <a:p>
             <a:r>
-              <a:t>Prediction with Decision Trees</a:t>
-            </a:r>
-          </a:p>
-        </p:txBody>
-      </p:sp>
-      <p:sp>
-        <p:nvSpPr>
-          <p:cNvPr id="258" name="Text Placeholder 6"/>
+              <a:rPr dirty="0"/>
+              <a:t>Prediction with Rando</a:t>
+            </a:r>
+            <a:r>
+              <a:rPr lang="en-US" dirty="0"/>
+              <a:t>m</a:t>
+            </a:r>
+            <a:r>
+              <a:rPr dirty="0"/>
+              <a:t> Forest Classifiers</a:t>
+            </a:r>
+          </a:p>
+        </p:txBody>
+      </p:sp>
+      <p:sp>
+        <p:nvSpPr>
+          <p:cNvPr id="253" name="Text Placeholder 2"/>
           <p:cNvSpPr txBox="1">
             <a:spLocks noGrp="1"/>
           </p:cNvSpPr>
           <p:nvPr>
-            <p:ph type="body" idx="1"/>
+            <p:ph type="body" sz="quarter" idx="1"/>
           </p:nvPr>
         </p:nvSpPr>
         <p:spPr>
           <a:xfrm>
-            <a:off x="457200" y="1775191"/>
-            <a:ext cx="8229600" cy="4625611"/>
+            <a:off x="164591" y="1728216"/>
+            <a:ext cx="2468882" cy="4572002"/>
           </a:xfrm>
           <a:prstGeom prst="rect">
             <a:avLst/>
@@ -9458,131 +9395,123 @@
           <a:bodyPr/>
           <a:lstStyle/>
           <a:p>
-            <a:pPr marL="0" indent="118871">
-              <a:lnSpc>
-                <a:spcPct val="80000"/>
-              </a:lnSpc>
-              <a:buSzTx/>
-              <a:buNone/>
-              <a:defRPr sz="2200"/>
-            </a:pPr>
-            <a:r>
-              <a:t>Precision:</a:t>
-            </a:r>
-          </a:p>
-          <a:p>
-            <a:pPr marL="0" indent="118871">
-              <a:lnSpc>
-                <a:spcPct val="80000"/>
-              </a:lnSpc>
-              <a:buSzTx/>
-              <a:buNone/>
-              <a:defRPr sz="2200"/>
-            </a:pPr>
-            <a:r>
-              <a:t>The percentage of the accuracy of our positive predictions, represented by the Precision, is:  </a:t>
-            </a:r>
-            <a:r>
-              <a:rPr i="1">
+            <a:pPr indent="118871"/>
+            <a:r>
+              <a:t>The average confusion matrix for the trained  Classifier has values</a:t>
+            </a:r>
+          </a:p>
+          <a:p>
+            <a:pPr marL="285750" indent="-285750">
+              <a:buSzPct val="100000"/>
+              <a:buFont typeface="Arial"/>
+              <a:buChar char="•"/>
+            </a:pPr>
+            <a:r>
+              <a:t>75 were correctly classified positive</a:t>
+            </a:r>
+          </a:p>
+          <a:p>
+            <a:pPr marL="285750" indent="-285750">
+              <a:buSzPct val="100000"/>
+              <a:buFont typeface="Arial"/>
+              <a:buChar char="•"/>
+            </a:pPr>
+            <a:r>
+              <a:t>74 were correctly classified negative</a:t>
+            </a:r>
+          </a:p>
+          <a:p>
+            <a:pPr marL="285750" indent="-285750">
+              <a:buSzPct val="100000"/>
+              <a:buFont typeface="Arial"/>
+              <a:buChar char="•"/>
+            </a:pPr>
+            <a:r>
+              <a:t>48 were incorrectly classified as positive</a:t>
+            </a:r>
+          </a:p>
+          <a:p>
+            <a:pPr marL="285750" indent="-285750">
+              <a:buSzPct val="100000"/>
+              <a:buFont typeface="Arial"/>
+              <a:buChar char="•"/>
+            </a:pPr>
+            <a:r>
+              <a:t>32 were incorrectly classified as negative</a:t>
+            </a:r>
+          </a:p>
+        </p:txBody>
+      </p:sp>
+      <p:sp>
+        <p:nvSpPr>
+          <p:cNvPr id="254" name="TextBox 12"/>
+          <p:cNvSpPr txBox="1"/>
+          <p:nvPr/>
+        </p:nvSpPr>
+        <p:spPr>
+          <a:xfrm>
+            <a:off x="3006969" y="459988"/>
+            <a:ext cx="5972439" cy="370837"/>
+          </a:xfrm>
+          <a:prstGeom prst="rect">
+            <a:avLst/>
+          </a:prstGeom>
+          <a:ln w="12700">
+            <a:miter lim="400000"/>
+          </a:ln>
+          <a:extLst>
+            <a:ext uri="{C572A759-6A51-4108-AA02-DFA0A04FC94B}">
+              <ma14:wrappingTextBoxFlag xmlns:ma14="http://schemas.microsoft.com/office/mac/drawingml/2011/main" xmlns:a14="http://schemas.microsoft.com/office/drawing/2010/main" xmlns:m="http://schemas.openxmlformats.org/officeDocument/2006/math" xmlns="" val="1"/>
+            </a:ext>
+          </a:extLst>
+        </p:spPr>
+        <p:txBody>
+          <a:bodyPr lIns="45718" tIns="45718" rIns="45718" bIns="45718">
+            <a:spAutoFit/>
+          </a:bodyPr>
+          <a:lstStyle>
+            <a:lvl1pPr>
+              <a:defRPr>
                 <a:solidFill>
-                  <a:srgbClr val="0070C0"/>
+                  <a:srgbClr val="FFFFFF"/>
                 </a:solidFill>
-              </a:rPr>
-              <a:t>60.98%</a:t>
-            </a:r>
-          </a:p>
-          <a:p>
-            <a:pPr marL="0" indent="118871">
-              <a:lnSpc>
-                <a:spcPct val="80000"/>
-              </a:lnSpc>
-              <a:buSzTx/>
-              <a:buNone/>
-              <a:defRPr sz="2200"/>
-            </a:pPr>
-            <a:endParaRPr/>
-          </a:p>
-          <a:p>
-            <a:pPr marL="0" indent="118871">
-              <a:lnSpc>
-                <a:spcPct val="80000"/>
-              </a:lnSpc>
-              <a:buSzTx/>
-              <a:buNone/>
-              <a:defRPr sz="2200"/>
-            </a:pPr>
-            <a:r>
-              <a:t>Recall: </a:t>
-            </a:r>
-          </a:p>
-          <a:p>
-            <a:pPr marL="0" indent="118871">
-              <a:lnSpc>
-                <a:spcPct val="80000"/>
-              </a:lnSpc>
-              <a:buSzTx/>
-              <a:buNone/>
-              <a:defRPr sz="2200"/>
-            </a:pPr>
-            <a:r>
-              <a:t>The ratio of positive instances that are correctly detected by the classifier (true positive rate), represented by the Recall, is:  </a:t>
-            </a:r>
-            <a:r>
-              <a:rPr i="1">
-                <a:solidFill>
-                  <a:srgbClr val="0070C0"/>
-                </a:solidFill>
-              </a:rPr>
-              <a:t>70.09%</a:t>
-            </a:r>
-          </a:p>
-          <a:p>
-            <a:pPr marL="0" indent="118871">
-              <a:lnSpc>
-                <a:spcPct val="80000"/>
-              </a:lnSpc>
-              <a:buSzTx/>
-              <a:buNone/>
-              <a:defRPr sz="2200"/>
-            </a:pPr>
-            <a:endParaRPr/>
-          </a:p>
-          <a:p>
-            <a:pPr marL="0" indent="118871">
-              <a:lnSpc>
-                <a:spcPct val="80000"/>
-              </a:lnSpc>
-              <a:buSzTx/>
-              <a:buNone/>
-              <a:defRPr sz="2200"/>
-            </a:pPr>
-            <a:r>
-              <a:t>F1-Score: </a:t>
-            </a:r>
-          </a:p>
-          <a:p>
-            <a:pPr marL="0" indent="118871">
-              <a:lnSpc>
-                <a:spcPct val="80000"/>
-              </a:lnSpc>
-              <a:buSzTx/>
-              <a:buNone/>
-              <a:defRPr sz="2200"/>
-            </a:pPr>
-            <a:r>
-              <a:t>The F1-score, represented by the harmonic mean of precision and recall which,  differently from the regular mean (that gives equal weight to all values),  gives more weight  to low values - favoring classifiers that have similar precision and recall  - is:   </a:t>
-            </a:r>
-            <a:r>
-              <a:rPr sz="2500" i="1">
-                <a:solidFill>
-                  <a:srgbClr val="0070C0"/>
-                </a:solidFill>
-              </a:rPr>
-              <a:t>65.22%</a:t>
-            </a:r>
-          </a:p>
-        </p:txBody>
-      </p:sp>
+              </a:defRPr>
+            </a:lvl1pPr>
+          </a:lstStyle>
+          <a:p>
+            <a:r>
+              <a:t>Confusion Matrix</a:t>
+            </a:r>
+          </a:p>
+        </p:txBody>
+      </p:sp>
+      <p:pic>
+        <p:nvPicPr>
+          <p:cNvPr id="255" name="Picture Placeholder 7" descr="Picture Placeholder 7"/>
+          <p:cNvPicPr>
+            <a:picLocks noGrp="1" noChangeAspect="1"/>
+          </p:cNvPicPr>
+          <p:nvPr>
+            <p:ph type="pic" idx="13"/>
+          </p:nvPr>
+        </p:nvPicPr>
+        <p:blipFill>
+          <a:blip r:embed="rId2" cstate="print"/>
+          <a:srcRect l="17313" r="17313"/>
+          <a:stretch>
+            <a:fillRect/>
+          </a:stretch>
+        </p:blipFill>
+        <p:spPr>
+          <a:xfrm>
+            <a:off x="2903802" y="1484808"/>
+            <a:ext cx="6247402" cy="5373193"/>
+          </a:xfrm>
+          <a:prstGeom prst="rect">
+            <a:avLst/>
+          </a:prstGeom>
+        </p:spPr>
+      </p:pic>
     </p:spTree>
   </p:cSld>
   <p:clrMapOvr>
@@ -9669,7 +9598,7 @@
           </a:ln>
           <a:extLst>
             <a:ext uri="{C572A759-6A51-4108-AA02-DFA0A04FC94B}">
-              <ma14:wrappingTextBoxFlag xmlns="" xmlns:m="http://schemas.openxmlformats.org/officeDocument/2006/math" xmlns:a14="http://schemas.microsoft.com/office/drawing/2010/main" xmlns:ma14="http://schemas.microsoft.com/office/mac/drawingml/2011/main" val="1"/>
+              <ma14:wrappingTextBoxFlag xmlns:ma14="http://schemas.microsoft.com/office/mac/drawingml/2011/main" xmlns:a14="http://schemas.microsoft.com/office/drawing/2010/main" xmlns:m="http://schemas.openxmlformats.org/officeDocument/2006/math" xmlns="" val="1"/>
             </a:ext>
           </a:extLst>
         </p:spPr>
@@ -9862,7 +9791,7 @@
       </p:grpSpPr>
       <p:sp>
         <p:nvSpPr>
-          <p:cNvPr id="260" name="Title 1"/>
+          <p:cNvPr id="257" name="Title 1"/>
           <p:cNvSpPr txBox="1">
             <a:spLocks noGrp="1"/>
           </p:cNvSpPr>
@@ -9872,37 +9801,57 @@
         </p:nvSpPr>
         <p:spPr>
           <a:xfrm>
-            <a:off x="164591" y="155446"/>
-            <a:ext cx="2525152" cy="978413"/>
-          </a:xfrm>
-          <a:prstGeom prst="rect">
-            <a:avLst/>
-          </a:prstGeom>
-        </p:spPr>
-        <p:txBody>
-          <a:bodyPr/>
+            <a:off x="457200" y="155446"/>
+            <a:ext cx="8229600" cy="1252731"/>
+          </a:xfrm>
+          <a:prstGeom prst="rect">
+            <a:avLst/>
+          </a:prstGeom>
+        </p:spPr>
+        <p:txBody>
+          <a:bodyPr>
+            <a:normAutofit fontScale="90000"/>
+          </a:bodyPr>
           <a:lstStyle/>
           <a:p>
             <a:r>
-              <a:t>Prediction with Decision Trees</a:t>
-            </a:r>
-          </a:p>
-        </p:txBody>
-      </p:sp>
-      <p:sp>
-        <p:nvSpPr>
-          <p:cNvPr id="261" name="Text Placeholder 2"/>
+              <a:rPr dirty="0"/>
+              <a:t>Prediction with </a:t>
+            </a:r>
+            <a:r>
+              <a:rPr lang="it-IT" dirty="0"/>
+              <a:t>Random </a:t>
+            </a:r>
+            <a:r>
+              <a:rPr lang="it-IT" dirty="0" err="1"/>
+              <a:t>Forest</a:t>
+            </a:r>
+            <a:r>
+              <a:rPr lang="it-IT" dirty="0"/>
+              <a:t> </a:t>
+            </a:r>
+            <a:r>
+              <a:rPr lang="it-IT" dirty="0" err="1"/>
+              <a:t>Classifiers</a:t>
+            </a:r>
+            <a:endParaRPr dirty="0"/>
+          </a:p>
+        </p:txBody>
+      </p:sp>
+      <p:sp>
+        <p:nvSpPr>
+          <p:cNvPr id="258" name="Text Placeholder 6"/>
           <p:cNvSpPr txBox="1">
             <a:spLocks noGrp="1"/>
           </p:cNvSpPr>
           <p:nvPr>
-            <p:ph type="body" sz="quarter" idx="1"/>
+            <p:ph type="body" idx="1"/>
           </p:nvPr>
         </p:nvSpPr>
         <p:spPr>
           <a:xfrm>
-            <a:off x="164591" y="1728216"/>
-            <a:ext cx="2468882" cy="4572002"/>
+            <a:off x="457200" y="1775191"/>
+            <a:ext cx="8229600" cy="4625611"/>
           </a:xfrm>
           <a:prstGeom prst="rect">
             <a:avLst/>
@@ -9912,130 +9861,193 @@
           <a:bodyPr/>
           <a:lstStyle/>
           <a:p>
-            <a:pPr indent="118871"/>
-            <a:r>
-              <a:t>The curve to the right represents the ROC of our model.</a:t>
-            </a:r>
-          </a:p>
-          <a:p>
-            <a:pPr indent="118871"/>
-            <a:r>
-              <a:t>The Area Under Curve is: </a:t>
-            </a:r>
-            <a:r>
-              <a:rPr i="1">
+            <a:pPr marL="0" indent="118871">
+              <a:lnSpc>
+                <a:spcPct val="80000"/>
+              </a:lnSpc>
+              <a:buSzTx/>
+              <a:buNone/>
+              <a:defRPr sz="2200"/>
+            </a:pPr>
+            <a:r>
+              <a:rPr dirty="0"/>
+              <a:t>Precision:</a:t>
+            </a:r>
+          </a:p>
+          <a:p>
+            <a:pPr marL="0" indent="118871">
+              <a:lnSpc>
+                <a:spcPct val="80000"/>
+              </a:lnSpc>
+              <a:buSzTx/>
+              <a:buNone/>
+              <a:defRPr sz="2200"/>
+            </a:pPr>
+            <a:r>
+              <a:rPr dirty="0"/>
+              <a:t>The percentage of the accuracy of our positive predictions, represented by the Precision, is:  </a:t>
+            </a:r>
+            <a:r>
+              <a:rPr i="1" dirty="0">
                 <a:solidFill>
                   <a:srgbClr val="0070C0"/>
                 </a:solidFill>
               </a:rPr>
-              <a:t>0.6844</a:t>
-            </a:r>
-          </a:p>
-          <a:p>
-            <a:pPr indent="118871">
-              <a:defRPr i="1">
-                <a:solidFill>
-                  <a:srgbClr val="0070C0"/>
-                </a:solidFill>
-              </a:defRPr>
-            </a:pPr>
-            <a:endParaRPr/>
-          </a:p>
-          <a:p>
-            <a:pPr indent="118871"/>
-            <a:r>
-              <a:t>Accuracy: </a:t>
-            </a:r>
-          </a:p>
-          <a:p>
-            <a:pPr indent="118871"/>
-            <a:r>
-              <a:t>The overall predicted accuracy of the model is: </a:t>
-            </a:r>
-            <a:r>
-              <a:rPr i="1">
+              <a:t>60.</a:t>
+            </a:r>
+            <a:r>
+              <a:rPr lang="en-US" i="1" dirty="0">
                 <a:solidFill>
                   <a:srgbClr val="0070C0"/>
                 </a:solidFill>
               </a:rPr>
-              <a:t>64.19%</a:t>
-            </a:r>
-            <a:r>
-              <a:rPr sz="900"/>
-              <a:t> </a:t>
-            </a:r>
-          </a:p>
-        </p:txBody>
-      </p:sp>
-      <p:sp>
-        <p:nvSpPr>
-          <p:cNvPr id="262" name="TextBox 12"/>
-          <p:cNvSpPr txBox="1"/>
-          <p:nvPr/>
-        </p:nvSpPr>
-        <p:spPr>
-          <a:xfrm>
-            <a:off x="3006969" y="459988"/>
-            <a:ext cx="5972439" cy="370837"/>
-          </a:xfrm>
-          <a:prstGeom prst="rect">
-            <a:avLst/>
-          </a:prstGeom>
-          <a:ln w="12700">
-            <a:miter lim="400000"/>
-          </a:ln>
-          <a:extLst>
-            <a:ext uri="{C572A759-6A51-4108-AA02-DFA0A04FC94B}">
-              <ma14:wrappingTextBoxFlag xmlns="" xmlns:m="http://schemas.openxmlformats.org/officeDocument/2006/math" xmlns:a14="http://schemas.microsoft.com/office/drawing/2010/main" xmlns:ma14="http://schemas.microsoft.com/office/mac/drawingml/2011/main" val="1"/>
-            </a:ext>
-          </a:extLst>
-        </p:spPr>
-        <p:txBody>
-          <a:bodyPr lIns="45718" tIns="45718" rIns="45718" bIns="45718">
-            <a:spAutoFit/>
-          </a:bodyPr>
-          <a:lstStyle>
-            <a:lvl1pPr>
-              <a:defRPr>
+              <a:t>50</a:t>
+            </a:r>
+            <a:r>
+              <a:rPr i="1" dirty="0">
                 <a:solidFill>
-                  <a:srgbClr val="FFFFFF"/>
+                  <a:srgbClr val="0070C0"/>
                 </a:solidFill>
-              </a:defRPr>
-            </a:lvl1pPr>
-          </a:lstStyle>
-          <a:p>
-            <a:r>
-              <a:t>ROC, AUC and Accuracy</a:t>
-            </a:r>
-          </a:p>
-        </p:txBody>
-      </p:sp>
-      <p:pic>
-        <p:nvPicPr>
-          <p:cNvPr id="263" name="Picture Placeholder 11" descr="Picture Placeholder 11"/>
-          <p:cNvPicPr>
-            <a:picLocks noGrp="1" noChangeAspect="1"/>
-          </p:cNvPicPr>
-          <p:nvPr>
-            <p:ph type="pic" idx="13"/>
-          </p:nvPr>
-        </p:nvPicPr>
-        <p:blipFill>
-          <a:blip r:embed="rId2" cstate="print"/>
-          <a:stretch>
-            <a:fillRect/>
-          </a:stretch>
-        </p:blipFill>
-        <p:spPr>
-          <a:xfrm>
-            <a:off x="3249363" y="2184999"/>
-            <a:ext cx="5487651" cy="3658434"/>
-          </a:xfrm>
-          <a:prstGeom prst="rect">
-            <a:avLst/>
-          </a:prstGeom>
-        </p:spPr>
-      </p:pic>
+              </a:rPr>
+              <a:t>%</a:t>
+            </a:r>
+          </a:p>
+          <a:p>
+            <a:pPr marL="0" indent="118871">
+              <a:lnSpc>
+                <a:spcPct val="80000"/>
+              </a:lnSpc>
+              <a:buSzTx/>
+              <a:buNone/>
+              <a:defRPr sz="2200"/>
+            </a:pPr>
+            <a:endParaRPr dirty="0"/>
+          </a:p>
+          <a:p>
+            <a:pPr marL="0" indent="118871">
+              <a:lnSpc>
+                <a:spcPct val="80000"/>
+              </a:lnSpc>
+              <a:buSzTx/>
+              <a:buNone/>
+              <a:defRPr sz="2200"/>
+            </a:pPr>
+            <a:r>
+              <a:rPr dirty="0"/>
+              <a:t>Recall: </a:t>
+            </a:r>
+          </a:p>
+          <a:p>
+            <a:pPr marL="0" indent="118871">
+              <a:lnSpc>
+                <a:spcPct val="80000"/>
+              </a:lnSpc>
+              <a:buSzTx/>
+              <a:buNone/>
+              <a:defRPr sz="2200"/>
+            </a:pPr>
+            <a:r>
+              <a:rPr dirty="0"/>
+              <a:t>The ratio of positive instances that are correctly detected by the classifier (true positive rate), represented by the Recall, is:  </a:t>
+            </a:r>
+            <a:r>
+              <a:rPr lang="en-US" i="1" dirty="0">
+                <a:solidFill>
+                  <a:srgbClr val="0070C0"/>
+                </a:solidFill>
+              </a:rPr>
+              <a:t>67.29</a:t>
+            </a:r>
+            <a:r>
+              <a:rPr i="1" dirty="0">
+                <a:solidFill>
+                  <a:srgbClr val="0070C0"/>
+                </a:solidFill>
+              </a:rPr>
+              <a:t>%</a:t>
+            </a:r>
+          </a:p>
+          <a:p>
+            <a:pPr marL="0" indent="118871">
+              <a:lnSpc>
+                <a:spcPct val="80000"/>
+              </a:lnSpc>
+              <a:buSzTx/>
+              <a:buNone/>
+              <a:defRPr sz="2200"/>
+            </a:pPr>
+            <a:endParaRPr dirty="0"/>
+          </a:p>
+          <a:p>
+            <a:pPr marL="0" indent="118871">
+              <a:lnSpc>
+                <a:spcPct val="80000"/>
+              </a:lnSpc>
+              <a:buSzTx/>
+              <a:buNone/>
+              <a:defRPr sz="2200"/>
+            </a:pPr>
+            <a:r>
+              <a:rPr dirty="0"/>
+              <a:t>F1-Score: </a:t>
+            </a:r>
+          </a:p>
+          <a:p>
+            <a:pPr marL="0" indent="118871">
+              <a:lnSpc>
+                <a:spcPct val="80000"/>
+              </a:lnSpc>
+              <a:buSzTx/>
+              <a:buNone/>
+              <a:defRPr sz="2200"/>
+            </a:pPr>
+            <a:r>
+              <a:rPr dirty="0"/>
+              <a:t>The F1-score, represented by the harmonic mean of precision and recall which,  differently from the regular mean (that gives equal weight to all values),  gives more weight  to low values - favoring classifiers that have similar precision and recall  - is:   </a:t>
+            </a:r>
+            <a:r>
+              <a:rPr sz="2500" i="1" dirty="0">
+                <a:solidFill>
+                  <a:srgbClr val="0070C0"/>
+                </a:solidFill>
+              </a:rPr>
+              <a:t>6</a:t>
+            </a:r>
+            <a:r>
+              <a:rPr lang="en-US" sz="2500" i="1" dirty="0">
+                <a:solidFill>
+                  <a:srgbClr val="0070C0"/>
+                </a:solidFill>
+              </a:rPr>
+              <a:t>3</a:t>
+            </a:r>
+            <a:r>
+              <a:rPr sz="2500" i="1" dirty="0">
+                <a:solidFill>
+                  <a:srgbClr val="0070C0"/>
+                </a:solidFill>
+              </a:rPr>
+              <a:t>.</a:t>
+            </a:r>
+            <a:r>
+              <a:rPr lang="en-US" sz="2500" i="1" dirty="0">
+                <a:solidFill>
+                  <a:srgbClr val="0070C0"/>
+                </a:solidFill>
+              </a:rPr>
+              <a:t>72</a:t>
+            </a:r>
+            <a:r>
+              <a:rPr sz="2500" i="1" dirty="0">
+                <a:solidFill>
+                  <a:srgbClr val="0070C0"/>
+                </a:solidFill>
+              </a:rPr>
+              <a:t>%</a:t>
+            </a:r>
+          </a:p>
+        </p:txBody>
+      </p:sp>
     </p:spTree>
   </p:cSld>
   <p:clrMapOvr>
@@ -10064,7 +10076,7 @@
       </p:grpSpPr>
       <p:sp>
         <p:nvSpPr>
-          <p:cNvPr id="265" name="Title 4"/>
+          <p:cNvPr id="260" name="Title 1"/>
           <p:cNvSpPr txBox="1">
             <a:spLocks noGrp="1"/>
           </p:cNvSpPr>
@@ -10074,8 +10086,8 @@
         </p:nvSpPr>
         <p:spPr>
           <a:xfrm>
-            <a:off x="457200" y="155446"/>
-            <a:ext cx="8229600" cy="1252731"/>
+            <a:off x="164591" y="155446"/>
+            <a:ext cx="2525152" cy="978413"/>
           </a:xfrm>
           <a:prstGeom prst="rect">
             <a:avLst/>
@@ -10086,25 +10098,31 @@
           <a:lstStyle/>
           <a:p>
             <a:r>
-              <a:t>Model ROC Comparison</a:t>
-            </a:r>
-          </a:p>
-        </p:txBody>
-      </p:sp>
-      <p:sp>
-        <p:nvSpPr>
-          <p:cNvPr id="266" name="Text Placeholder 5"/>
+              <a:rPr dirty="0"/>
+              <a:t>Prediction with </a:t>
+            </a:r>
+            <a:r>
+              <a:rPr lang="en-US" dirty="0"/>
+              <a:t>Random Forest Classifiers</a:t>
+            </a:r>
+            <a:endParaRPr dirty="0"/>
+          </a:p>
+        </p:txBody>
+      </p:sp>
+      <p:sp>
+        <p:nvSpPr>
+          <p:cNvPr id="261" name="Text Placeholder 2"/>
           <p:cNvSpPr txBox="1">
             <a:spLocks noGrp="1"/>
           </p:cNvSpPr>
           <p:nvPr>
-            <p:ph type="body" idx="1"/>
+            <p:ph type="body" sz="quarter" idx="1"/>
           </p:nvPr>
         </p:nvSpPr>
         <p:spPr>
           <a:xfrm>
-            <a:off x="457200" y="1775191"/>
-            <a:ext cx="8229600" cy="4625611"/>
+            <a:off x="164591" y="1728216"/>
+            <a:ext cx="2468882" cy="4572002"/>
           </a:xfrm>
           <a:prstGeom prst="rect">
             <a:avLst/>
@@ -10114,44 +10132,144 @@
           <a:bodyPr/>
           <a:lstStyle/>
           <a:p>
-            <a:pPr marL="0" indent="118871">
-              <a:buSzTx/>
-              <a:buNone/>
-            </a:pPr>
-            <a:endParaRPr/>
+            <a:pPr indent="118871"/>
+            <a:r>
+              <a:rPr dirty="0"/>
+              <a:t>The curve to the right represents the ROC of our model.</a:t>
+            </a:r>
+          </a:p>
+          <a:p>
+            <a:pPr indent="118871"/>
+            <a:r>
+              <a:rPr dirty="0"/>
+              <a:t>The Area Under Curve is: </a:t>
+            </a:r>
+            <a:r>
+              <a:rPr i="1" dirty="0">
+                <a:solidFill>
+                  <a:srgbClr val="0070C0"/>
+                </a:solidFill>
+              </a:rPr>
+              <a:t>0.68</a:t>
+            </a:r>
+            <a:r>
+              <a:rPr lang="en-US" i="1" dirty="0">
+                <a:solidFill>
+                  <a:srgbClr val="0070C0"/>
+                </a:solidFill>
+              </a:rPr>
+              <a:t>4</a:t>
+            </a:r>
+            <a:r>
+              <a:rPr i="1" dirty="0">
+                <a:solidFill>
+                  <a:srgbClr val="0070C0"/>
+                </a:solidFill>
+              </a:rPr>
+              <a:t>4</a:t>
+            </a:r>
+          </a:p>
+          <a:p>
+            <a:pPr indent="118871">
+              <a:defRPr i="1">
+                <a:solidFill>
+                  <a:srgbClr val="0070C0"/>
+                </a:solidFill>
+              </a:defRPr>
+            </a:pPr>
+            <a:endParaRPr dirty="0"/>
+          </a:p>
+          <a:p>
+            <a:pPr indent="118871"/>
+            <a:r>
+              <a:rPr dirty="0"/>
+              <a:t>Accuracy: </a:t>
+            </a:r>
+          </a:p>
+          <a:p>
+            <a:pPr indent="118871"/>
+            <a:r>
+              <a:rPr dirty="0"/>
+              <a:t>The overall predicted accuracy of the model is: </a:t>
+            </a:r>
+            <a:r>
+              <a:rPr i="1" dirty="0">
+                <a:solidFill>
+                  <a:srgbClr val="0070C0"/>
+                </a:solidFill>
+              </a:rPr>
+              <a:t>64.19%</a:t>
+            </a:r>
+            <a:r>
+              <a:rPr sz="900" dirty="0"/>
+              <a:t> </a:t>
+            </a:r>
+          </a:p>
+        </p:txBody>
+      </p:sp>
+      <p:sp>
+        <p:nvSpPr>
+          <p:cNvPr id="262" name="TextBox 12"/>
+          <p:cNvSpPr txBox="1"/>
+          <p:nvPr/>
+        </p:nvSpPr>
+        <p:spPr>
+          <a:xfrm>
+            <a:off x="3006969" y="459988"/>
+            <a:ext cx="5972439" cy="370837"/>
+          </a:xfrm>
+          <a:prstGeom prst="rect">
+            <a:avLst/>
+          </a:prstGeom>
+          <a:ln w="12700">
+            <a:miter lim="400000"/>
+          </a:ln>
+          <a:extLst>
+            <a:ext uri="{C572A759-6A51-4108-AA02-DFA0A04FC94B}">
+              <ma14:wrappingTextBoxFlag xmlns:ma14="http://schemas.microsoft.com/office/mac/drawingml/2011/main" xmlns:a14="http://schemas.microsoft.com/office/drawing/2010/main" xmlns:m="http://schemas.openxmlformats.org/officeDocument/2006/math" xmlns="" val="1"/>
+            </a:ext>
+          </a:extLst>
+        </p:spPr>
+        <p:txBody>
+          <a:bodyPr lIns="45718" tIns="45718" rIns="45718" bIns="45718">
+            <a:spAutoFit/>
+          </a:bodyPr>
+          <a:lstStyle>
+            <a:lvl1pPr>
+              <a:defRPr>
+                <a:solidFill>
+                  <a:srgbClr val="FFFFFF"/>
+                </a:solidFill>
+              </a:defRPr>
+            </a:lvl1pPr>
+          </a:lstStyle>
+          <a:p>
+            <a:r>
+              <a:t>ROC, AUC and Accuracy</a:t>
+            </a:r>
           </a:p>
         </p:txBody>
       </p:sp>
       <p:pic>
         <p:nvPicPr>
-          <p:cNvPr id="4" name="Picture 3" descr="Chart, line chart&#10;&#10;Description automatically generated">
-            <a:extLst>
-              <a:ext uri="{FF2B5EF4-FFF2-40B4-BE49-F238E27FC236}">
-                <a16:creationId xmlns:a16="http://schemas.microsoft.com/office/drawing/2014/main" id="{E3426AAA-9D89-40AE-AC3D-767363107883}"/>
-              </a:ext>
-            </a:extLst>
-          </p:cNvPr>
+          <p:cNvPr id="263" name="Picture Placeholder 11" descr="Picture Placeholder 11"/>
           <p:cNvPicPr>
-            <a:picLocks noChangeAspect="1"/>
+            <a:picLocks noGrp="1" noChangeAspect="1"/>
           </p:cNvPicPr>
-          <p:nvPr/>
+          <p:nvPr>
+            <p:ph type="pic" idx="13"/>
+          </p:nvPr>
         </p:nvPicPr>
         <p:blipFill>
-          <a:blip r:embed="rId2">
-            <a:extLst>
-              <a:ext uri="{28A0092B-C50C-407E-A947-70E740481C1C}">
-                <a14:useLocalDpi xmlns:a14="http://schemas.microsoft.com/office/drawing/2010/main" val="0"/>
-              </a:ext>
-            </a:extLst>
-          </a:blip>
+          <a:blip r:embed="rId2" cstate="print"/>
           <a:stretch>
             <a:fillRect/>
           </a:stretch>
         </p:blipFill>
         <p:spPr>
           <a:xfrm>
-            <a:off x="0" y="1517486"/>
-            <a:ext cx="9144000" cy="5141019"/>
+            <a:off x="3249363" y="2184999"/>
+            <a:ext cx="5487651" cy="3658434"/>
           </a:xfrm>
           <a:prstGeom prst="rect">
             <a:avLst/>
@@ -10186,6 +10304,128 @@
       </p:grpSpPr>
       <p:sp>
         <p:nvSpPr>
+          <p:cNvPr id="265" name="Title 4"/>
+          <p:cNvSpPr txBox="1">
+            <a:spLocks noGrp="1"/>
+          </p:cNvSpPr>
+          <p:nvPr>
+            <p:ph type="title"/>
+          </p:nvPr>
+        </p:nvSpPr>
+        <p:spPr>
+          <a:xfrm>
+            <a:off x="457200" y="155446"/>
+            <a:ext cx="8229600" cy="1252731"/>
+          </a:xfrm>
+          <a:prstGeom prst="rect">
+            <a:avLst/>
+          </a:prstGeom>
+        </p:spPr>
+        <p:txBody>
+          <a:bodyPr/>
+          <a:lstStyle/>
+          <a:p>
+            <a:r>
+              <a:t>Model ROC Comparison</a:t>
+            </a:r>
+          </a:p>
+        </p:txBody>
+      </p:sp>
+      <p:sp>
+        <p:nvSpPr>
+          <p:cNvPr id="266" name="Text Placeholder 5"/>
+          <p:cNvSpPr txBox="1">
+            <a:spLocks noGrp="1"/>
+          </p:cNvSpPr>
+          <p:nvPr>
+            <p:ph type="body" idx="1"/>
+          </p:nvPr>
+        </p:nvSpPr>
+        <p:spPr>
+          <a:xfrm>
+            <a:off x="457200" y="1775191"/>
+            <a:ext cx="8229600" cy="4625611"/>
+          </a:xfrm>
+          <a:prstGeom prst="rect">
+            <a:avLst/>
+          </a:prstGeom>
+        </p:spPr>
+        <p:txBody>
+          <a:bodyPr/>
+          <a:lstStyle/>
+          <a:p>
+            <a:pPr marL="0" indent="118871">
+              <a:buSzTx/>
+              <a:buNone/>
+            </a:pPr>
+            <a:endParaRPr/>
+          </a:p>
+        </p:txBody>
+      </p:sp>
+      <p:pic>
+        <p:nvPicPr>
+          <p:cNvPr id="4" name="Picture 3" descr="Chart, line chart&#10;&#10;Description automatically generated">
+            <a:extLst>
+              <a:ext uri="{FF2B5EF4-FFF2-40B4-BE49-F238E27FC236}">
+                <a16:creationId xmlns:a16="http://schemas.microsoft.com/office/drawing/2014/main" id="{E3426AAA-9D89-40AE-AC3D-767363107883}"/>
+              </a:ext>
+            </a:extLst>
+          </p:cNvPr>
+          <p:cNvPicPr>
+            <a:picLocks noChangeAspect="1"/>
+          </p:cNvPicPr>
+          <p:nvPr/>
+        </p:nvPicPr>
+        <p:blipFill>
+          <a:blip r:embed="rId2">
+            <a:extLst>
+              <a:ext uri="{28A0092B-C50C-407E-A947-70E740481C1C}">
+                <a14:useLocalDpi xmlns:a14="http://schemas.microsoft.com/office/drawing/2010/main" val="0"/>
+              </a:ext>
+            </a:extLst>
+          </a:blip>
+          <a:stretch>
+            <a:fillRect/>
+          </a:stretch>
+        </p:blipFill>
+        <p:spPr>
+          <a:xfrm>
+            <a:off x="0" y="1517486"/>
+            <a:ext cx="9144000" cy="5141019"/>
+          </a:xfrm>
+          <a:prstGeom prst="rect">
+            <a:avLst/>
+          </a:prstGeom>
+        </p:spPr>
+      </p:pic>
+    </p:spTree>
+  </p:cSld>
+  <p:clrMapOvr>
+    <a:masterClrMapping/>
+  </p:clrMapOvr>
+  <p:transition spd="med"/>
+</p:sld>
+</file>
+
+<file path=ppt/slides/slide33.xml><?xml version="1.0" encoding="utf-8"?>
+<p:sld xmlns:a="http://schemas.openxmlformats.org/drawingml/2006/main" xmlns:r="http://schemas.openxmlformats.org/officeDocument/2006/relationships" xmlns:p="http://schemas.openxmlformats.org/presentationml/2006/main">
+  <p:cSld>
+    <p:spTree>
+      <p:nvGrpSpPr>
+        <p:cNvPr id="1" name=""/>
+        <p:cNvGrpSpPr/>
+        <p:nvPr/>
+      </p:nvGrpSpPr>
+      <p:grpSpPr>
+        <a:xfrm>
+          <a:off x="0" y="0"/>
+          <a:ext cx="0" cy="0"/>
+          <a:chOff x="0" y="0"/>
+          <a:chExt cx="0" cy="0"/>
+        </a:xfrm>
+      </p:grpSpPr>
+      <p:sp>
+        <p:nvSpPr>
           <p:cNvPr id="6" name="Title 5">
             <a:extLst>
               <a:ext uri="{FF2B5EF4-FFF2-40B4-BE49-F238E27FC236}">
@@ -10280,6 +10520,268 @@
     <p:extLst>
       <p:ext uri="{BB962C8B-B14F-4D97-AF65-F5344CB8AC3E}">
         <p14:creationId xmlns:p14="http://schemas.microsoft.com/office/powerpoint/2010/main" val="4147429674"/>
+      </p:ext>
+    </p:extLst>
+  </p:cSld>
+  <p:clrMapOvr>
+    <a:masterClrMapping/>
+  </p:clrMapOvr>
+  <p:transition spd="med"/>
+</p:sld>
+</file>
+
+<file path=ppt/slides/slide34.xml><?xml version="1.0" encoding="utf-8"?>
+<p:sld xmlns:a="http://schemas.openxmlformats.org/drawingml/2006/main" xmlns:r="http://schemas.openxmlformats.org/officeDocument/2006/relationships" xmlns:p="http://schemas.openxmlformats.org/presentationml/2006/main">
+  <p:cSld>
+    <p:spTree>
+      <p:nvGrpSpPr>
+        <p:cNvPr id="1" name=""/>
+        <p:cNvGrpSpPr/>
+        <p:nvPr/>
+      </p:nvGrpSpPr>
+      <p:grpSpPr>
+        <a:xfrm>
+          <a:off x="0" y="0"/>
+          <a:ext cx="0" cy="0"/>
+          <a:chOff x="0" y="0"/>
+          <a:chExt cx="0" cy="0"/>
+        </a:xfrm>
+      </p:grpSpPr>
+      <p:sp>
+        <p:nvSpPr>
+          <p:cNvPr id="7" name="Title 6">
+            <a:extLst>
+              <a:ext uri="{FF2B5EF4-FFF2-40B4-BE49-F238E27FC236}">
+                <a16:creationId xmlns:a16="http://schemas.microsoft.com/office/drawing/2014/main" id="{E9109901-70E5-4530-BF71-D879FA5A55B4}"/>
+              </a:ext>
+            </a:extLst>
+          </p:cNvPr>
+          <p:cNvSpPr>
+            <a:spLocks noGrp="1"/>
+          </p:cNvSpPr>
+          <p:nvPr>
+            <p:ph type="title"/>
+          </p:nvPr>
+        </p:nvSpPr>
+        <p:spPr/>
+        <p:txBody>
+          <a:bodyPr/>
+          <a:lstStyle/>
+          <a:p>
+            <a:r>
+              <a:rPr lang="en-US" dirty="0"/>
+              <a:t>Thank you all for your attention</a:t>
+            </a:r>
+          </a:p>
+        </p:txBody>
+      </p:sp>
+      <p:sp>
+        <p:nvSpPr>
+          <p:cNvPr id="8" name="Text Placeholder 7">
+            <a:extLst>
+              <a:ext uri="{FF2B5EF4-FFF2-40B4-BE49-F238E27FC236}">
+                <a16:creationId xmlns:a16="http://schemas.microsoft.com/office/drawing/2014/main" id="{111AA72E-DC5C-47B9-829C-D223034C0251}"/>
+              </a:ext>
+            </a:extLst>
+          </p:cNvPr>
+          <p:cNvSpPr>
+            <a:spLocks noGrp="1"/>
+          </p:cNvSpPr>
+          <p:nvPr>
+            <p:ph type="body" sz="quarter" idx="1"/>
+          </p:nvPr>
+        </p:nvSpPr>
+        <p:spPr/>
+        <p:txBody>
+          <a:bodyPr/>
+          <a:lstStyle/>
+          <a:p>
+            <a:r>
+              <a:rPr lang="en-US" dirty="0"/>
+              <a:t>Any questions are kindly welcome!</a:t>
+            </a:r>
+          </a:p>
+        </p:txBody>
+      </p:sp>
+    </p:spTree>
+    <p:extLst>
+      <p:ext uri="{BB962C8B-B14F-4D97-AF65-F5344CB8AC3E}">
+        <p14:creationId xmlns:p14="http://schemas.microsoft.com/office/powerpoint/2010/main" val="878977070"/>
+      </p:ext>
+    </p:extLst>
+  </p:cSld>
+  <p:clrMapOvr>
+    <a:masterClrMapping/>
+  </p:clrMapOvr>
+  <p:transition spd="med"/>
+</p:sld>
+</file>
+
+<file path=ppt/slides/slide35.xml><?xml version="1.0" encoding="utf-8"?>
+<p:sld xmlns:a="http://schemas.openxmlformats.org/drawingml/2006/main" xmlns:r="http://schemas.openxmlformats.org/officeDocument/2006/relationships" xmlns:p="http://schemas.openxmlformats.org/presentationml/2006/main">
+  <p:cSld>
+    <p:spTree>
+      <p:nvGrpSpPr>
+        <p:cNvPr id="1" name=""/>
+        <p:cNvGrpSpPr/>
+        <p:nvPr/>
+      </p:nvGrpSpPr>
+      <p:grpSpPr>
+        <a:xfrm>
+          <a:off x="0" y="0"/>
+          <a:ext cx="0" cy="0"/>
+          <a:chOff x="0" y="0"/>
+          <a:chExt cx="0" cy="0"/>
+        </a:xfrm>
+      </p:grpSpPr>
+      <p:sp>
+        <p:nvSpPr>
+          <p:cNvPr id="4" name="Title 3">
+            <a:extLst>
+              <a:ext uri="{FF2B5EF4-FFF2-40B4-BE49-F238E27FC236}">
+                <a16:creationId xmlns:a16="http://schemas.microsoft.com/office/drawing/2014/main" id="{0051A32E-2E41-4A27-B7E4-AD2CBC1A3C80}"/>
+              </a:ext>
+            </a:extLst>
+          </p:cNvPr>
+          <p:cNvSpPr>
+            <a:spLocks noGrp="1"/>
+          </p:cNvSpPr>
+          <p:nvPr>
+            <p:ph type="title"/>
+          </p:nvPr>
+        </p:nvSpPr>
+        <p:spPr/>
+        <p:txBody>
+          <a:bodyPr/>
+          <a:lstStyle/>
+          <a:p>
+            <a:r>
+              <a:rPr lang="en-US" dirty="0"/>
+              <a:t>References and Bibliography</a:t>
+            </a:r>
+          </a:p>
+        </p:txBody>
+      </p:sp>
+      <p:sp>
+        <p:nvSpPr>
+          <p:cNvPr id="5" name="Text Placeholder 4">
+            <a:extLst>
+              <a:ext uri="{FF2B5EF4-FFF2-40B4-BE49-F238E27FC236}">
+                <a16:creationId xmlns:a16="http://schemas.microsoft.com/office/drawing/2014/main" id="{61CF831B-58F4-4E95-ADA5-84EB480AF391}"/>
+              </a:ext>
+            </a:extLst>
+          </p:cNvPr>
+          <p:cNvSpPr>
+            <a:spLocks noGrp="1"/>
+          </p:cNvSpPr>
+          <p:nvPr>
+            <p:ph type="body" idx="1"/>
+          </p:nvPr>
+        </p:nvSpPr>
+        <p:spPr/>
+        <p:txBody>
+          <a:bodyPr/>
+          <a:lstStyle/>
+          <a:p>
+            <a:pPr marL="118872" indent="0" algn="l">
+              <a:buNone/>
+            </a:pPr>
+            <a:r>
+              <a:rPr lang="en-US" b="0" i="0" dirty="0">
+                <a:solidFill>
+                  <a:srgbClr val="000000"/>
+                </a:solidFill>
+                <a:effectLst/>
+                <a:latin typeface="Helvetica Neue"/>
+              </a:rPr>
+              <a:t>Article from World Health Organization web-site: </a:t>
+            </a:r>
+          </a:p>
+          <a:p>
+            <a:pPr algn="l">
+              <a:buFont typeface="Arial" panose="020B0604020202020204" pitchFamily="34" charset="0"/>
+              <a:buChar char="•"/>
+            </a:pPr>
+            <a:r>
+              <a:rPr lang="en-US" b="0" i="0" u="sng" dirty="0">
+                <a:solidFill>
+                  <a:srgbClr val="296EAA"/>
+                </a:solidFill>
+                <a:effectLst/>
+                <a:latin typeface="Helvetica Neue"/>
+                <a:hlinkClick r:id="rId2"/>
+              </a:rPr>
+              <a:t>https://www.who.int/en/news-room/fact-sheets/detail/cardiovascular-diseases-(cvds)</a:t>
+            </a:r>
+            <a:endParaRPr lang="en-US" b="0" i="0" dirty="0">
+              <a:solidFill>
+                <a:srgbClr val="000000"/>
+              </a:solidFill>
+              <a:effectLst/>
+              <a:latin typeface="Helvetica Neue"/>
+            </a:endParaRPr>
+          </a:p>
+          <a:p>
+            <a:pPr marL="118872" indent="0" algn="l">
+              <a:buNone/>
+            </a:pPr>
+            <a:r>
+              <a:rPr lang="en-US" b="0" i="0" dirty="0" err="1">
+                <a:solidFill>
+                  <a:srgbClr val="000000"/>
+                </a:solidFill>
+                <a:effectLst/>
+                <a:latin typeface="Helvetica Neue"/>
+              </a:rPr>
+              <a:t>DataSet</a:t>
+            </a:r>
+            <a:r>
+              <a:rPr lang="en-US" dirty="0">
+                <a:latin typeface="Helvetica Neue"/>
+              </a:rPr>
+              <a:t> </a:t>
+            </a:r>
+            <a:r>
+              <a:rPr lang="en-US" b="0" i="0" dirty="0">
+                <a:solidFill>
+                  <a:srgbClr val="000000"/>
+                </a:solidFill>
+                <a:effectLst/>
+                <a:latin typeface="Helvetica Neue"/>
+              </a:rPr>
+              <a:t>resources: </a:t>
+            </a:r>
+          </a:p>
+          <a:p>
+            <a:pPr algn="l">
+              <a:buFont typeface="Arial" panose="020B0604020202020204" pitchFamily="34" charset="0"/>
+              <a:buChar char="•"/>
+            </a:pPr>
+            <a:r>
+              <a:rPr lang="en-US" b="0" i="0" u="sng" dirty="0">
+                <a:solidFill>
+                  <a:srgbClr val="296EAA"/>
+                </a:solidFill>
+                <a:effectLst/>
+                <a:latin typeface="Helvetica Neue"/>
+                <a:hlinkClick r:id="rId3"/>
+              </a:rPr>
+              <a:t>https://www.kaggle.com/dileep070/heart-disease-prediction-using-logistic-regression</a:t>
+            </a:r>
+            <a:endParaRPr lang="en-US" b="0" i="0" dirty="0">
+              <a:solidFill>
+                <a:srgbClr val="000000"/>
+              </a:solidFill>
+              <a:effectLst/>
+              <a:latin typeface="Helvetica Neue"/>
+            </a:endParaRPr>
+          </a:p>
+        </p:txBody>
+      </p:sp>
+    </p:spTree>
+    <p:extLst>
+      <p:ext uri="{BB962C8B-B14F-4D97-AF65-F5344CB8AC3E}">
+        <p14:creationId xmlns:p14="http://schemas.microsoft.com/office/powerpoint/2010/main" val="2778856172"/>
       </p:ext>
     </p:extLst>
   </p:cSld>
@@ -10805,7 +11307,7 @@
           </a:ln>
           <a:extLst>
             <a:ext uri="{C572A759-6A51-4108-AA02-DFA0A04FC94B}">
-              <ma14:wrappingTextBoxFlag xmlns="" xmlns:m="http://schemas.openxmlformats.org/officeDocument/2006/math" xmlns:a14="http://schemas.microsoft.com/office/drawing/2010/main" xmlns:ma14="http://schemas.microsoft.com/office/mac/drawingml/2011/main" val="1"/>
+              <ma14:wrappingTextBoxFlag xmlns:ma14="http://schemas.microsoft.com/office/mac/drawingml/2011/main" xmlns:a14="http://schemas.microsoft.com/office/drawing/2010/main" xmlns:m="http://schemas.openxmlformats.org/officeDocument/2006/math" xmlns="" val="1"/>
             </a:ext>
           </a:extLst>
         </p:spPr>
@@ -10888,7 +11390,7 @@
           </a:ln>
           <a:extLst>
             <a:ext uri="{C572A759-6A51-4108-AA02-DFA0A04FC94B}">
-              <ma14:wrappingTextBoxFlag xmlns="" xmlns:m="http://schemas.openxmlformats.org/officeDocument/2006/math" xmlns:a14="http://schemas.microsoft.com/office/drawing/2010/main" xmlns:ma14="http://schemas.microsoft.com/office/mac/drawingml/2011/main" val="1"/>
+              <ma14:wrappingTextBoxFlag xmlns:ma14="http://schemas.microsoft.com/office/mac/drawingml/2011/main" xmlns:a14="http://schemas.microsoft.com/office/drawing/2010/main" xmlns:m="http://schemas.openxmlformats.org/officeDocument/2006/math" xmlns="" val="1"/>
             </a:ext>
           </a:extLst>
         </p:spPr>
@@ -10938,7 +11440,7 @@
           </a:ln>
           <a:extLst>
             <a:ext uri="{C572A759-6A51-4108-AA02-DFA0A04FC94B}">
-              <ma14:wrappingTextBoxFlag xmlns="" xmlns:m="http://schemas.openxmlformats.org/officeDocument/2006/math" xmlns:a14="http://schemas.microsoft.com/office/drawing/2010/main" xmlns:ma14="http://schemas.microsoft.com/office/mac/drawingml/2011/main" val="1"/>
+              <ma14:wrappingTextBoxFlag xmlns:ma14="http://schemas.microsoft.com/office/mac/drawingml/2011/main" xmlns:a14="http://schemas.microsoft.com/office/drawing/2010/main" xmlns:m="http://schemas.openxmlformats.org/officeDocument/2006/math" xmlns="" val="1"/>
             </a:ext>
           </a:extLst>
         </p:spPr>
@@ -11009,7 +11511,7 @@
           </a:ln>
           <a:extLst>
             <a:ext uri="{C572A759-6A51-4108-AA02-DFA0A04FC94B}">
-              <ma14:wrappingTextBoxFlag xmlns="" xmlns:m="http://schemas.openxmlformats.org/officeDocument/2006/math" xmlns:a14="http://schemas.microsoft.com/office/drawing/2010/main" xmlns:ma14="http://schemas.microsoft.com/office/mac/drawingml/2011/main" val="1"/>
+              <ma14:wrappingTextBoxFlag xmlns:ma14="http://schemas.microsoft.com/office/mac/drawingml/2011/main" xmlns:a14="http://schemas.microsoft.com/office/drawing/2010/main" xmlns:m="http://schemas.openxmlformats.org/officeDocument/2006/math" xmlns="" val="1"/>
             </a:ext>
           </a:extLst>
         </p:spPr>
@@ -11153,7 +11655,7 @@
           </a:ln>
           <a:extLst>
             <a:ext uri="{C572A759-6A51-4108-AA02-DFA0A04FC94B}">
-              <ma14:wrappingTextBoxFlag xmlns="" xmlns:m="http://schemas.openxmlformats.org/officeDocument/2006/math" xmlns:a14="http://schemas.microsoft.com/office/drawing/2010/main" xmlns:ma14="http://schemas.microsoft.com/office/mac/drawingml/2011/main" val="1"/>
+              <ma14:wrappingTextBoxFlag xmlns:ma14="http://schemas.microsoft.com/office/mac/drawingml/2011/main" xmlns:a14="http://schemas.microsoft.com/office/drawing/2010/main" xmlns:m="http://schemas.openxmlformats.org/officeDocument/2006/math" xmlns="" val="1"/>
             </a:ext>
           </a:extLst>
         </p:spPr>
@@ -11298,7 +11800,7 @@
           </a:ln>
           <a:extLst>
             <a:ext uri="{C572A759-6A51-4108-AA02-DFA0A04FC94B}">
-              <ma14:wrappingTextBoxFlag xmlns="" xmlns:m="http://schemas.openxmlformats.org/officeDocument/2006/math" xmlns:a14="http://schemas.microsoft.com/office/drawing/2010/main" xmlns:ma14="http://schemas.microsoft.com/office/mac/drawingml/2011/main" val="1"/>
+              <ma14:wrappingTextBoxFlag xmlns:ma14="http://schemas.microsoft.com/office/mac/drawingml/2011/main" xmlns:a14="http://schemas.microsoft.com/office/drawing/2010/main" xmlns:m="http://schemas.openxmlformats.org/officeDocument/2006/math" xmlns="" val="1"/>
             </a:ext>
           </a:extLst>
         </p:spPr>
@@ -11342,7 +11844,7 @@
           </a:ln>
           <a:extLst>
             <a:ext uri="{C572A759-6A51-4108-AA02-DFA0A04FC94B}">
-              <ma14:wrappingTextBoxFlag xmlns="" xmlns:m="http://schemas.openxmlformats.org/officeDocument/2006/math" xmlns:a14="http://schemas.microsoft.com/office/drawing/2010/main" xmlns:ma14="http://schemas.microsoft.com/office/mac/drawingml/2011/main" val="1"/>
+              <ma14:wrappingTextBoxFlag xmlns:ma14="http://schemas.microsoft.com/office/mac/drawingml/2011/main" xmlns:a14="http://schemas.microsoft.com/office/drawing/2010/main" xmlns:m="http://schemas.openxmlformats.org/officeDocument/2006/math" xmlns="" val="1"/>
             </a:ext>
           </a:extLst>
         </p:spPr>
@@ -11457,7 +11959,7 @@
           </a:ln>
           <a:extLst>
             <a:ext uri="{C572A759-6A51-4108-AA02-DFA0A04FC94B}">
-              <ma14:wrappingTextBoxFlag xmlns="" xmlns:m="http://schemas.openxmlformats.org/officeDocument/2006/math" xmlns:a14="http://schemas.microsoft.com/office/drawing/2010/main" xmlns:ma14="http://schemas.microsoft.com/office/mac/drawingml/2011/main" val="1"/>
+              <ma14:wrappingTextBoxFlag xmlns:ma14="http://schemas.microsoft.com/office/mac/drawingml/2011/main" xmlns:a14="http://schemas.microsoft.com/office/drawing/2010/main" xmlns:m="http://schemas.openxmlformats.org/officeDocument/2006/math" xmlns="" val="1"/>
             </a:ext>
           </a:extLst>
         </p:spPr>
@@ -11528,7 +12030,7 @@
           </a:ln>
           <a:extLst>
             <a:ext uri="{C572A759-6A51-4108-AA02-DFA0A04FC94B}">
-              <ma14:wrappingTextBoxFlag xmlns="" xmlns:m="http://schemas.openxmlformats.org/officeDocument/2006/math" xmlns:a14="http://schemas.microsoft.com/office/drawing/2010/main" xmlns:ma14="http://schemas.microsoft.com/office/mac/drawingml/2011/main" val="1"/>
+              <ma14:wrappingTextBoxFlag xmlns:ma14="http://schemas.microsoft.com/office/mac/drawingml/2011/main" xmlns:a14="http://schemas.microsoft.com/office/drawing/2010/main" xmlns:m="http://schemas.openxmlformats.org/officeDocument/2006/math" xmlns="" val="1"/>
             </a:ext>
           </a:extLst>
         </p:spPr>

</xml_diff>